<commit_message>
Updated something in the presentation
oh ppt
</commit_message>
<xml_diff>
--- a/4YCM/Slides_4YCM.pptx
+++ b/4YCM/Slides_4YCM.pptx
@@ -4486,13 +4486,9 @@
           <a:p>
             <a:r>
               <a:rPr lang="en-US" dirty="0" smtClean="0"/>
-              <a:t>Microbes as colored </a:t>
-            </a:r>
-            <a:r>
-              <a:rPr lang="en-US" smtClean="0"/>
-              <a:t>dots figure</a:t>
-            </a:r>
-            <a:endParaRPr lang="en-US"/>
+              <a:t>Microbes as colored dots figure</a:t>
+            </a:r>
+            <a:endParaRPr lang="en-US" dirty="0"/>
           </a:p>
         </p:txBody>
       </p:sp>

</xml_diff>

<commit_message>
Updated slides for meeting
</commit_message>
<xml_diff>
--- a/4YCM/Slides_4YCM.pptx
+++ b/4YCM/Slides_4YCM.pptx
@@ -5,23 +5,26 @@
     <p:sldMasterId id="2147483648" r:id="rId1"/>
   </p:sldMasterIdLst>
   <p:notesMasterIdLst>
-    <p:notesMasterId r:id="rId16"/>
+    <p:notesMasterId r:id="rId19"/>
   </p:notesMasterIdLst>
   <p:sldIdLst>
     <p:sldId id="270" r:id="rId2"/>
     <p:sldId id="258" r:id="rId3"/>
-    <p:sldId id="271" r:id="rId4"/>
-    <p:sldId id="261" r:id="rId5"/>
-    <p:sldId id="262" r:id="rId6"/>
-    <p:sldId id="263" r:id="rId7"/>
-    <p:sldId id="267" r:id="rId8"/>
-    <p:sldId id="268" r:id="rId9"/>
-    <p:sldId id="269" r:id="rId10"/>
-    <p:sldId id="273" r:id="rId11"/>
-    <p:sldId id="274" r:id="rId12"/>
-    <p:sldId id="275" r:id="rId13"/>
-    <p:sldId id="259" r:id="rId14"/>
-    <p:sldId id="260" r:id="rId15"/>
+    <p:sldId id="279" r:id="rId4"/>
+    <p:sldId id="280" r:id="rId5"/>
+    <p:sldId id="271" r:id="rId6"/>
+    <p:sldId id="261" r:id="rId7"/>
+    <p:sldId id="262" r:id="rId8"/>
+    <p:sldId id="263" r:id="rId9"/>
+    <p:sldId id="277" r:id="rId10"/>
+    <p:sldId id="267" r:id="rId11"/>
+    <p:sldId id="268" r:id="rId12"/>
+    <p:sldId id="269" r:id="rId13"/>
+    <p:sldId id="273" r:id="rId14"/>
+    <p:sldId id="278" r:id="rId15"/>
+    <p:sldId id="274" r:id="rId16"/>
+    <p:sldId id="259" r:id="rId17"/>
+    <p:sldId id="260" r:id="rId18"/>
   </p:sldIdLst>
   <p:sldSz cx="9144000" cy="6858000" type="screen4x3"/>
   <p:notesSz cx="6858000" cy="9144000"/>
@@ -131,6 +134,8 @@
         </p14:section>
         <p14:section name="Intro" id="{D8B685A9-0AAD-7543-883D-95E09FCFE2CC}">
           <p14:sldIdLst>
+            <p14:sldId id="279"/>
+            <p14:sldId id="280"/>
             <p14:sldId id="271"/>
           </p14:sldIdLst>
         </p14:section>
@@ -143,6 +148,7 @@
         </p14:section>
         <p14:section name="FW_SAG" id="{A060CDC7-3516-C04C-B4CD-7A06A2F3AF75}">
           <p14:sldIdLst>
+            <p14:sldId id="277"/>
             <p14:sldId id="267"/>
             <p14:sldId id="268"/>
             <p14:sldId id="269"/>
@@ -151,8 +157,8 @@
         </p14:section>
         <p14:section name="newQ selection" id="{D4EF7B4F-9358-EF46-9E72-ABD9447F9847}">
           <p14:sldIdLst>
+            <p14:sldId id="278"/>
             <p14:sldId id="274"/>
-            <p14:sldId id="275"/>
           </p14:sldIdLst>
         </p14:section>
         <p14:section name="newQ TB vs CB" id="{13BE6138-C886-F44C-B651-ED3CD75CCBC0}">
@@ -249,7 +255,7 @@
           <a:p>
             <a:fld id="{8DD126E3-FD87-804E-9B94-9466551D12C6}" type="datetimeFigureOut">
               <a:rPr lang="en-US" smtClean="0"/>
-              <a:t>10/26/16</a:t>
+              <a:t>10/27/16</a:t>
             </a:fld>
             <a:endParaRPr lang="en-US"/>
           </a:p>
@@ -601,6 +607,115 @@
 </p:notes>
 </file>
 
+<file path=ppt/notesSlides/notesSlide10.xml><?xml version="1.0" encoding="utf-8"?>
+<p:notes xmlns:a="http://schemas.openxmlformats.org/drawingml/2006/main" xmlns:r="http://schemas.openxmlformats.org/officeDocument/2006/relationships" xmlns:p="http://schemas.openxmlformats.org/presentationml/2006/main">
+  <p:cSld>
+    <p:spTree>
+      <p:nvGrpSpPr>
+        <p:cNvPr id="1" name=""/>
+        <p:cNvGrpSpPr/>
+        <p:nvPr/>
+      </p:nvGrpSpPr>
+      <p:grpSpPr>
+        <a:xfrm>
+          <a:off x="0" y="0"/>
+          <a:ext cx="0" cy="0"/>
+          <a:chOff x="0" y="0"/>
+          <a:chExt cx="0" cy="0"/>
+        </a:xfrm>
+      </p:grpSpPr>
+      <p:sp>
+        <p:nvSpPr>
+          <p:cNvPr id="2" name="Slide Image Placeholder 1"/>
+          <p:cNvSpPr>
+            <a:spLocks noGrp="1" noRot="1" noChangeAspect="1"/>
+          </p:cNvSpPr>
+          <p:nvPr>
+            <p:ph type="sldImg"/>
+          </p:nvPr>
+        </p:nvSpPr>
+        <p:spPr/>
+      </p:sp>
+      <p:sp>
+        <p:nvSpPr>
+          <p:cNvPr id="3" name="Notes Placeholder 2"/>
+          <p:cNvSpPr>
+            <a:spLocks noGrp="1"/>
+          </p:cNvSpPr>
+          <p:nvPr>
+            <p:ph type="body" idx="1"/>
+          </p:nvPr>
+        </p:nvSpPr>
+        <p:spPr/>
+        <p:txBody>
+          <a:bodyPr/>
+          <a:lstStyle/>
+          <a:p>
+            <a:r>
+              <a:rPr lang="en-US" dirty="0" smtClean="0"/>
+              <a:t>Mary</a:t>
+            </a:r>
+            <a:r>
+              <a:rPr lang="en-US" baseline="0" dirty="0" smtClean="0"/>
+              <a:t> Lake never mixes-</a:t>
+            </a:r>
+            <a:r>
+              <a:rPr lang="en-US" baseline="0" dirty="0" err="1" smtClean="0"/>
+              <a:t>meromictic</a:t>
+            </a:r>
+            <a:endParaRPr lang="en-US" baseline="0" dirty="0" smtClean="0"/>
+          </a:p>
+          <a:p>
+            <a:r>
+              <a:rPr lang="en-US" baseline="0" dirty="0" smtClean="0"/>
+              <a:t>Bog too?</a:t>
+            </a:r>
+          </a:p>
+          <a:p>
+            <a:r>
+              <a:rPr lang="en-US" dirty="0" smtClean="0"/>
+              <a:t>*Are there related sequence-discrete populations in TB and CB?  How closely related are they?  Do they share a common gene pool?  Are there genes present in one lake but not the other for these closely related populations? Is there an ecological or physical barrier to recombination between these two lakes?*</a:t>
+            </a:r>
+            <a:endParaRPr lang="en-US" dirty="0"/>
+          </a:p>
+        </p:txBody>
+      </p:sp>
+      <p:sp>
+        <p:nvSpPr>
+          <p:cNvPr id="4" name="Slide Number Placeholder 3"/>
+          <p:cNvSpPr>
+            <a:spLocks noGrp="1"/>
+          </p:cNvSpPr>
+          <p:nvPr>
+            <p:ph type="sldNum" sz="quarter" idx="10"/>
+          </p:nvPr>
+        </p:nvSpPr>
+        <p:spPr/>
+        <p:txBody>
+          <a:bodyPr/>
+          <a:lstStyle/>
+          <a:p>
+            <a:fld id="{E24C21EA-28B2-0442-AFB4-706342F125BD}" type="slidenum">
+              <a:rPr lang="en-US" smtClean="0"/>
+              <a:t>17</a:t>
+            </a:fld>
+            <a:endParaRPr lang="en-US"/>
+          </a:p>
+        </p:txBody>
+      </p:sp>
+    </p:spTree>
+    <p:extLst>
+      <p:ext uri="{BB962C8B-B14F-4D97-AF65-F5344CB8AC3E}">
+        <p14:creationId xmlns:p14="http://schemas.microsoft.com/office/powerpoint/2010/main" val="2502112913"/>
+      </p:ext>
+    </p:extLst>
+  </p:cSld>
+  <p:clrMapOvr>
+    <a:masterClrMapping/>
+  </p:clrMapOvr>
+</p:notes>
+</file>
+
 <file path=ppt/notesSlides/notesSlide2.xml><?xml version="1.0" encoding="utf-8"?>
 <p:notes xmlns:a="http://schemas.openxmlformats.org/drawingml/2006/main" xmlns:r="http://schemas.openxmlformats.org/officeDocument/2006/relationships" xmlns:p="http://schemas.openxmlformats.org/presentationml/2006/main">
   <p:cSld>
@@ -646,8 +761,70 @@
           <a:lstStyle/>
           <a:p>
             <a:r>
-              <a:rPr lang="en-US" dirty="0" smtClean="0"/>
-              <a:t>Lake Lanier to isolate genome</a:t>
+              <a:rPr lang="en-US" sz="1200" b="0" i="0" u="none" strike="noStrike" kern="1200" baseline="0" dirty="0" err="1" smtClean="0">
+                <a:solidFill>
+                  <a:schemeClr val="tx1"/>
+                </a:solidFill>
+                <a:latin typeface="+mn-lt"/>
+                <a:ea typeface="+mn-ea"/>
+                <a:cs typeface="+mn-cs"/>
+              </a:rPr>
+              <a:t>Azam</a:t>
+            </a:r>
+            <a:r>
+              <a:rPr lang="en-US" sz="1200" b="0" i="0" u="none" strike="noStrike" kern="1200" baseline="0" dirty="0" smtClean="0">
+                <a:solidFill>
+                  <a:schemeClr val="tx1"/>
+                </a:solidFill>
+                <a:latin typeface="+mn-lt"/>
+                <a:ea typeface="+mn-ea"/>
+                <a:cs typeface="+mn-cs"/>
+              </a:rPr>
+              <a:t> and </a:t>
+            </a:r>
+            <a:r>
+              <a:rPr lang="en-US" sz="1200" b="0" i="0" u="none" strike="noStrike" kern="1200" baseline="0" dirty="0" err="1" smtClean="0">
+                <a:solidFill>
+                  <a:schemeClr val="tx1"/>
+                </a:solidFill>
+                <a:latin typeface="+mn-lt"/>
+                <a:ea typeface="+mn-ea"/>
+                <a:cs typeface="+mn-cs"/>
+              </a:rPr>
+              <a:t>Malfatti</a:t>
+            </a:r>
+            <a:r>
+              <a:rPr lang="en-US" sz="1200" b="0" i="0" u="none" strike="noStrike" kern="1200" baseline="0" dirty="0" smtClean="0">
+                <a:solidFill>
+                  <a:schemeClr val="tx1"/>
+                </a:solidFill>
+                <a:latin typeface="+mn-lt"/>
+                <a:ea typeface="+mn-ea"/>
+                <a:cs typeface="+mn-cs"/>
+              </a:rPr>
+              <a:t> Nature Rev </a:t>
+            </a:r>
+            <a:r>
+              <a:rPr lang="en-US" sz="1200" b="0" i="0" u="none" strike="noStrike" kern="1200" baseline="0" dirty="0" err="1" smtClean="0">
+                <a:solidFill>
+                  <a:schemeClr val="tx1"/>
+                </a:solidFill>
+                <a:latin typeface="+mn-lt"/>
+                <a:ea typeface="+mn-ea"/>
+                <a:cs typeface="+mn-cs"/>
+              </a:rPr>
+              <a:t>Microbiol</a:t>
+            </a:r>
+            <a:r>
+              <a:rPr lang="en-US" sz="1200" b="0" i="0" u="none" strike="noStrike" kern="1200" baseline="0" dirty="0" smtClean="0">
+                <a:solidFill>
+                  <a:schemeClr val="tx1"/>
+                </a:solidFill>
+                <a:latin typeface="+mn-lt"/>
+                <a:ea typeface="+mn-ea"/>
+                <a:cs typeface="+mn-cs"/>
+              </a:rPr>
+              <a:t> 2007</a:t>
             </a:r>
             <a:endParaRPr lang="en-US" dirty="0"/>
           </a:p>
@@ -668,9 +845,9 @@
           <a:bodyPr/>
           <a:lstStyle/>
           <a:p>
-            <a:fld id="{03226FDB-C243-F04F-A3A4-63881AA9751B}" type="slidenum">
-              <a:rPr lang="en-US" smtClean="0"/>
-              <a:t>5</a:t>
+            <a:fld id="{35EF5441-D692-534E-884D-601F4C7E917A}" type="slidenum">
+              <a:rPr lang="en-US" smtClean="0"/>
+              <a:t>3</a:t>
             </a:fld>
             <a:endParaRPr lang="en-US"/>
           </a:p>
@@ -679,7 +856,7 @@
     </p:spTree>
     <p:extLst>
       <p:ext uri="{BB962C8B-B14F-4D97-AF65-F5344CB8AC3E}">
-        <p14:creationId xmlns:p14="http://schemas.microsoft.com/office/powerpoint/2010/main" val="1946951325"/>
+        <p14:creationId xmlns:p14="http://schemas.microsoft.com/office/powerpoint/2010/main" val="3718429866"/>
       </p:ext>
     </p:extLst>
   </p:cSld>
@@ -735,7 +912,7 @@
           <a:p>
             <a:r>
               <a:rPr lang="en-US" dirty="0" smtClean="0"/>
-              <a:t>This is with competitive</a:t>
+              <a:t>Lake Lanier to isolate genome</a:t>
             </a:r>
             <a:endParaRPr lang="en-US" dirty="0"/>
           </a:p>
@@ -758,7 +935,7 @@
           <a:p>
             <a:fld id="{03226FDB-C243-F04F-A3A4-63881AA9751B}" type="slidenum">
               <a:rPr lang="en-US" smtClean="0"/>
-              <a:t>10</a:t>
+              <a:t>7</a:t>
             </a:fld>
             <a:endParaRPr lang="en-US"/>
           </a:p>
@@ -767,7 +944,7 @@
     </p:spTree>
     <p:extLst>
       <p:ext uri="{BB962C8B-B14F-4D97-AF65-F5344CB8AC3E}">
-        <p14:creationId xmlns:p14="http://schemas.microsoft.com/office/powerpoint/2010/main" val="2542656754"/>
+        <p14:creationId xmlns:p14="http://schemas.microsoft.com/office/powerpoint/2010/main" val="1946951325"/>
       </p:ext>
     </p:extLst>
   </p:cSld>
@@ -823,26 +1000,11 @@
           <a:p>
             <a:r>
               <a:rPr lang="en-US" dirty="0" smtClean="0"/>
-              <a:t>TB</a:t>
+              <a:t>And the SAGs</a:t>
             </a:r>
             <a:r>
               <a:rPr lang="en-US" baseline="0" dirty="0" smtClean="0"/>
-              <a:t> – </a:t>
-            </a:r>
-            <a:r>
-              <a:rPr lang="en-US" baseline="0" dirty="0" err="1" smtClean="0"/>
-              <a:t>Dimictic</a:t>
-            </a:r>
-            <a:endParaRPr lang="en-US" baseline="0" dirty="0" smtClean="0"/>
-          </a:p>
-          <a:p>
-            <a:r>
-              <a:rPr lang="en-US" baseline="0" dirty="0" smtClean="0"/>
-              <a:t>CB -- </a:t>
-            </a:r>
-            <a:r>
-              <a:rPr lang="en-US" baseline="0" dirty="0" err="1" smtClean="0"/>
-              <a:t>Polymictic</a:t>
+              <a:t> from other lakes don’t many recruit reads with high ID</a:t>
             </a:r>
             <a:endParaRPr lang="en-US" dirty="0"/>
           </a:p>
@@ -863,9 +1025,9 @@
           <a:bodyPr/>
           <a:lstStyle/>
           <a:p>
-            <a:fld id="{E24C21EA-28B2-0442-AFB4-706342F125BD}" type="slidenum">
-              <a:rPr lang="en-US" smtClean="0"/>
-              <a:t>13</a:t>
+            <a:fld id="{03226FDB-C243-F04F-A3A4-63881AA9751B}" type="slidenum">
+              <a:rPr lang="en-US" smtClean="0"/>
+              <a:t>10</a:t>
             </a:fld>
             <a:endParaRPr lang="en-US"/>
           </a:p>
@@ -874,7 +1036,7 @@
     </p:spTree>
     <p:extLst>
       <p:ext uri="{BB962C8B-B14F-4D97-AF65-F5344CB8AC3E}">
-        <p14:creationId xmlns:p14="http://schemas.microsoft.com/office/powerpoint/2010/main" val="37004290"/>
+        <p14:creationId xmlns:p14="http://schemas.microsoft.com/office/powerpoint/2010/main" val="506349480"/>
       </p:ext>
     </p:extLst>
   </p:cSld>
@@ -930,32 +1092,487 @@
           <a:p>
             <a:r>
               <a:rPr lang="en-US" dirty="0" smtClean="0"/>
-              <a:t>Mary</a:t>
+              <a:t>The</a:t>
             </a:r>
             <a:r>
               <a:rPr lang="en-US" baseline="0" dirty="0" smtClean="0"/>
-              <a:t> Lake never mixes-</a:t>
+              <a:t> two Sparkling metagenomes</a:t>
+            </a:r>
+          </a:p>
+          <a:p>
+            <a:r>
+              <a:rPr lang="en-US" baseline="0" dirty="0" smtClean="0"/>
+              <a:t>LD12 are in earlier stages of differentiation?</a:t>
+            </a:r>
+            <a:endParaRPr lang="en-US" dirty="0"/>
+          </a:p>
+        </p:txBody>
+      </p:sp>
+      <p:sp>
+        <p:nvSpPr>
+          <p:cNvPr id="4" name="Slide Number Placeholder 3"/>
+          <p:cNvSpPr>
+            <a:spLocks noGrp="1"/>
+          </p:cNvSpPr>
+          <p:nvPr>
+            <p:ph type="sldNum" sz="quarter" idx="10"/>
+          </p:nvPr>
+        </p:nvSpPr>
+        <p:spPr/>
+        <p:txBody>
+          <a:bodyPr/>
+          <a:lstStyle/>
+          <a:p>
+            <a:fld id="{03226FDB-C243-F04F-A3A4-63881AA9751B}" type="slidenum">
+              <a:rPr lang="en-US" smtClean="0"/>
+              <a:t>11</a:t>
+            </a:fld>
+            <a:endParaRPr lang="en-US"/>
+          </a:p>
+        </p:txBody>
+      </p:sp>
+    </p:spTree>
+    <p:extLst>
+      <p:ext uri="{BB962C8B-B14F-4D97-AF65-F5344CB8AC3E}">
+        <p14:creationId xmlns:p14="http://schemas.microsoft.com/office/powerpoint/2010/main" val="3274481667"/>
+      </p:ext>
+    </p:extLst>
+  </p:cSld>
+  <p:clrMapOvr>
+    <a:masterClrMapping/>
+  </p:clrMapOvr>
+</p:notes>
+</file>
+
+<file path=ppt/notesSlides/notesSlide6.xml><?xml version="1.0" encoding="utf-8"?>
+<p:notes xmlns:a="http://schemas.openxmlformats.org/drawingml/2006/main" xmlns:r="http://schemas.openxmlformats.org/officeDocument/2006/relationships" xmlns:p="http://schemas.openxmlformats.org/presentationml/2006/main">
+  <p:cSld>
+    <p:spTree>
+      <p:nvGrpSpPr>
+        <p:cNvPr id="1" name=""/>
+        <p:cNvGrpSpPr/>
+        <p:nvPr/>
+      </p:nvGrpSpPr>
+      <p:grpSpPr>
+        <a:xfrm>
+          <a:off x="0" y="0"/>
+          <a:ext cx="0" cy="0"/>
+          <a:chOff x="0" y="0"/>
+          <a:chExt cx="0" cy="0"/>
+        </a:xfrm>
+      </p:grpSpPr>
+      <p:sp>
+        <p:nvSpPr>
+          <p:cNvPr id="2" name="Slide Image Placeholder 1"/>
+          <p:cNvSpPr>
+            <a:spLocks noGrp="1" noRot="1" noChangeAspect="1"/>
+          </p:cNvSpPr>
+          <p:nvPr>
+            <p:ph type="sldImg"/>
+          </p:nvPr>
+        </p:nvSpPr>
+        <p:spPr/>
+      </p:sp>
+      <p:sp>
+        <p:nvSpPr>
+          <p:cNvPr id="3" name="Notes Placeholder 2"/>
+          <p:cNvSpPr>
+            <a:spLocks noGrp="1"/>
+          </p:cNvSpPr>
+          <p:nvPr>
+            <p:ph type="body" idx="1"/>
+          </p:nvPr>
+        </p:nvSpPr>
+        <p:spPr/>
+        <p:txBody>
+          <a:bodyPr/>
+          <a:lstStyle/>
+          <a:p>
+            <a:r>
+              <a:rPr lang="en-US" dirty="0" smtClean="0"/>
+              <a:t>This is with </a:t>
+            </a:r>
+            <a:r>
+              <a:rPr lang="en-US" dirty="0" smtClean="0"/>
+              <a:t>competitive</a:t>
+            </a:r>
+          </a:p>
+          <a:p>
+            <a:endParaRPr lang="en-US" dirty="0" smtClean="0"/>
+          </a:p>
+          <a:p>
+            <a:r>
+              <a:rPr lang="en-US" sz="1200" kern="1200" dirty="0" err="1" smtClean="0">
+                <a:solidFill>
+                  <a:schemeClr val="tx1"/>
+                </a:solidFill>
+                <a:effectLst/>
+                <a:latin typeface="+mn-lt"/>
+                <a:ea typeface="+mn-ea"/>
+                <a:cs typeface="+mn-cs"/>
+              </a:rPr>
+              <a:t>Abund</a:t>
+            </a:r>
+            <a:r>
+              <a:rPr lang="en-US" sz="1200" kern="1200" dirty="0" smtClean="0">
+                <a:solidFill>
+                  <a:schemeClr val="tx1"/>
+                </a:solidFill>
+                <a:effectLst/>
+                <a:latin typeface="+mn-lt"/>
+                <a:ea typeface="+mn-ea"/>
+                <a:cs typeface="+mn-cs"/>
+              </a:rPr>
+              <a:t> of J17 poorly correlated with the other acI-B1 L06 and A23 (maximum Spearman rank correlation = 0.294)</a:t>
+            </a:r>
+            <a:r>
+              <a:rPr lang="en-US" dirty="0" smtClean="0">
+                <a:effectLst/>
+              </a:rPr>
+              <a:t> </a:t>
+            </a:r>
+          </a:p>
+          <a:p>
+            <a:endParaRPr lang="en-US" dirty="0" smtClean="0">
+              <a:effectLst/>
+            </a:endParaRPr>
+          </a:p>
+          <a:p>
+            <a:r>
+              <a:rPr lang="en-US" sz="1200" kern="1200" dirty="0" err="1" smtClean="0">
+                <a:solidFill>
+                  <a:schemeClr val="tx1"/>
+                </a:solidFill>
+                <a:effectLst/>
+                <a:latin typeface="+mn-lt"/>
+                <a:ea typeface="+mn-ea"/>
+                <a:cs typeface="+mn-cs"/>
+              </a:rPr>
+              <a:t>Abund</a:t>
+            </a:r>
+            <a:r>
+              <a:rPr lang="en-US" sz="1200" kern="1200" dirty="0" smtClean="0">
+                <a:solidFill>
+                  <a:schemeClr val="tx1"/>
+                </a:solidFill>
+                <a:effectLst/>
+                <a:latin typeface="+mn-lt"/>
+                <a:ea typeface="+mn-ea"/>
+                <a:cs typeface="+mn-cs"/>
+              </a:rPr>
+              <a:t> of J10, L15, and C06 strongly correlated (Spearman rank correlation = 0.997-0.999). D10 not as strongly correlated to the other LD12 populations (Spearman rank correlation = 0.712-0.725). C07 was also correlated to both the J10-L15-C06 populations and the D10 population (Spearman rank correlation = 0.861-0.873)</a:t>
+            </a:r>
+            <a:r>
+              <a:rPr lang="en-US" dirty="0" smtClean="0">
+                <a:effectLst/>
+              </a:rPr>
+              <a:t> </a:t>
+            </a:r>
+            <a:r>
+              <a:rPr lang="en-US" baseline="0" dirty="0">
+                <a:effectLst/>
+              </a:rPr>
+              <a:t> </a:t>
+            </a:r>
+            <a:r>
+              <a:rPr lang="en-US" baseline="0" dirty="0" smtClean="0">
+                <a:effectLst/>
+              </a:rPr>
+              <a:t>- lowest correlation within LD12 (0.</a:t>
+            </a:r>
+            <a:r>
+              <a:rPr lang="en-US" sz="1200" kern="1200" dirty="0" smtClean="0">
+                <a:solidFill>
+                  <a:schemeClr val="tx1"/>
+                </a:solidFill>
+                <a:effectLst/>
+                <a:latin typeface="+mn-lt"/>
+                <a:ea typeface="+mn-ea"/>
+                <a:cs typeface="+mn-cs"/>
+              </a:rPr>
+              <a:t>712)</a:t>
+            </a:r>
+            <a:endParaRPr lang="en-US" dirty="0" smtClean="0">
+              <a:effectLst/>
+            </a:endParaRPr>
+          </a:p>
+        </p:txBody>
+      </p:sp>
+      <p:sp>
+        <p:nvSpPr>
+          <p:cNvPr id="4" name="Slide Number Placeholder 3"/>
+          <p:cNvSpPr>
+            <a:spLocks noGrp="1"/>
+          </p:cNvSpPr>
+          <p:nvPr>
+            <p:ph type="sldNum" sz="quarter" idx="10"/>
+          </p:nvPr>
+        </p:nvSpPr>
+        <p:spPr/>
+        <p:txBody>
+          <a:bodyPr/>
+          <a:lstStyle/>
+          <a:p>
+            <a:fld id="{03226FDB-C243-F04F-A3A4-63881AA9751B}" type="slidenum">
+              <a:rPr lang="en-US" smtClean="0"/>
+              <a:t>13</a:t>
+            </a:fld>
+            <a:endParaRPr lang="en-US"/>
+          </a:p>
+        </p:txBody>
+      </p:sp>
+    </p:spTree>
+    <p:extLst>
+      <p:ext uri="{BB962C8B-B14F-4D97-AF65-F5344CB8AC3E}">
+        <p14:creationId xmlns:p14="http://schemas.microsoft.com/office/powerpoint/2010/main" val="2542656754"/>
+      </p:ext>
+    </p:extLst>
+  </p:cSld>
+  <p:clrMapOvr>
+    <a:masterClrMapping/>
+  </p:clrMapOvr>
+</p:notes>
+</file>
+
+<file path=ppt/notesSlides/notesSlide7.xml><?xml version="1.0" encoding="utf-8"?>
+<p:notes xmlns:a="http://schemas.openxmlformats.org/drawingml/2006/main" xmlns:r="http://schemas.openxmlformats.org/officeDocument/2006/relationships" xmlns:p="http://schemas.openxmlformats.org/presentationml/2006/main">
+  <p:cSld>
+    <p:spTree>
+      <p:nvGrpSpPr>
+        <p:cNvPr id="1" name=""/>
+        <p:cNvGrpSpPr/>
+        <p:nvPr/>
+      </p:nvGrpSpPr>
+      <p:grpSpPr>
+        <a:xfrm>
+          <a:off x="0" y="0"/>
+          <a:ext cx="0" cy="0"/>
+          <a:chOff x="0" y="0"/>
+          <a:chExt cx="0" cy="0"/>
+        </a:xfrm>
+      </p:grpSpPr>
+      <p:sp>
+        <p:nvSpPr>
+          <p:cNvPr id="2" name="Slide Image Placeholder 1"/>
+          <p:cNvSpPr>
+            <a:spLocks noGrp="1" noRot="1" noChangeAspect="1"/>
+          </p:cNvSpPr>
+          <p:nvPr>
+            <p:ph type="sldImg"/>
+          </p:nvPr>
+        </p:nvSpPr>
+        <p:spPr/>
+      </p:sp>
+      <p:sp>
+        <p:nvSpPr>
+          <p:cNvPr id="3" name="Notes Placeholder 2"/>
+          <p:cNvSpPr>
+            <a:spLocks noGrp="1"/>
+          </p:cNvSpPr>
+          <p:nvPr>
+            <p:ph type="body" idx="1"/>
+          </p:nvPr>
+        </p:nvSpPr>
+        <p:spPr/>
+        <p:txBody>
+          <a:bodyPr/>
+          <a:lstStyle/>
+          <a:p>
+            <a:r>
+              <a:rPr lang="en-US" dirty="0" err="1" smtClean="0"/>
+              <a:t>Neg</a:t>
+            </a:r>
+            <a:r>
+              <a:rPr lang="en-US" dirty="0" smtClean="0"/>
+              <a:t>/purifying </a:t>
+            </a:r>
+            <a:r>
+              <a:rPr lang="mr-IN" dirty="0" smtClean="0"/>
+              <a:t>–</a:t>
+            </a:r>
+            <a:r>
+              <a:rPr lang="en-US" dirty="0" smtClean="0"/>
+              <a:t> remove deleterious alleles </a:t>
+            </a:r>
+            <a:r>
+              <a:rPr lang="mr-IN" dirty="0" smtClean="0"/>
+              <a:t>–</a:t>
+            </a:r>
+            <a:r>
+              <a:rPr lang="en-US" dirty="0" smtClean="0"/>
+              <a:t> </a:t>
+            </a:r>
+            <a:r>
+              <a:rPr lang="en-US" dirty="0" err="1" smtClean="0"/>
+              <a:t>dnds</a:t>
+            </a:r>
+            <a:r>
+              <a:rPr lang="en-US" dirty="0" smtClean="0"/>
+              <a:t> &lt;1???</a:t>
+            </a:r>
+          </a:p>
+          <a:p>
+            <a:r>
+              <a:rPr lang="en-US" dirty="0" err="1" smtClean="0"/>
+              <a:t>Pos</a:t>
+            </a:r>
+            <a:r>
+              <a:rPr lang="en-US" dirty="0" smtClean="0"/>
+              <a:t>/</a:t>
+            </a:r>
+            <a:r>
+              <a:rPr lang="en-US" dirty="0" err="1" smtClean="0"/>
+              <a:t>darwinian</a:t>
+            </a:r>
+            <a:r>
+              <a:rPr lang="en-US" baseline="0" dirty="0" smtClean="0"/>
+              <a:t> </a:t>
+            </a:r>
+            <a:r>
+              <a:rPr lang="mr-IN" baseline="0" dirty="0" smtClean="0"/>
+              <a:t>–</a:t>
+            </a:r>
+            <a:r>
+              <a:rPr lang="en-US" baseline="0" dirty="0" smtClean="0"/>
+              <a:t> advantageous alleles go to fixation </a:t>
+            </a:r>
+            <a:r>
+              <a:rPr lang="mr-IN" baseline="0" dirty="0" smtClean="0"/>
+              <a:t>–</a:t>
+            </a:r>
+            <a:r>
+              <a:rPr lang="en-US" baseline="0" dirty="0" smtClean="0"/>
+              <a:t> </a:t>
             </a:r>
             <a:r>
               <a:rPr lang="en-US" baseline="0" dirty="0" err="1" smtClean="0"/>
-              <a:t>meromictic</a:t>
-            </a:r>
-            <a:endParaRPr lang="en-US" baseline="0" dirty="0" smtClean="0"/>
-          </a:p>
-          <a:p>
+              <a:t>dnds</a:t>
+            </a:r>
             <a:r>
               <a:rPr lang="en-US" baseline="0" dirty="0" smtClean="0"/>
-              <a:t>Bog too</a:t>
-            </a:r>
+              <a:t> &gt; 1</a:t>
+            </a:r>
+          </a:p>
+          <a:p>
             <a:r>
               <a:rPr lang="en-US" baseline="0" dirty="0" smtClean="0"/>
-              <a:t>?</a:t>
-            </a:r>
-          </a:p>
-          <a:p>
-            <a:r>
-              <a:rPr lang="en-US" dirty="0" smtClean="0"/>
-              <a:t>*Are there related sequence-discrete populations in TB and CB?  How closely related are they?  Do they share a common gene pool?  Are there genes present in one lake but not the other for these closely related populations? Is there an ecological or physical barrier to recombination between these two lakes?*</a:t>
+              <a:t>McDonald-</a:t>
+            </a:r>
+            <a:r>
+              <a:rPr lang="en-US" baseline="0" dirty="0" err="1" smtClean="0"/>
+              <a:t>Kreitman</a:t>
+            </a:r>
+            <a:r>
+              <a:rPr lang="en-US" baseline="0" dirty="0" smtClean="0"/>
+              <a:t> test </a:t>
+            </a:r>
+            <a:r>
+              <a:rPr lang="mr-IN" baseline="0" dirty="0" smtClean="0"/>
+              <a:t>–</a:t>
+            </a:r>
+            <a:r>
+              <a:rPr lang="en-US" baseline="0" dirty="0" smtClean="0"/>
+              <a:t> </a:t>
+            </a:r>
+            <a:r>
+              <a:rPr lang="en-US" baseline="0" dirty="0" err="1" smtClean="0"/>
+              <a:t>Dn</a:t>
+            </a:r>
+            <a:r>
+              <a:rPr lang="en-US" baseline="0" dirty="0" smtClean="0"/>
+              <a:t>/Ds to </a:t>
+            </a:r>
+            <a:r>
+              <a:rPr lang="en-US" baseline="0" dirty="0" err="1" smtClean="0"/>
+              <a:t>Pn</a:t>
+            </a:r>
+            <a:r>
+              <a:rPr lang="en-US" baseline="0" dirty="0" smtClean="0"/>
+              <a:t>/Ps (test for selection within species/ populations?)</a:t>
+            </a:r>
+          </a:p>
+          <a:p>
+            <a:r>
+              <a:rPr lang="en-US" baseline="0" dirty="0" smtClean="0"/>
+              <a:t>	- </a:t>
+            </a:r>
+            <a:r>
+              <a:rPr lang="en-US" baseline="0" dirty="0" err="1" smtClean="0"/>
+              <a:t>DnDs</a:t>
+            </a:r>
+            <a:r>
+              <a:rPr lang="en-US" baseline="0" dirty="0" smtClean="0"/>
+              <a:t> &gt; PnPs  </a:t>
+            </a:r>
+            <a:r>
+              <a:rPr lang="en-US" baseline="0" dirty="0" smtClean="0">
+                <a:sym typeface="Wingdings"/>
+              </a:rPr>
+              <a:t>positive selection</a:t>
+            </a:r>
+          </a:p>
+          <a:p>
+            <a:r>
+              <a:rPr lang="en-US" baseline="0" dirty="0" smtClean="0">
+                <a:sym typeface="Wingdings"/>
+              </a:rPr>
+              <a:t>	- </a:t>
+            </a:r>
+            <a:r>
+              <a:rPr lang="en-US" baseline="0" dirty="0" err="1" smtClean="0">
+                <a:sym typeface="Wingdings"/>
+              </a:rPr>
+              <a:t>DnDs</a:t>
+            </a:r>
+            <a:r>
+              <a:rPr lang="en-US" baseline="0" dirty="0" smtClean="0">
+                <a:sym typeface="Wingdings"/>
+              </a:rPr>
+              <a:t> &lt; </a:t>
+            </a:r>
+            <a:r>
+              <a:rPr lang="en-US" baseline="0" dirty="0" err="1" smtClean="0">
+                <a:sym typeface="Wingdings"/>
+              </a:rPr>
+              <a:t>PnPS</a:t>
+            </a:r>
+            <a:r>
+              <a:rPr lang="en-US" baseline="0" dirty="0" smtClean="0">
+                <a:sym typeface="Wingdings"/>
+              </a:rPr>
+              <a:t>  negative selection</a:t>
+            </a:r>
+          </a:p>
+          <a:p>
+            <a:r>
+              <a:rPr lang="en-US" baseline="0" dirty="0" smtClean="0">
+                <a:sym typeface="Wingdings"/>
+              </a:rPr>
+              <a:t>	- alpha (prop of </a:t>
+            </a:r>
+            <a:r>
+              <a:rPr lang="en-US" baseline="0" dirty="0" err="1" smtClean="0">
+                <a:sym typeface="Wingdings"/>
+              </a:rPr>
+              <a:t>nonsyn</a:t>
+            </a:r>
+            <a:r>
+              <a:rPr lang="en-US" baseline="0" dirty="0" smtClean="0">
+                <a:sym typeface="Wingdings"/>
+              </a:rPr>
+              <a:t> subs under </a:t>
+            </a:r>
+            <a:r>
+              <a:rPr lang="en-US" baseline="0" dirty="0" err="1" smtClean="0">
+                <a:sym typeface="Wingdings"/>
+              </a:rPr>
+              <a:t>pos</a:t>
+            </a:r>
+            <a:r>
+              <a:rPr lang="en-US" baseline="0" dirty="0" smtClean="0">
+                <a:sym typeface="Wingdings"/>
+              </a:rPr>
+              <a:t> select) calculated for each gene or genome-wide</a:t>
             </a:r>
             <a:endParaRPr lang="en-US" dirty="0"/>
           </a:p>
@@ -976,7 +1593,7 @@
           <a:bodyPr/>
           <a:lstStyle/>
           <a:p>
-            <a:fld id="{E24C21EA-28B2-0442-AFB4-706342F125BD}" type="slidenum">
+            <a:fld id="{03226FDB-C243-F04F-A3A4-63881AA9751B}" type="slidenum">
               <a:rPr lang="en-US" smtClean="0"/>
               <a:t>14</a:t>
             </a:fld>
@@ -987,7 +1604,206 @@
     </p:spTree>
     <p:extLst>
       <p:ext uri="{BB962C8B-B14F-4D97-AF65-F5344CB8AC3E}">
-        <p14:creationId xmlns:p14="http://schemas.microsoft.com/office/powerpoint/2010/main" val="2502112913"/>
+        <p14:creationId xmlns:p14="http://schemas.microsoft.com/office/powerpoint/2010/main" val="1200613775"/>
+      </p:ext>
+    </p:extLst>
+  </p:cSld>
+  <p:clrMapOvr>
+    <a:masterClrMapping/>
+  </p:clrMapOvr>
+</p:notes>
+</file>
+
+<file path=ppt/notesSlides/notesSlide8.xml><?xml version="1.0" encoding="utf-8"?>
+<p:notes xmlns:a="http://schemas.openxmlformats.org/drawingml/2006/main" xmlns:r="http://schemas.openxmlformats.org/officeDocument/2006/relationships" xmlns:p="http://schemas.openxmlformats.org/presentationml/2006/main">
+  <p:cSld>
+    <p:spTree>
+      <p:nvGrpSpPr>
+        <p:cNvPr id="1" name=""/>
+        <p:cNvGrpSpPr/>
+        <p:nvPr/>
+      </p:nvGrpSpPr>
+      <p:grpSpPr>
+        <a:xfrm>
+          <a:off x="0" y="0"/>
+          <a:ext cx="0" cy="0"/>
+          <a:chOff x="0" y="0"/>
+          <a:chExt cx="0" cy="0"/>
+        </a:xfrm>
+      </p:grpSpPr>
+      <p:sp>
+        <p:nvSpPr>
+          <p:cNvPr id="2" name="Slide Image Placeholder 1"/>
+          <p:cNvSpPr>
+            <a:spLocks noGrp="1" noRot="1" noChangeAspect="1"/>
+          </p:cNvSpPr>
+          <p:nvPr>
+            <p:ph type="sldImg"/>
+          </p:nvPr>
+        </p:nvSpPr>
+        <p:spPr/>
+      </p:sp>
+      <p:sp>
+        <p:nvSpPr>
+          <p:cNvPr id="3" name="Notes Placeholder 2"/>
+          <p:cNvSpPr>
+            <a:spLocks noGrp="1"/>
+          </p:cNvSpPr>
+          <p:nvPr>
+            <p:ph type="body" idx="1"/>
+          </p:nvPr>
+        </p:nvSpPr>
+        <p:spPr/>
+        <p:txBody>
+          <a:bodyPr/>
+          <a:lstStyle/>
+          <a:p>
+            <a:r>
+              <a:rPr lang="en-US" dirty="0" smtClean="0"/>
+              <a:t>Do the SNPs</a:t>
+            </a:r>
+            <a:r>
+              <a:rPr lang="en-US" baseline="0" dirty="0" smtClean="0"/>
+              <a:t> change as expected based on the selection values though time?</a:t>
+            </a:r>
+            <a:endParaRPr lang="en-US" dirty="0"/>
+          </a:p>
+        </p:txBody>
+      </p:sp>
+      <p:sp>
+        <p:nvSpPr>
+          <p:cNvPr id="4" name="Slide Number Placeholder 3"/>
+          <p:cNvSpPr>
+            <a:spLocks noGrp="1"/>
+          </p:cNvSpPr>
+          <p:nvPr>
+            <p:ph type="sldNum" sz="quarter" idx="10"/>
+          </p:nvPr>
+        </p:nvSpPr>
+        <p:spPr/>
+        <p:txBody>
+          <a:bodyPr/>
+          <a:lstStyle/>
+          <a:p>
+            <a:fld id="{03226FDB-C243-F04F-A3A4-63881AA9751B}" type="slidenum">
+              <a:rPr lang="en-US" smtClean="0"/>
+              <a:t>15</a:t>
+            </a:fld>
+            <a:endParaRPr lang="en-US"/>
+          </a:p>
+        </p:txBody>
+      </p:sp>
+    </p:spTree>
+    <p:extLst>
+      <p:ext uri="{BB962C8B-B14F-4D97-AF65-F5344CB8AC3E}">
+        <p14:creationId xmlns:p14="http://schemas.microsoft.com/office/powerpoint/2010/main" val="1614294500"/>
+      </p:ext>
+    </p:extLst>
+  </p:cSld>
+  <p:clrMapOvr>
+    <a:masterClrMapping/>
+  </p:clrMapOvr>
+</p:notes>
+</file>
+
+<file path=ppt/notesSlides/notesSlide9.xml><?xml version="1.0" encoding="utf-8"?>
+<p:notes xmlns:a="http://schemas.openxmlformats.org/drawingml/2006/main" xmlns:r="http://schemas.openxmlformats.org/officeDocument/2006/relationships" xmlns:p="http://schemas.openxmlformats.org/presentationml/2006/main">
+  <p:cSld>
+    <p:spTree>
+      <p:nvGrpSpPr>
+        <p:cNvPr id="1" name=""/>
+        <p:cNvGrpSpPr/>
+        <p:nvPr/>
+      </p:nvGrpSpPr>
+      <p:grpSpPr>
+        <a:xfrm>
+          <a:off x="0" y="0"/>
+          <a:ext cx="0" cy="0"/>
+          <a:chOff x="0" y="0"/>
+          <a:chExt cx="0" cy="0"/>
+        </a:xfrm>
+      </p:grpSpPr>
+      <p:sp>
+        <p:nvSpPr>
+          <p:cNvPr id="2" name="Slide Image Placeholder 1"/>
+          <p:cNvSpPr>
+            <a:spLocks noGrp="1" noRot="1" noChangeAspect="1"/>
+          </p:cNvSpPr>
+          <p:nvPr>
+            <p:ph type="sldImg"/>
+          </p:nvPr>
+        </p:nvSpPr>
+        <p:spPr/>
+      </p:sp>
+      <p:sp>
+        <p:nvSpPr>
+          <p:cNvPr id="3" name="Notes Placeholder 2"/>
+          <p:cNvSpPr>
+            <a:spLocks noGrp="1"/>
+          </p:cNvSpPr>
+          <p:nvPr>
+            <p:ph type="body" idx="1"/>
+          </p:nvPr>
+        </p:nvSpPr>
+        <p:spPr/>
+        <p:txBody>
+          <a:bodyPr/>
+          <a:lstStyle/>
+          <a:p>
+            <a:r>
+              <a:rPr lang="en-US" dirty="0" smtClean="0"/>
+              <a:t>TB</a:t>
+            </a:r>
+            <a:r>
+              <a:rPr lang="en-US" baseline="0" dirty="0" smtClean="0"/>
+              <a:t> – </a:t>
+            </a:r>
+            <a:r>
+              <a:rPr lang="en-US" baseline="0" dirty="0" err="1" smtClean="0"/>
+              <a:t>Dimictic</a:t>
+            </a:r>
+            <a:endParaRPr lang="en-US" baseline="0" dirty="0" smtClean="0"/>
+          </a:p>
+          <a:p>
+            <a:r>
+              <a:rPr lang="en-US" baseline="0" dirty="0" smtClean="0"/>
+              <a:t>CB -- </a:t>
+            </a:r>
+            <a:r>
+              <a:rPr lang="en-US" baseline="0" dirty="0" err="1" smtClean="0"/>
+              <a:t>Polymictic</a:t>
+            </a:r>
+            <a:endParaRPr lang="en-US" dirty="0"/>
+          </a:p>
+        </p:txBody>
+      </p:sp>
+      <p:sp>
+        <p:nvSpPr>
+          <p:cNvPr id="4" name="Slide Number Placeholder 3"/>
+          <p:cNvSpPr>
+            <a:spLocks noGrp="1"/>
+          </p:cNvSpPr>
+          <p:nvPr>
+            <p:ph type="sldNum" sz="quarter" idx="10"/>
+          </p:nvPr>
+        </p:nvSpPr>
+        <p:spPr/>
+        <p:txBody>
+          <a:bodyPr/>
+          <a:lstStyle/>
+          <a:p>
+            <a:fld id="{E24C21EA-28B2-0442-AFB4-706342F125BD}" type="slidenum">
+              <a:rPr lang="en-US" smtClean="0"/>
+              <a:t>16</a:t>
+            </a:fld>
+            <a:endParaRPr lang="en-US"/>
+          </a:p>
+        </p:txBody>
+      </p:sp>
+    </p:spTree>
+    <p:extLst>
+      <p:ext uri="{BB962C8B-B14F-4D97-AF65-F5344CB8AC3E}">
+        <p14:creationId xmlns:p14="http://schemas.microsoft.com/office/powerpoint/2010/main" val="37004290"/>
       </p:ext>
     </p:extLst>
   </p:cSld>
@@ -1178,7 +1994,7 @@
           <a:p>
             <a:fld id="{C2CEE717-EDC7-3148-8218-36A4F68267A5}" type="datetimeFigureOut">
               <a:rPr lang="en-US" smtClean="0"/>
-              <a:t>10/26/16</a:t>
+              <a:t>10/27/16</a:t>
             </a:fld>
             <a:endParaRPr lang="en-US"/>
           </a:p>
@@ -1348,7 +2164,7 @@
           <a:p>
             <a:fld id="{C2CEE717-EDC7-3148-8218-36A4F68267A5}" type="datetimeFigureOut">
               <a:rPr lang="en-US" smtClean="0"/>
-              <a:t>10/26/16</a:t>
+              <a:t>10/27/16</a:t>
             </a:fld>
             <a:endParaRPr lang="en-US"/>
           </a:p>
@@ -1528,7 +2344,7 @@
           <a:p>
             <a:fld id="{C2CEE717-EDC7-3148-8218-36A4F68267A5}" type="datetimeFigureOut">
               <a:rPr lang="en-US" smtClean="0"/>
-              <a:t>10/26/16</a:t>
+              <a:t>10/27/16</a:t>
             </a:fld>
             <a:endParaRPr lang="en-US"/>
           </a:p>
@@ -1698,7 +2514,7 @@
           <a:p>
             <a:fld id="{C2CEE717-EDC7-3148-8218-36A4F68267A5}" type="datetimeFigureOut">
               <a:rPr lang="en-US" smtClean="0"/>
-              <a:t>10/26/16</a:t>
+              <a:t>10/27/16</a:t>
             </a:fld>
             <a:endParaRPr lang="en-US"/>
           </a:p>
@@ -1944,7 +2760,7 @@
           <a:p>
             <a:fld id="{C2CEE717-EDC7-3148-8218-36A4F68267A5}" type="datetimeFigureOut">
               <a:rPr lang="en-US" smtClean="0"/>
-              <a:t>10/26/16</a:t>
+              <a:t>10/27/16</a:t>
             </a:fld>
             <a:endParaRPr lang="en-US"/>
           </a:p>
@@ -2232,7 +3048,7 @@
           <a:p>
             <a:fld id="{C2CEE717-EDC7-3148-8218-36A4F68267A5}" type="datetimeFigureOut">
               <a:rPr lang="en-US" smtClean="0"/>
-              <a:t>10/26/16</a:t>
+              <a:t>10/27/16</a:t>
             </a:fld>
             <a:endParaRPr lang="en-US"/>
           </a:p>
@@ -2654,7 +3470,7 @@
           <a:p>
             <a:fld id="{C2CEE717-EDC7-3148-8218-36A4F68267A5}" type="datetimeFigureOut">
               <a:rPr lang="en-US" smtClean="0"/>
-              <a:t>10/26/16</a:t>
+              <a:t>10/27/16</a:t>
             </a:fld>
             <a:endParaRPr lang="en-US"/>
           </a:p>
@@ -2772,7 +3588,7 @@
           <a:p>
             <a:fld id="{C2CEE717-EDC7-3148-8218-36A4F68267A5}" type="datetimeFigureOut">
               <a:rPr lang="en-US" smtClean="0"/>
-              <a:t>10/26/16</a:t>
+              <a:t>10/27/16</a:t>
             </a:fld>
             <a:endParaRPr lang="en-US"/>
           </a:p>
@@ -2867,7 +3683,7 @@
           <a:p>
             <a:fld id="{C2CEE717-EDC7-3148-8218-36A4F68267A5}" type="datetimeFigureOut">
               <a:rPr lang="en-US" smtClean="0"/>
-              <a:t>10/26/16</a:t>
+              <a:t>10/27/16</a:t>
             </a:fld>
             <a:endParaRPr lang="en-US"/>
           </a:p>
@@ -3144,7 +3960,7 @@
           <a:p>
             <a:fld id="{C2CEE717-EDC7-3148-8218-36A4F68267A5}" type="datetimeFigureOut">
               <a:rPr lang="en-US" smtClean="0"/>
-              <a:t>10/26/16</a:t>
+              <a:t>10/27/16</a:t>
             </a:fld>
             <a:endParaRPr lang="en-US"/>
           </a:p>
@@ -3397,7 +4213,7 @@
           <a:p>
             <a:fld id="{C2CEE717-EDC7-3148-8218-36A4F68267A5}" type="datetimeFigureOut">
               <a:rPr lang="en-US" smtClean="0"/>
-              <a:t>10/26/16</a:t>
+              <a:t>10/27/16</a:t>
             </a:fld>
             <a:endParaRPr lang="en-US"/>
           </a:p>
@@ -3610,7 +4426,7 @@
           <a:p>
             <a:fld id="{C2CEE717-EDC7-3148-8218-36A4F68267A5}" type="datetimeFigureOut">
               <a:rPr lang="en-US" smtClean="0"/>
-              <a:t>10/26/16</a:t>
+              <a:t>10/27/16</a:t>
             </a:fld>
             <a:endParaRPr lang="en-US"/>
           </a:p>
@@ -4177,12 +4993,727 @@
             <p:ph type="title"/>
           </p:nvPr>
         </p:nvSpPr>
+        <p:spPr>
+          <a:xfrm>
+            <a:off x="457200" y="131696"/>
+            <a:ext cx="8229600" cy="1143000"/>
+          </a:xfrm>
+        </p:spPr>
+        <p:txBody>
+          <a:bodyPr>
+            <a:normAutofit fontScale="90000"/>
+          </a:bodyPr>
+          <a:lstStyle/>
+          <a:p>
+            <a:r>
+              <a:rPr lang="en-US" dirty="0" smtClean="0"/>
+              <a:t>acI SAGs from Lake Mendota recruit reads and are discrete at ~95-97%ID</a:t>
+            </a:r>
+            <a:endParaRPr lang="en-US" dirty="0"/>
+          </a:p>
+        </p:txBody>
+      </p:sp>
+      <p:grpSp>
+        <p:nvGrpSpPr>
+          <p:cNvPr id="8" name="Group 7"/>
+          <p:cNvGrpSpPr/>
+          <p:nvPr/>
+        </p:nvGrpSpPr>
+        <p:grpSpPr>
+          <a:xfrm>
+            <a:off x="367390" y="1388447"/>
+            <a:ext cx="3853543" cy="4231174"/>
+            <a:chOff x="367390" y="1388447"/>
+            <a:chExt cx="3853543" cy="4231174"/>
+          </a:xfrm>
+        </p:grpSpPr>
+        <p:pic>
+          <p:nvPicPr>
+            <p:cNvPr id="3" name="Picture 2" descr="Fig3_seqdiscdenplots-20161004.pdf"/>
+            <p:cNvPicPr>
+              <a:picLocks noChangeAspect="1"/>
+            </p:cNvPicPr>
+            <p:nvPr/>
+          </p:nvPicPr>
+          <p:blipFill rotWithShape="1">
+            <a:blip r:embed="rId3">
+              <a:extLst>
+                <a:ext uri="{28A0092B-C50C-407E-A947-70E740481C1C}">
+                  <a14:useLocalDpi xmlns:a14="http://schemas.microsoft.com/office/drawing/2010/main" val="0"/>
+                </a:ext>
+              </a:extLst>
+            </a:blip>
+            <a:srcRect r="79637" b="49695"/>
+            <a:stretch/>
+          </p:blipFill>
+          <p:spPr>
+            <a:xfrm>
+              <a:off x="367390" y="1388447"/>
+              <a:ext cx="3853543" cy="4231174"/>
+            </a:xfrm>
+            <a:prstGeom prst="rect">
+              <a:avLst/>
+            </a:prstGeom>
+          </p:spPr>
+        </p:pic>
+        <p:sp>
+          <p:nvSpPr>
+            <p:cNvPr id="7" name="Rectangle 6"/>
+            <p:cNvSpPr/>
+            <p:nvPr/>
+          </p:nvSpPr>
+          <p:spPr>
+            <a:xfrm>
+              <a:off x="367390" y="1439508"/>
+              <a:ext cx="293010" cy="251406"/>
+            </a:xfrm>
+            <a:prstGeom prst="rect">
+              <a:avLst/>
+            </a:prstGeom>
+            <a:solidFill>
+              <a:schemeClr val="bg1"/>
+            </a:solidFill>
+            <a:ln>
+              <a:noFill/>
+            </a:ln>
+            <a:effectLst/>
+          </p:spPr>
+          <p:style>
+            <a:lnRef idx="1">
+              <a:schemeClr val="accent1"/>
+            </a:lnRef>
+            <a:fillRef idx="3">
+              <a:schemeClr val="accent1"/>
+            </a:fillRef>
+            <a:effectRef idx="2">
+              <a:schemeClr val="accent1"/>
+            </a:effectRef>
+            <a:fontRef idx="minor">
+              <a:schemeClr val="lt1"/>
+            </a:fontRef>
+          </p:style>
+          <p:txBody>
+            <a:bodyPr rtlCol="0" anchor="ctr"/>
+            <a:lstStyle/>
+            <a:p>
+              <a:pPr algn="ctr"/>
+              <a:endParaRPr lang="en-US"/>
+            </a:p>
+          </p:txBody>
+        </p:sp>
+      </p:grpSp>
+      <p:grpSp>
+        <p:nvGrpSpPr>
+          <p:cNvPr id="10" name="Group 9"/>
+          <p:cNvGrpSpPr/>
+          <p:nvPr/>
+        </p:nvGrpSpPr>
+        <p:grpSpPr>
+          <a:xfrm>
+            <a:off x="4706351" y="1366676"/>
+            <a:ext cx="3796137" cy="4231174"/>
+            <a:chOff x="4876149" y="1388447"/>
+            <a:chExt cx="3796137" cy="4231174"/>
+          </a:xfrm>
+        </p:grpSpPr>
+        <p:pic>
+          <p:nvPicPr>
+            <p:cNvPr id="4" name="Picture 3" descr="Fig3_seqdiscdenplots-20161004.pdf"/>
+            <p:cNvPicPr>
+              <a:picLocks noChangeAspect="1"/>
+            </p:cNvPicPr>
+            <p:nvPr/>
+          </p:nvPicPr>
+          <p:blipFill rotWithShape="1">
+            <a:blip r:embed="rId4">
+              <a:extLst>
+                <a:ext uri="{28A0092B-C50C-407E-A947-70E740481C1C}">
+                  <a14:useLocalDpi xmlns:a14="http://schemas.microsoft.com/office/drawing/2010/main" val="0"/>
+                </a:ext>
+              </a:extLst>
+            </a:blip>
+            <a:srcRect t="49884" r="79773"/>
+            <a:stretch/>
+          </p:blipFill>
+          <p:spPr>
+            <a:xfrm>
+              <a:off x="4876149" y="1439508"/>
+              <a:ext cx="3796137" cy="4180113"/>
+            </a:xfrm>
+            <a:prstGeom prst="rect">
+              <a:avLst/>
+            </a:prstGeom>
+          </p:spPr>
+        </p:pic>
+        <p:sp>
+          <p:nvSpPr>
+            <p:cNvPr id="9" name="Rectangle 8"/>
+            <p:cNvSpPr/>
+            <p:nvPr/>
+          </p:nvSpPr>
+          <p:spPr>
+            <a:xfrm>
+              <a:off x="4876149" y="1388447"/>
+              <a:ext cx="348994" cy="302467"/>
+            </a:xfrm>
+            <a:prstGeom prst="rect">
+              <a:avLst/>
+            </a:prstGeom>
+            <a:solidFill>
+              <a:srgbClr val="FFFFFF"/>
+            </a:solidFill>
+            <a:ln>
+              <a:solidFill>
+                <a:srgbClr val="FFFFFF"/>
+              </a:solidFill>
+            </a:ln>
+            <a:effectLst/>
+          </p:spPr>
+          <p:style>
+            <a:lnRef idx="1">
+              <a:schemeClr val="accent1"/>
+            </a:lnRef>
+            <a:fillRef idx="3">
+              <a:schemeClr val="accent1"/>
+            </a:fillRef>
+            <a:effectRef idx="2">
+              <a:schemeClr val="accent1"/>
+            </a:effectRef>
+            <a:fontRef idx="minor">
+              <a:schemeClr val="lt1"/>
+            </a:fontRef>
+          </p:style>
+          <p:txBody>
+            <a:bodyPr rtlCol="0" anchor="ctr"/>
+            <a:lstStyle/>
+            <a:p>
+              <a:pPr algn="ctr"/>
+              <a:endParaRPr lang="en-US"/>
+            </a:p>
+          </p:txBody>
+        </p:sp>
+      </p:grpSp>
+      <p:pic>
+        <p:nvPicPr>
+          <p:cNvPr id="5" name="Picture 4" descr="Fig3_seqdiscdenplots-20161004.pdf"/>
+          <p:cNvPicPr>
+            <a:picLocks noChangeAspect="1"/>
+          </p:cNvPicPr>
+          <p:nvPr/>
+        </p:nvPicPr>
+        <p:blipFill rotWithShape="1">
+          <a:blip r:embed="rId5">
+            <a:extLst>
+              <a:ext uri="{28A0092B-C50C-407E-A947-70E740481C1C}">
+                <a14:useLocalDpi xmlns:a14="http://schemas.microsoft.com/office/drawing/2010/main" val="0"/>
+              </a:ext>
+            </a:extLst>
+          </a:blip>
+          <a:srcRect l="21089" t="12244" r="67619" b="68368"/>
+          <a:stretch/>
+        </p:blipFill>
+        <p:spPr>
+          <a:xfrm>
+            <a:off x="2104571" y="5597850"/>
+            <a:ext cx="1255485" cy="957970"/>
+          </a:xfrm>
+          <a:prstGeom prst="rect">
+            <a:avLst/>
+          </a:prstGeom>
+        </p:spPr>
+      </p:pic>
+      <p:pic>
+        <p:nvPicPr>
+          <p:cNvPr id="6" name="Picture 5" descr="Fig3_seqdiscdenplots-20161004.pdf"/>
+          <p:cNvPicPr>
+            <a:picLocks noChangeAspect="1"/>
+          </p:cNvPicPr>
+          <p:nvPr/>
+        </p:nvPicPr>
+        <p:blipFill rotWithShape="1">
+          <a:blip r:embed="rId6">
+            <a:extLst>
+              <a:ext uri="{28A0092B-C50C-407E-A947-70E740481C1C}">
+                <a14:useLocalDpi xmlns:a14="http://schemas.microsoft.com/office/drawing/2010/main" val="0"/>
+              </a:ext>
+            </a:extLst>
+          </a:blip>
+          <a:srcRect l="20227" t="58017" r="67619" b="14129"/>
+          <a:stretch/>
+        </p:blipFill>
+        <p:spPr>
+          <a:xfrm>
+            <a:off x="6466535" y="5537200"/>
+            <a:ext cx="1121153" cy="1141992"/>
+          </a:xfrm>
+          <a:prstGeom prst="rect">
+            <a:avLst/>
+          </a:prstGeom>
+        </p:spPr>
+      </p:pic>
+    </p:spTree>
+    <p:extLst>
+      <p:ext uri="{BB962C8B-B14F-4D97-AF65-F5344CB8AC3E}">
+        <p14:creationId xmlns:p14="http://schemas.microsoft.com/office/powerpoint/2010/main" val="3808078468"/>
+      </p:ext>
+    </p:extLst>
+  </p:cSld>
+  <p:clrMapOvr>
+    <a:masterClrMapping/>
+  </p:clrMapOvr>
+  <p:timing>
+    <p:tnLst>
+      <p:par>
+        <p:cTn xmlns:p14="http://schemas.microsoft.com/office/powerpoint/2010/main" id="1" dur="indefinite" restart="never" nodeType="tmRoot"/>
+      </p:par>
+    </p:tnLst>
+  </p:timing>
+</p:sld>
+</file>
+
+<file path=ppt/slides/slide11.xml><?xml version="1.0" encoding="utf-8"?>
+<p:sld xmlns:a="http://schemas.openxmlformats.org/drawingml/2006/main" xmlns:r="http://schemas.openxmlformats.org/officeDocument/2006/relationships" xmlns:p="http://schemas.openxmlformats.org/presentationml/2006/main">
+  <p:cSld>
+    <p:spTree>
+      <p:nvGrpSpPr>
+        <p:cNvPr id="1" name=""/>
+        <p:cNvGrpSpPr/>
+        <p:nvPr/>
+      </p:nvGrpSpPr>
+      <p:grpSpPr>
+        <a:xfrm>
+          <a:off x="0" y="0"/>
+          <a:ext cx="0" cy="0"/>
+          <a:chOff x="0" y="0"/>
+          <a:chExt cx="0" cy="0"/>
+        </a:xfrm>
+      </p:grpSpPr>
+      <p:sp>
+        <p:nvSpPr>
+          <p:cNvPr id="2" name="Title 1"/>
+          <p:cNvSpPr>
+            <a:spLocks noGrp="1"/>
+          </p:cNvSpPr>
+          <p:nvPr>
+            <p:ph type="title"/>
+          </p:nvPr>
+        </p:nvSpPr>
+        <p:spPr>
+          <a:xfrm>
+            <a:off x="457204" y="129495"/>
+            <a:ext cx="8229600" cy="1143000"/>
+          </a:xfrm>
+        </p:spPr>
+        <p:txBody>
+          <a:bodyPr>
+            <a:normAutofit/>
+          </a:bodyPr>
+          <a:lstStyle/>
+          <a:p>
+            <a:r>
+              <a:rPr lang="en-US" dirty="0" smtClean="0"/>
+              <a:t>LD12 populations are highly similar</a:t>
+            </a:r>
+            <a:endParaRPr lang="en-US" dirty="0"/>
+          </a:p>
+        </p:txBody>
+      </p:sp>
+      <p:grpSp>
+        <p:nvGrpSpPr>
+          <p:cNvPr id="11" name="Group 10"/>
+          <p:cNvGrpSpPr/>
+          <p:nvPr/>
+        </p:nvGrpSpPr>
+        <p:grpSpPr>
+          <a:xfrm>
+            <a:off x="4572004" y="1366676"/>
+            <a:ext cx="3773714" cy="4159605"/>
+            <a:chOff x="4731661" y="1366676"/>
+            <a:chExt cx="3773714" cy="4159605"/>
+          </a:xfrm>
+        </p:grpSpPr>
+        <p:pic>
+          <p:nvPicPr>
+            <p:cNvPr id="5" name="Picture 4" descr="Fig3_seqdiscdenplots-20161004.pdf"/>
+            <p:cNvPicPr>
+              <a:picLocks noChangeAspect="1"/>
+            </p:cNvPicPr>
+            <p:nvPr/>
+          </p:nvPicPr>
+          <p:blipFill rotWithShape="1">
+            <a:blip r:embed="rId3">
+              <a:extLst>
+                <a:ext uri="{28A0092B-C50C-407E-A947-70E740481C1C}">
+                  <a14:useLocalDpi xmlns:a14="http://schemas.microsoft.com/office/drawing/2010/main" val="0"/>
+                </a:ext>
+              </a:extLst>
+            </a:blip>
+            <a:srcRect l="32936" t="49643" r="46666"/>
+            <a:stretch/>
+          </p:blipFill>
+          <p:spPr>
+            <a:xfrm>
+              <a:off x="4731661" y="1385473"/>
+              <a:ext cx="3773714" cy="4140808"/>
+            </a:xfrm>
+            <a:prstGeom prst="rect">
+              <a:avLst/>
+            </a:prstGeom>
+          </p:spPr>
+        </p:pic>
+        <p:sp>
+          <p:nvSpPr>
+            <p:cNvPr id="8" name="Rectangle 7"/>
+            <p:cNvSpPr/>
+            <p:nvPr/>
+          </p:nvSpPr>
+          <p:spPr>
+            <a:xfrm>
+              <a:off x="4767294" y="1366676"/>
+              <a:ext cx="348994" cy="302467"/>
+            </a:xfrm>
+            <a:prstGeom prst="rect">
+              <a:avLst/>
+            </a:prstGeom>
+            <a:solidFill>
+              <a:srgbClr val="FFFFFF"/>
+            </a:solidFill>
+            <a:ln>
+              <a:solidFill>
+                <a:srgbClr val="FFFFFF"/>
+              </a:solidFill>
+            </a:ln>
+            <a:effectLst/>
+          </p:spPr>
+          <p:style>
+            <a:lnRef idx="1">
+              <a:schemeClr val="accent1"/>
+            </a:lnRef>
+            <a:fillRef idx="3">
+              <a:schemeClr val="accent1"/>
+            </a:fillRef>
+            <a:effectRef idx="2">
+              <a:schemeClr val="accent1"/>
+            </a:effectRef>
+            <a:fontRef idx="minor">
+              <a:schemeClr val="lt1"/>
+            </a:fontRef>
+          </p:style>
+          <p:txBody>
+            <a:bodyPr rtlCol="0" anchor="ctr"/>
+            <a:lstStyle/>
+            <a:p>
+              <a:pPr algn="ctr"/>
+              <a:endParaRPr lang="en-US"/>
+            </a:p>
+          </p:txBody>
+        </p:sp>
+      </p:grpSp>
+      <p:grpSp>
+        <p:nvGrpSpPr>
+          <p:cNvPr id="10" name="Group 9"/>
+          <p:cNvGrpSpPr/>
+          <p:nvPr/>
+        </p:nvGrpSpPr>
+        <p:grpSpPr>
+          <a:xfrm>
+            <a:off x="406400" y="1366676"/>
+            <a:ext cx="3788229" cy="4191770"/>
+            <a:chOff x="406400" y="1366676"/>
+            <a:chExt cx="3788229" cy="4191770"/>
+          </a:xfrm>
+        </p:grpSpPr>
+        <p:pic>
+          <p:nvPicPr>
+            <p:cNvPr id="3" name="Picture 2" descr="Fig3_seqdiscdenplots-20161004.pdf"/>
+            <p:cNvPicPr>
+              <a:picLocks noChangeAspect="1"/>
+            </p:cNvPicPr>
+            <p:nvPr/>
+          </p:nvPicPr>
+          <p:blipFill rotWithShape="1">
+            <a:blip r:embed="rId3">
+              <a:extLst>
+                <a:ext uri="{28A0092B-C50C-407E-A947-70E740481C1C}">
+                  <a14:useLocalDpi xmlns:a14="http://schemas.microsoft.com/office/drawing/2010/main" val="0"/>
+                </a:ext>
+              </a:extLst>
+            </a:blip>
+            <a:srcRect l="33492" r="46191" b="49643"/>
+            <a:stretch/>
+          </p:blipFill>
+          <p:spPr>
+            <a:xfrm>
+              <a:off x="406400" y="1385473"/>
+              <a:ext cx="3788229" cy="4172973"/>
+            </a:xfrm>
+            <a:prstGeom prst="rect">
+              <a:avLst/>
+            </a:prstGeom>
+          </p:spPr>
+        </p:pic>
+        <p:sp>
+          <p:nvSpPr>
+            <p:cNvPr id="9" name="Rectangle 8"/>
+            <p:cNvSpPr/>
+            <p:nvPr/>
+          </p:nvSpPr>
+          <p:spPr>
+            <a:xfrm>
+              <a:off x="406400" y="1366676"/>
+              <a:ext cx="348994" cy="302467"/>
+            </a:xfrm>
+            <a:prstGeom prst="rect">
+              <a:avLst/>
+            </a:prstGeom>
+            <a:solidFill>
+              <a:srgbClr val="FFFFFF"/>
+            </a:solidFill>
+            <a:ln>
+              <a:solidFill>
+                <a:srgbClr val="FFFFFF"/>
+              </a:solidFill>
+            </a:ln>
+            <a:effectLst/>
+          </p:spPr>
+          <p:style>
+            <a:lnRef idx="1">
+              <a:schemeClr val="accent1"/>
+            </a:lnRef>
+            <a:fillRef idx="3">
+              <a:schemeClr val="accent1"/>
+            </a:fillRef>
+            <a:effectRef idx="2">
+              <a:schemeClr val="accent1"/>
+            </a:effectRef>
+            <a:fontRef idx="minor">
+              <a:schemeClr val="lt1"/>
+            </a:fontRef>
+          </p:style>
+          <p:txBody>
+            <a:bodyPr rtlCol="0" anchor="ctr"/>
+            <a:lstStyle/>
+            <a:p>
+              <a:pPr algn="ctr"/>
+              <a:endParaRPr lang="en-US"/>
+            </a:p>
+          </p:txBody>
+        </p:sp>
+      </p:grpSp>
+      <p:pic>
+        <p:nvPicPr>
+          <p:cNvPr id="7" name="Picture 6" descr="Fig3_seqdiscdenplots-20161004.pdf"/>
+          <p:cNvPicPr>
+            <a:picLocks noChangeAspect="1"/>
+          </p:cNvPicPr>
+          <p:nvPr/>
+        </p:nvPicPr>
+        <p:blipFill rotWithShape="1">
+          <a:blip r:embed="rId3">
+            <a:extLst>
+              <a:ext uri="{28A0092B-C50C-407E-A947-70E740481C1C}">
+                <a14:useLocalDpi xmlns:a14="http://schemas.microsoft.com/office/drawing/2010/main" val="0"/>
+              </a:ext>
+            </a:extLst>
+          </a:blip>
+          <a:srcRect l="54444" t="11964" r="35317" b="68036"/>
+          <a:stretch/>
+        </p:blipFill>
+        <p:spPr>
+          <a:xfrm>
+            <a:off x="1923144" y="5449966"/>
+            <a:ext cx="1240971" cy="1077432"/>
+          </a:xfrm>
+          <a:prstGeom prst="rect">
+            <a:avLst/>
+          </a:prstGeom>
+        </p:spPr>
+      </p:pic>
+      <p:pic>
+        <p:nvPicPr>
+          <p:cNvPr id="6" name="Picture 5" descr="Fig3_seqdiscdenplots-20161004.pdf"/>
+          <p:cNvPicPr>
+            <a:picLocks noChangeAspect="1"/>
+          </p:cNvPicPr>
+          <p:nvPr/>
+        </p:nvPicPr>
+        <p:blipFill rotWithShape="1">
+          <a:blip r:embed="rId3">
+            <a:extLst>
+              <a:ext uri="{28A0092B-C50C-407E-A947-70E740481C1C}">
+                <a14:useLocalDpi xmlns:a14="http://schemas.microsoft.com/office/drawing/2010/main" val="0"/>
+              </a:ext>
+            </a:extLst>
+          </a:blip>
+          <a:srcRect l="53492" t="61429" r="33809" b="16964"/>
+          <a:stretch/>
+        </p:blipFill>
+        <p:spPr>
+          <a:xfrm>
+            <a:off x="6335486" y="5449966"/>
+            <a:ext cx="1494971" cy="1130572"/>
+          </a:xfrm>
+          <a:prstGeom prst="rect">
+            <a:avLst/>
+          </a:prstGeom>
+        </p:spPr>
+      </p:pic>
+    </p:spTree>
+    <p:extLst>
+      <p:ext uri="{BB962C8B-B14F-4D97-AF65-F5344CB8AC3E}">
+        <p14:creationId xmlns:p14="http://schemas.microsoft.com/office/powerpoint/2010/main" val="2217065650"/>
+      </p:ext>
+    </p:extLst>
+  </p:cSld>
+  <p:clrMapOvr>
+    <a:masterClrMapping/>
+  </p:clrMapOvr>
+  <p:timing>
+    <p:tnLst>
+      <p:par>
+        <p:cTn xmlns:p14="http://schemas.microsoft.com/office/powerpoint/2010/main" id="1" dur="indefinite" restart="never" nodeType="tmRoot"/>
+      </p:par>
+    </p:tnLst>
+  </p:timing>
+</p:sld>
+</file>
+
+<file path=ppt/slides/slide12.xml><?xml version="1.0" encoding="utf-8"?>
+<p:sld xmlns:a="http://schemas.openxmlformats.org/drawingml/2006/main" xmlns:r="http://schemas.openxmlformats.org/officeDocument/2006/relationships" xmlns:p="http://schemas.openxmlformats.org/presentationml/2006/main" show="0">
+  <p:cSld>
+    <p:spTree>
+      <p:nvGrpSpPr>
+        <p:cNvPr id="1" name=""/>
+        <p:cNvGrpSpPr/>
+        <p:nvPr/>
+      </p:nvGrpSpPr>
+      <p:grpSpPr>
+        <a:xfrm>
+          <a:off x="0" y="0"/>
+          <a:ext cx="0" cy="0"/>
+          <a:chOff x="0" y="0"/>
+          <a:chExt cx="0" cy="0"/>
+        </a:xfrm>
+      </p:grpSpPr>
+      <p:sp>
+        <p:nvSpPr>
+          <p:cNvPr id="2" name="Title 1"/>
+          <p:cNvSpPr>
+            <a:spLocks noGrp="1"/>
+          </p:cNvSpPr>
+          <p:nvPr>
+            <p:ph type="title"/>
+          </p:nvPr>
+        </p:nvSpPr>
         <p:spPr/>
         <p:txBody>
           <a:bodyPr/>
           <a:lstStyle/>
           <a:p>
-            <a:endParaRPr lang="en-US"/>
+            <a:r>
+              <a:rPr lang="en-US" dirty="0" smtClean="0"/>
+              <a:t>What about other lineages?</a:t>
+            </a:r>
+            <a:endParaRPr lang="en-US" dirty="0"/>
+          </a:p>
+        </p:txBody>
+      </p:sp>
+      <p:pic>
+        <p:nvPicPr>
+          <p:cNvPr id="3" name="Picture 2" descr="Fig3_seqdiscdenplots-20161004.pdf"/>
+          <p:cNvPicPr>
+            <a:picLocks noChangeAspect="1"/>
+          </p:cNvPicPr>
+          <p:nvPr/>
+        </p:nvPicPr>
+        <p:blipFill rotWithShape="1">
+          <a:blip r:embed="rId2">
+            <a:extLst>
+              <a:ext uri="{28A0092B-C50C-407E-A947-70E740481C1C}">
+                <a14:useLocalDpi xmlns:a14="http://schemas.microsoft.com/office/drawing/2010/main" val="0"/>
+              </a:ext>
+            </a:extLst>
+          </a:blip>
+          <a:srcRect l="66032" b="47857"/>
+          <a:stretch/>
+        </p:blipFill>
+        <p:spPr>
+          <a:xfrm>
+            <a:off x="1917231" y="1966687"/>
+            <a:ext cx="5648342" cy="3853543"/>
+          </a:xfrm>
+          <a:prstGeom prst="rect">
+            <a:avLst/>
+          </a:prstGeom>
+        </p:spPr>
+      </p:pic>
+    </p:spTree>
+    <p:extLst>
+      <p:ext uri="{BB962C8B-B14F-4D97-AF65-F5344CB8AC3E}">
+        <p14:creationId xmlns:p14="http://schemas.microsoft.com/office/powerpoint/2010/main" val="2733025825"/>
+      </p:ext>
+    </p:extLst>
+  </p:cSld>
+  <p:clrMapOvr>
+    <a:masterClrMapping/>
+  </p:clrMapOvr>
+  <mc:AlternateContent xmlns:mc="http://schemas.openxmlformats.org/markup-compatibility/2006">
+    <mc:Choice xmlns:p14="http://schemas.microsoft.com/office/powerpoint/2010/main" Requires="p14">
+      <p:transition spd="slow" p14:dur="2000"/>
+    </mc:Choice>
+    <mc:Fallback>
+      <p:transition xmlns:p14="http://schemas.microsoft.com/office/powerpoint/2010/main" spd="slow"/>
+    </mc:Fallback>
+  </mc:AlternateContent>
+  <p:timing>
+    <p:tnLst>
+      <p:par>
+        <p:cTn xmlns:p14="http://schemas.microsoft.com/office/powerpoint/2010/main" id="1" dur="indefinite" restart="never" nodeType="tmRoot"/>
+      </p:par>
+    </p:tnLst>
+  </p:timing>
+</p:sld>
+</file>
+
+<file path=ppt/slides/slide13.xml><?xml version="1.0" encoding="utf-8"?>
+<p:sld xmlns:a="http://schemas.openxmlformats.org/drawingml/2006/main" xmlns:r="http://schemas.openxmlformats.org/officeDocument/2006/relationships" xmlns:p="http://schemas.openxmlformats.org/presentationml/2006/main">
+  <p:cSld>
+    <p:spTree>
+      <p:nvGrpSpPr>
+        <p:cNvPr id="1" name=""/>
+        <p:cNvGrpSpPr/>
+        <p:nvPr/>
+      </p:nvGrpSpPr>
+      <p:grpSpPr>
+        <a:xfrm>
+          <a:off x="0" y="0"/>
+          <a:ext cx="0" cy="0"/>
+          <a:chOff x="0" y="0"/>
+          <a:chExt cx="0" cy="0"/>
+        </a:xfrm>
+      </p:grpSpPr>
+      <p:sp>
+        <p:nvSpPr>
+          <p:cNvPr id="2" name="Title 1"/>
+          <p:cNvSpPr>
+            <a:spLocks noGrp="1"/>
+          </p:cNvSpPr>
+          <p:nvPr>
+            <p:ph type="title"/>
+          </p:nvPr>
+        </p:nvSpPr>
+        <p:spPr/>
+        <p:txBody>
+          <a:bodyPr>
+            <a:noAutofit/>
+          </a:bodyPr>
+          <a:lstStyle/>
+          <a:p>
+            <a:r>
+              <a:rPr lang="en-US" sz="2800" dirty="0" smtClean="0"/>
+              <a:t>acI populations have different abundance patterns though time, where LD12 are tightly synchronized</a:t>
+            </a:r>
+            <a:endParaRPr lang="en-US" sz="2800" dirty="0"/>
           </a:p>
         </p:txBody>
       </p:sp>
@@ -4396,225 +5927,6 @@
   <p:clrMapOvr>
     <a:masterClrMapping/>
   </p:clrMapOvr>
-</p:sld>
-</file>
-
-<file path=ppt/slides/slide11.xml><?xml version="1.0" encoding="utf-8"?>
-<p:sld xmlns:a="http://schemas.openxmlformats.org/drawingml/2006/main" xmlns:r="http://schemas.openxmlformats.org/officeDocument/2006/relationships" xmlns:p="http://schemas.openxmlformats.org/presentationml/2006/main">
-  <p:cSld>
-    <p:spTree>
-      <p:nvGrpSpPr>
-        <p:cNvPr id="1" name=""/>
-        <p:cNvGrpSpPr/>
-        <p:nvPr/>
-      </p:nvGrpSpPr>
-      <p:grpSpPr>
-        <a:xfrm>
-          <a:off x="0" y="0"/>
-          <a:ext cx="0" cy="0"/>
-          <a:chOff x="0" y="0"/>
-          <a:chExt cx="0" cy="0"/>
-        </a:xfrm>
-      </p:grpSpPr>
-      <p:sp>
-        <p:nvSpPr>
-          <p:cNvPr id="2" name="Title 1"/>
-          <p:cNvSpPr>
-            <a:spLocks noGrp="1"/>
-          </p:cNvSpPr>
-          <p:nvPr>
-            <p:ph type="title"/>
-          </p:nvPr>
-        </p:nvSpPr>
-        <p:spPr/>
-        <p:txBody>
-          <a:bodyPr/>
-          <a:lstStyle/>
-          <a:p>
-            <a:r>
-              <a:rPr lang="en-US" dirty="0" smtClean="0"/>
-              <a:t>QUESTIONS</a:t>
-            </a:r>
-            <a:endParaRPr lang="en-US" dirty="0"/>
-          </a:p>
-        </p:txBody>
-      </p:sp>
-    </p:spTree>
-    <p:extLst>
-      <p:ext uri="{BB962C8B-B14F-4D97-AF65-F5344CB8AC3E}">
-        <p14:creationId xmlns:p14="http://schemas.microsoft.com/office/powerpoint/2010/main" val="285072216"/>
-      </p:ext>
-    </p:extLst>
-  </p:cSld>
-  <p:clrMapOvr>
-    <a:masterClrMapping/>
-  </p:clrMapOvr>
-</p:sld>
-</file>
-
-<file path=ppt/slides/slide12.xml><?xml version="1.0" encoding="utf-8"?>
-<p:sld xmlns:a="http://schemas.openxmlformats.org/drawingml/2006/main" xmlns:r="http://schemas.openxmlformats.org/officeDocument/2006/relationships" xmlns:p="http://schemas.openxmlformats.org/presentationml/2006/main">
-  <p:cSld>
-    <p:spTree>
-      <p:nvGrpSpPr>
-        <p:cNvPr id="1" name=""/>
-        <p:cNvGrpSpPr/>
-        <p:nvPr/>
-      </p:nvGrpSpPr>
-      <p:grpSpPr>
-        <a:xfrm>
-          <a:off x="0" y="0"/>
-          <a:ext cx="0" cy="0"/>
-          <a:chOff x="0" y="0"/>
-          <a:chExt cx="0" cy="0"/>
-        </a:xfrm>
-      </p:grpSpPr>
-      <p:sp>
-        <p:nvSpPr>
-          <p:cNvPr id="2" name="Title 1"/>
-          <p:cNvSpPr>
-            <a:spLocks noGrp="1"/>
-          </p:cNvSpPr>
-          <p:nvPr>
-            <p:ph type="title"/>
-          </p:nvPr>
-        </p:nvSpPr>
-        <p:spPr/>
-        <p:txBody>
-          <a:bodyPr/>
-          <a:lstStyle/>
-          <a:p>
-            <a:r>
-              <a:rPr lang="en-US" dirty="0" smtClean="0"/>
-              <a:t>Microbes as colored dots figure</a:t>
-            </a:r>
-            <a:endParaRPr lang="en-US" dirty="0"/>
-          </a:p>
-        </p:txBody>
-      </p:sp>
-    </p:spTree>
-    <p:extLst>
-      <p:ext uri="{BB962C8B-B14F-4D97-AF65-F5344CB8AC3E}">
-        <p14:creationId xmlns:p14="http://schemas.microsoft.com/office/powerpoint/2010/main" val="20613899"/>
-      </p:ext>
-    </p:extLst>
-  </p:cSld>
-  <p:clrMapOvr>
-    <a:masterClrMapping/>
-  </p:clrMapOvr>
-</p:sld>
-</file>
-
-<file path=ppt/slides/slide13.xml><?xml version="1.0" encoding="utf-8"?>
-<p:sld xmlns:a="http://schemas.openxmlformats.org/drawingml/2006/main" xmlns:r="http://schemas.openxmlformats.org/officeDocument/2006/relationships" xmlns:p="http://schemas.openxmlformats.org/presentationml/2006/main">
-  <p:cSld>
-    <p:spTree>
-      <p:nvGrpSpPr>
-        <p:cNvPr id="1" name=""/>
-        <p:cNvGrpSpPr/>
-        <p:nvPr/>
-      </p:nvGrpSpPr>
-      <p:grpSpPr>
-        <a:xfrm>
-          <a:off x="0" y="0"/>
-          <a:ext cx="0" cy="0"/>
-          <a:chOff x="0" y="0"/>
-          <a:chExt cx="0" cy="0"/>
-        </a:xfrm>
-      </p:grpSpPr>
-      <p:sp>
-        <p:nvSpPr>
-          <p:cNvPr id="2" name="Title 1"/>
-          <p:cNvSpPr>
-            <a:spLocks noGrp="1"/>
-          </p:cNvSpPr>
-          <p:nvPr>
-            <p:ph type="title"/>
-          </p:nvPr>
-        </p:nvSpPr>
-        <p:spPr/>
-        <p:txBody>
-          <a:bodyPr/>
-          <a:lstStyle/>
-          <a:p>
-            <a:r>
-              <a:rPr lang="en-US" dirty="0" smtClean="0"/>
-              <a:t>Crystal Bog (CB) v. Trout Bog (TB)</a:t>
-            </a:r>
-            <a:endParaRPr lang="en-US" dirty="0"/>
-          </a:p>
-        </p:txBody>
-      </p:sp>
-      <p:sp>
-        <p:nvSpPr>
-          <p:cNvPr id="3" name="Content Placeholder 2"/>
-          <p:cNvSpPr>
-            <a:spLocks noGrp="1"/>
-          </p:cNvSpPr>
-          <p:nvPr>
-            <p:ph idx="1"/>
-          </p:nvPr>
-        </p:nvSpPr>
-        <p:spPr/>
-        <p:txBody>
-          <a:bodyPr>
-            <a:normAutofit lnSpcReduction="10000"/>
-          </a:bodyPr>
-          <a:lstStyle/>
-          <a:p>
-            <a:r>
-              <a:rPr lang="en-US" dirty="0" smtClean="0"/>
-              <a:t>Both dystrophic (high in DOC)</a:t>
-            </a:r>
-          </a:p>
-          <a:p>
-            <a:r>
-              <a:rPr lang="en-US" dirty="0" smtClean="0"/>
-              <a:t>Both seepage lakes</a:t>
-            </a:r>
-          </a:p>
-          <a:p>
-            <a:r>
-              <a:rPr lang="en-US" dirty="0" smtClean="0"/>
-              <a:t>Share 45-60% of their top 20 clades based on 16S tags</a:t>
-            </a:r>
-          </a:p>
-          <a:p>
-            <a:r>
-              <a:rPr lang="en-US" dirty="0" smtClean="0"/>
-              <a:t>Different mixing regimes </a:t>
-            </a:r>
-          </a:p>
-          <a:p>
-            <a:r>
-              <a:rPr lang="en-US" dirty="0" smtClean="0"/>
-              <a:t>CB has a smaller surface area</a:t>
-            </a:r>
-          </a:p>
-          <a:p>
-            <a:r>
-              <a:rPr lang="en-US" dirty="0" smtClean="0"/>
-              <a:t>TB is deeper</a:t>
-            </a:r>
-          </a:p>
-          <a:p>
-            <a:r>
-              <a:rPr lang="en-US" dirty="0" smtClean="0"/>
-              <a:t>About 5 miles apart</a:t>
-            </a:r>
-          </a:p>
-        </p:txBody>
-      </p:sp>
-    </p:spTree>
-    <p:extLst>
-      <p:ext uri="{BB962C8B-B14F-4D97-AF65-F5344CB8AC3E}">
-        <p14:creationId xmlns:p14="http://schemas.microsoft.com/office/powerpoint/2010/main" val="954074340"/>
-      </p:ext>
-    </p:extLst>
-  </p:cSld>
-  <p:clrMapOvr>
-    <a:masterClrMapping/>
-  </p:clrMapOvr>
   <p:timing>
     <p:tnLst>
       <p:par>
@@ -4659,6 +5971,355 @@
           <a:p>
             <a:r>
               <a:rPr lang="en-US" dirty="0" smtClean="0"/>
+              <a:t>Schematic</a:t>
+            </a:r>
+            <a:endParaRPr lang="en-US" dirty="0"/>
+          </a:p>
+        </p:txBody>
+      </p:sp>
+      <p:pic>
+        <p:nvPicPr>
+          <p:cNvPr id="4" name="Picture 3"/>
+          <p:cNvPicPr>
+            <a:picLocks noChangeAspect="1"/>
+          </p:cNvPicPr>
+          <p:nvPr/>
+        </p:nvPicPr>
+        <p:blipFill>
+          <a:blip r:embed="rId3">
+            <a:extLst>
+              <a:ext uri="{28A0092B-C50C-407E-A947-70E740481C1C}">
+                <a14:useLocalDpi xmlns:a14="http://schemas.microsoft.com/office/drawing/2010/main" val="0"/>
+              </a:ext>
+            </a:extLst>
+          </a:blip>
+          <a:stretch>
+            <a:fillRect/>
+          </a:stretch>
+        </p:blipFill>
+        <p:spPr>
+          <a:xfrm>
+            <a:off x="572079" y="1361149"/>
+            <a:ext cx="8170765" cy="5032393"/>
+          </a:xfrm>
+          <a:prstGeom prst="rect">
+            <a:avLst/>
+          </a:prstGeom>
+        </p:spPr>
+      </p:pic>
+    </p:spTree>
+    <p:extLst>
+      <p:ext uri="{BB962C8B-B14F-4D97-AF65-F5344CB8AC3E}">
+        <p14:creationId xmlns:p14="http://schemas.microsoft.com/office/powerpoint/2010/main" val="1934594330"/>
+      </p:ext>
+    </p:extLst>
+  </p:cSld>
+  <p:clrMapOvr>
+    <a:masterClrMapping/>
+  </p:clrMapOvr>
+  <p:timing>
+    <p:tnLst>
+      <p:par>
+        <p:cTn xmlns:p14="http://schemas.microsoft.com/office/powerpoint/2010/main" id="1" dur="indefinite" restart="never" nodeType="tmRoot"/>
+      </p:par>
+    </p:tnLst>
+  </p:timing>
+</p:sld>
+</file>
+
+<file path=ppt/slides/slide15.xml><?xml version="1.0" encoding="utf-8"?>
+<p:sld xmlns:a="http://schemas.openxmlformats.org/drawingml/2006/main" xmlns:r="http://schemas.openxmlformats.org/officeDocument/2006/relationships" xmlns:p="http://schemas.openxmlformats.org/presentationml/2006/main">
+  <p:cSld>
+    <p:spTree>
+      <p:nvGrpSpPr>
+        <p:cNvPr id="1" name=""/>
+        <p:cNvGrpSpPr/>
+        <p:nvPr/>
+      </p:nvGrpSpPr>
+      <p:grpSpPr>
+        <a:xfrm>
+          <a:off x="0" y="0"/>
+          <a:ext cx="0" cy="0"/>
+          <a:chOff x="0" y="0"/>
+          <a:chExt cx="0" cy="0"/>
+        </a:xfrm>
+      </p:grpSpPr>
+      <p:sp>
+        <p:nvSpPr>
+          <p:cNvPr id="2" name="Title 1"/>
+          <p:cNvSpPr>
+            <a:spLocks noGrp="1"/>
+          </p:cNvSpPr>
+          <p:nvPr>
+            <p:ph type="title"/>
+          </p:nvPr>
+        </p:nvSpPr>
+        <p:spPr/>
+        <p:txBody>
+          <a:bodyPr/>
+          <a:lstStyle/>
+          <a:p>
+            <a:r>
+              <a:rPr lang="en-US" dirty="0" smtClean="0"/>
+              <a:t>Next Questions</a:t>
+            </a:r>
+            <a:endParaRPr lang="en-US" dirty="0"/>
+          </a:p>
+        </p:txBody>
+      </p:sp>
+      <p:sp>
+        <p:nvSpPr>
+          <p:cNvPr id="3" name="Content Placeholder 2"/>
+          <p:cNvSpPr>
+            <a:spLocks noGrp="1"/>
+          </p:cNvSpPr>
+          <p:nvPr>
+            <p:ph idx="1"/>
+          </p:nvPr>
+        </p:nvSpPr>
+        <p:spPr/>
+        <p:txBody>
+          <a:bodyPr>
+            <a:normAutofit lnSpcReduction="10000"/>
+          </a:bodyPr>
+          <a:lstStyle/>
+          <a:p>
+            <a:r>
+              <a:rPr lang="en-US" dirty="0"/>
+              <a:t>How does selection differ </a:t>
+            </a:r>
+            <a:r>
+              <a:rPr lang="en-US" dirty="0" smtClean="0"/>
+              <a:t>within </a:t>
+            </a:r>
+            <a:r>
+              <a:rPr lang="en-US" dirty="0" err="1"/>
+              <a:t>vs</a:t>
+            </a:r>
+            <a:r>
+              <a:rPr lang="en-US" dirty="0"/>
+              <a:t> between sequence-discrete populations?  </a:t>
+            </a:r>
+            <a:r>
+              <a:rPr lang="en-US" dirty="0" smtClean="0"/>
+              <a:t>(past vs. current selection)</a:t>
+            </a:r>
+          </a:p>
+          <a:p>
+            <a:pPr lvl="1"/>
+            <a:r>
+              <a:rPr lang="en-US" dirty="0" smtClean="0"/>
+              <a:t>How many genotypes are within a population?</a:t>
+            </a:r>
+          </a:p>
+          <a:p>
+            <a:pPr lvl="1"/>
+            <a:r>
+              <a:rPr lang="en-US" dirty="0" smtClean="0"/>
+              <a:t>Neutral variation or ecologically distinct?</a:t>
+            </a:r>
+          </a:p>
+          <a:p>
+            <a:r>
+              <a:rPr lang="en-US" dirty="0" smtClean="0"/>
+              <a:t>Does </a:t>
+            </a:r>
+            <a:r>
+              <a:rPr lang="en-US" dirty="0"/>
+              <a:t>selection act differently on homologous genes shared by different populations?  </a:t>
+            </a:r>
+            <a:endParaRPr lang="en-US" dirty="0" smtClean="0"/>
+          </a:p>
+          <a:p>
+            <a:r>
+              <a:rPr lang="en-US" dirty="0" smtClean="0"/>
+              <a:t>Which (shared) traits </a:t>
+            </a:r>
+            <a:r>
+              <a:rPr lang="en-US" dirty="0"/>
+              <a:t>are under strong selection</a:t>
+            </a:r>
+            <a:r>
+              <a:rPr lang="en-US" dirty="0" smtClean="0"/>
+              <a:t>?</a:t>
+            </a:r>
+          </a:p>
+        </p:txBody>
+      </p:sp>
+    </p:spTree>
+    <p:extLst>
+      <p:ext uri="{BB962C8B-B14F-4D97-AF65-F5344CB8AC3E}">
+        <p14:creationId xmlns:p14="http://schemas.microsoft.com/office/powerpoint/2010/main" val="285072216"/>
+      </p:ext>
+    </p:extLst>
+  </p:cSld>
+  <p:clrMapOvr>
+    <a:masterClrMapping/>
+  </p:clrMapOvr>
+  <p:timing>
+    <p:tnLst>
+      <p:par>
+        <p:cTn xmlns:p14="http://schemas.microsoft.com/office/powerpoint/2010/main" id="1" dur="indefinite" restart="never" nodeType="tmRoot"/>
+      </p:par>
+    </p:tnLst>
+  </p:timing>
+</p:sld>
+</file>
+
+<file path=ppt/slides/slide16.xml><?xml version="1.0" encoding="utf-8"?>
+<p:sld xmlns:a="http://schemas.openxmlformats.org/drawingml/2006/main" xmlns:r="http://schemas.openxmlformats.org/officeDocument/2006/relationships" xmlns:p="http://schemas.openxmlformats.org/presentationml/2006/main">
+  <p:cSld>
+    <p:spTree>
+      <p:nvGrpSpPr>
+        <p:cNvPr id="1" name=""/>
+        <p:cNvGrpSpPr/>
+        <p:nvPr/>
+      </p:nvGrpSpPr>
+      <p:grpSpPr>
+        <a:xfrm>
+          <a:off x="0" y="0"/>
+          <a:ext cx="0" cy="0"/>
+          <a:chOff x="0" y="0"/>
+          <a:chExt cx="0" cy="0"/>
+        </a:xfrm>
+      </p:grpSpPr>
+      <p:sp>
+        <p:nvSpPr>
+          <p:cNvPr id="2" name="Title 1"/>
+          <p:cNvSpPr>
+            <a:spLocks noGrp="1"/>
+          </p:cNvSpPr>
+          <p:nvPr>
+            <p:ph type="title"/>
+          </p:nvPr>
+        </p:nvSpPr>
+        <p:spPr/>
+        <p:txBody>
+          <a:bodyPr/>
+          <a:lstStyle/>
+          <a:p>
+            <a:r>
+              <a:rPr lang="en-US" dirty="0" smtClean="0"/>
+              <a:t>Crystal Bog (CB) v. Trout Bog (TB)</a:t>
+            </a:r>
+            <a:endParaRPr lang="en-US" dirty="0"/>
+          </a:p>
+        </p:txBody>
+      </p:sp>
+      <p:sp>
+        <p:nvSpPr>
+          <p:cNvPr id="3" name="Content Placeholder 2"/>
+          <p:cNvSpPr>
+            <a:spLocks noGrp="1"/>
+          </p:cNvSpPr>
+          <p:nvPr>
+            <p:ph idx="1"/>
+          </p:nvPr>
+        </p:nvSpPr>
+        <p:spPr/>
+        <p:txBody>
+          <a:bodyPr>
+            <a:normAutofit lnSpcReduction="10000"/>
+          </a:bodyPr>
+          <a:lstStyle/>
+          <a:p>
+            <a:r>
+              <a:rPr lang="en-US" dirty="0" smtClean="0"/>
+              <a:t>Both dystrophic (high in DOC)</a:t>
+            </a:r>
+          </a:p>
+          <a:p>
+            <a:r>
+              <a:rPr lang="en-US" dirty="0" smtClean="0"/>
+              <a:t>Both seepage lakes</a:t>
+            </a:r>
+          </a:p>
+          <a:p>
+            <a:r>
+              <a:rPr lang="en-US" dirty="0" smtClean="0"/>
+              <a:t>Share 45-60% of their top 20 clades based on 16S tags</a:t>
+            </a:r>
+          </a:p>
+          <a:p>
+            <a:r>
+              <a:rPr lang="en-US" dirty="0" smtClean="0"/>
+              <a:t>Different mixing regimes </a:t>
+            </a:r>
+          </a:p>
+          <a:p>
+            <a:r>
+              <a:rPr lang="en-US" dirty="0" smtClean="0"/>
+              <a:t>CB has a smaller surface area</a:t>
+            </a:r>
+          </a:p>
+          <a:p>
+            <a:r>
+              <a:rPr lang="en-US" dirty="0" smtClean="0"/>
+              <a:t>TB is deeper</a:t>
+            </a:r>
+          </a:p>
+          <a:p>
+            <a:r>
+              <a:rPr lang="en-US" dirty="0" smtClean="0"/>
+              <a:t>About 5 miles apart</a:t>
+            </a:r>
+          </a:p>
+        </p:txBody>
+      </p:sp>
+    </p:spTree>
+    <p:extLst>
+      <p:ext uri="{BB962C8B-B14F-4D97-AF65-F5344CB8AC3E}">
+        <p14:creationId xmlns:p14="http://schemas.microsoft.com/office/powerpoint/2010/main" val="954074340"/>
+      </p:ext>
+    </p:extLst>
+  </p:cSld>
+  <p:clrMapOvr>
+    <a:masterClrMapping/>
+  </p:clrMapOvr>
+  <p:timing>
+    <p:tnLst>
+      <p:par>
+        <p:cTn xmlns:p14="http://schemas.microsoft.com/office/powerpoint/2010/main" id="1" dur="indefinite" restart="never" nodeType="tmRoot"/>
+      </p:par>
+    </p:tnLst>
+  </p:timing>
+</p:sld>
+</file>
+
+<file path=ppt/slides/slide17.xml><?xml version="1.0" encoding="utf-8"?>
+<p:sld xmlns:a="http://schemas.openxmlformats.org/drawingml/2006/main" xmlns:r="http://schemas.openxmlformats.org/officeDocument/2006/relationships" xmlns:p="http://schemas.openxmlformats.org/presentationml/2006/main">
+  <p:cSld>
+    <p:spTree>
+      <p:nvGrpSpPr>
+        <p:cNvPr id="1" name=""/>
+        <p:cNvGrpSpPr/>
+        <p:nvPr/>
+      </p:nvGrpSpPr>
+      <p:grpSpPr>
+        <a:xfrm>
+          <a:off x="0" y="0"/>
+          <a:ext cx="0" cy="0"/>
+          <a:chOff x="0" y="0"/>
+          <a:chExt cx="0" cy="0"/>
+        </a:xfrm>
+      </p:grpSpPr>
+      <p:sp>
+        <p:nvSpPr>
+          <p:cNvPr id="2" name="Title 1"/>
+          <p:cNvSpPr>
+            <a:spLocks noGrp="1"/>
+          </p:cNvSpPr>
+          <p:nvPr>
+            <p:ph type="title"/>
+          </p:nvPr>
+        </p:nvSpPr>
+        <p:spPr/>
+        <p:txBody>
+          <a:bodyPr/>
+          <a:lstStyle/>
+          <a:p>
+            <a:r>
+              <a:rPr lang="en-US" dirty="0" smtClean="0"/>
               <a:t>Next Questions</a:t>
             </a:r>
             <a:endParaRPr lang="en-US" dirty="0"/>
@@ -4690,11 +6351,7 @@
           <a:p>
             <a:r>
               <a:rPr lang="en-US" dirty="0" smtClean="0"/>
-              <a:t>How </a:t>
-            </a:r>
-            <a:r>
-              <a:rPr lang="en-US" dirty="0" smtClean="0"/>
-              <a:t>similar are they based on ANI?</a:t>
+              <a:t>How similar are they based on ANI?</a:t>
             </a:r>
           </a:p>
           <a:p>
@@ -4742,24 +6399,11 @@
               <a:rPr lang="en-US" dirty="0" smtClean="0"/>
               <a:t>Is there evidence for (ecological or physical) barrier to recombination?</a:t>
             </a:r>
-            <a:endParaRPr lang="en-US" dirty="0" smtClean="0"/>
           </a:p>
           <a:p>
             <a:r>
               <a:rPr lang="en-US" dirty="0" smtClean="0"/>
-              <a:t>Might also be able to compare </a:t>
-            </a:r>
-            <a:r>
-              <a:rPr lang="en-US" dirty="0" smtClean="0"/>
-              <a:t>MAG</a:t>
-            </a:r>
-            <a:r>
-              <a:rPr lang="en-US" dirty="0" smtClean="0"/>
-              <a:t>s </a:t>
-            </a:r>
-            <a:r>
-              <a:rPr lang="en-US" dirty="0" smtClean="0"/>
-              <a:t>from Mary Lake </a:t>
+              <a:t>Might also be able to compare MAGs from Mary Lake </a:t>
             </a:r>
             <a:endParaRPr lang="en-US" dirty="0"/>
           </a:p>
@@ -4859,11 +6503,7 @@
           <a:p>
             <a:r>
               <a:rPr lang="en-US" dirty="0" smtClean="0"/>
-              <a:t>Next </a:t>
-            </a:r>
-            <a:r>
-              <a:rPr lang="en-US" dirty="0" smtClean="0"/>
-              <a:t>Questions</a:t>
+              <a:t>Next Questions</a:t>
             </a:r>
           </a:p>
           <a:p>
@@ -4887,7 +6527,6 @@
               <a:rPr lang="en-US" dirty="0" smtClean="0"/>
               <a:t>Comparison of shared Trout Bog and Crystal Bog populations</a:t>
             </a:r>
-            <a:endParaRPr lang="en-US" dirty="0" smtClean="0"/>
           </a:p>
           <a:p>
             <a:endParaRPr lang="en-US" dirty="0"/>
@@ -4941,6 +6580,36 @@
             <p:ph type="title"/>
           </p:nvPr>
         </p:nvSpPr>
+        <p:spPr>
+          <a:xfrm>
+            <a:off x="457200" y="147633"/>
+            <a:ext cx="8229600" cy="1143000"/>
+          </a:xfrm>
+        </p:spPr>
+        <p:txBody>
+          <a:bodyPr>
+            <a:normAutofit fontScale="90000"/>
+          </a:bodyPr>
+          <a:lstStyle/>
+          <a:p>
+            <a:r>
+              <a:rPr lang="en-US" dirty="0" smtClean="0"/>
+              <a:t>Microbes Perform Many Nutrient Transformations in Lakes</a:t>
+            </a:r>
+            <a:endParaRPr lang="en-US" dirty="0"/>
+          </a:p>
+        </p:txBody>
+      </p:sp>
+      <p:sp>
+        <p:nvSpPr>
+          <p:cNvPr id="3" name="Content Placeholder 2"/>
+          <p:cNvSpPr>
+            <a:spLocks noGrp="1"/>
+          </p:cNvSpPr>
+          <p:nvPr>
+            <p:ph idx="1"/>
+          </p:nvPr>
+        </p:nvSpPr>
         <p:spPr/>
         <p:txBody>
           <a:bodyPr/>
@@ -4950,6 +6619,335 @@
           </a:p>
         </p:txBody>
       </p:sp>
+      <p:pic>
+        <p:nvPicPr>
+          <p:cNvPr id="5" name="Picture 4" descr="MicrobialFoodWeb-2.pdf"/>
+          <p:cNvPicPr>
+            <a:picLocks noChangeAspect="1"/>
+          </p:cNvPicPr>
+          <p:nvPr/>
+        </p:nvPicPr>
+        <p:blipFill>
+          <a:blip r:embed="rId3">
+            <a:extLst>
+              <a:ext uri="{28A0092B-C50C-407E-A947-70E740481C1C}">
+                <a14:useLocalDpi xmlns:a14="http://schemas.microsoft.com/office/drawing/2010/main" val="0"/>
+              </a:ext>
+            </a:extLst>
+          </a:blip>
+          <a:stretch>
+            <a:fillRect/>
+          </a:stretch>
+        </p:blipFill>
+        <p:spPr>
+          <a:xfrm>
+            <a:off x="550336" y="1370262"/>
+            <a:ext cx="8043333" cy="5237975"/>
+          </a:xfrm>
+          <a:prstGeom prst="rect">
+            <a:avLst/>
+          </a:prstGeom>
+        </p:spPr>
+      </p:pic>
+      <p:sp>
+        <p:nvSpPr>
+          <p:cNvPr id="6" name="Rectangle 5"/>
+          <p:cNvSpPr/>
+          <p:nvPr/>
+        </p:nvSpPr>
+        <p:spPr>
+          <a:xfrm>
+            <a:off x="4110074" y="6263243"/>
+            <a:ext cx="4475128" cy="369332"/>
+          </a:xfrm>
+          <a:prstGeom prst="rect">
+            <a:avLst/>
+          </a:prstGeom>
+        </p:spPr>
+        <p:txBody>
+          <a:bodyPr wrap="none">
+            <a:spAutoFit/>
+          </a:bodyPr>
+          <a:lstStyle/>
+          <a:p>
+            <a:r>
+              <a:rPr lang="en-US" dirty="0" err="1"/>
+              <a:t>Azam</a:t>
+            </a:r>
+            <a:r>
+              <a:rPr lang="en-US" dirty="0"/>
+              <a:t> and </a:t>
+            </a:r>
+            <a:r>
+              <a:rPr lang="en-US" dirty="0" err="1"/>
+              <a:t>Malfatti</a:t>
+            </a:r>
+            <a:r>
+              <a:rPr lang="en-US" dirty="0"/>
+              <a:t> Nature Rev </a:t>
+            </a:r>
+            <a:r>
+              <a:rPr lang="en-US" dirty="0" err="1"/>
+              <a:t>Microbiol</a:t>
+            </a:r>
+            <a:r>
+              <a:rPr lang="en-US" dirty="0"/>
+              <a:t> 2007</a:t>
+            </a:r>
+          </a:p>
+        </p:txBody>
+      </p:sp>
+    </p:spTree>
+    <p:extLst>
+      <p:ext uri="{BB962C8B-B14F-4D97-AF65-F5344CB8AC3E}">
+        <p14:creationId xmlns:p14="http://schemas.microsoft.com/office/powerpoint/2010/main" val="1712300433"/>
+      </p:ext>
+    </p:extLst>
+  </p:cSld>
+  <p:clrMapOvr>
+    <a:masterClrMapping/>
+  </p:clrMapOvr>
+  <p:timing>
+    <p:tnLst>
+      <p:par>
+        <p:cTn xmlns:p14="http://schemas.microsoft.com/office/powerpoint/2010/main" id="1" dur="indefinite" restart="never" nodeType="tmRoot"/>
+      </p:par>
+    </p:tnLst>
+  </p:timing>
+</p:sld>
+</file>
+
+<file path=ppt/slides/slide4.xml><?xml version="1.0" encoding="utf-8"?>
+<p:sld xmlns:a="http://schemas.openxmlformats.org/drawingml/2006/main" xmlns:r="http://schemas.openxmlformats.org/officeDocument/2006/relationships" xmlns:p="http://schemas.openxmlformats.org/presentationml/2006/main">
+  <p:cSld>
+    <p:spTree>
+      <p:nvGrpSpPr>
+        <p:cNvPr id="1" name=""/>
+        <p:cNvGrpSpPr/>
+        <p:nvPr/>
+      </p:nvGrpSpPr>
+      <p:grpSpPr>
+        <a:xfrm>
+          <a:off x="0" y="0"/>
+          <a:ext cx="0" cy="0"/>
+          <a:chOff x="0" y="0"/>
+          <a:chExt cx="0" cy="0"/>
+        </a:xfrm>
+      </p:grpSpPr>
+      <p:pic>
+        <p:nvPicPr>
+          <p:cNvPr id="2050" name="Picture 3" descr="D:\kuloth\2014\July\29-07-2014\nrg_aop\slides_img\nrg3785-f1.jpg"/>
+          <p:cNvPicPr>
+            <a:picLocks noChangeAspect="1" noChangeArrowheads="1"/>
+          </p:cNvPicPr>
+          <p:nvPr/>
+        </p:nvPicPr>
+        <p:blipFill>
+          <a:blip r:embed="rId2">
+            <a:extLst>
+              <a:ext uri="{28A0092B-C50C-407E-A947-70E740481C1C}">
+                <a14:useLocalDpi xmlns:a14="http://schemas.microsoft.com/office/drawing/2010/main" val="0"/>
+              </a:ext>
+            </a:extLst>
+          </a:blip>
+          <a:srcRect/>
+          <a:stretch>
+            <a:fillRect/>
+          </a:stretch>
+        </p:blipFill>
+        <p:spPr bwMode="auto">
+          <a:xfrm>
+            <a:off x="1974850" y="609600"/>
+            <a:ext cx="5194300" cy="5638800"/>
+          </a:xfrm>
+          <a:prstGeom prst="rect">
+            <a:avLst/>
+          </a:prstGeom>
+          <a:noFill/>
+          <a:ln>
+            <a:noFill/>
+          </a:ln>
+          <a:extLst>
+            <a:ext uri="{909E8E84-426E-40dd-AFC4-6F175D3DCCD1}">
+              <a14:hiddenFill xmlns:a14="http://schemas.microsoft.com/office/drawing/2010/main">
+                <a:solidFill>
+                  <a:srgbClr val="FFFFFF"/>
+                </a:solidFill>
+              </a14:hiddenFill>
+            </a:ext>
+            <a:ext uri="{91240B29-F687-4f45-9708-019B960494DF}">
+              <a14:hiddenLine xmlns:a14="http://schemas.microsoft.com/office/drawing/2010/main" w="9525">
+                <a:solidFill>
+                  <a:srgbClr val="000000"/>
+                </a:solidFill>
+                <a:miter lim="800000"/>
+                <a:headEnd/>
+                <a:tailEnd/>
+              </a14:hiddenLine>
+            </a:ext>
+          </a:extLst>
+        </p:spPr>
+      </p:pic>
+      <p:sp>
+        <p:nvSpPr>
+          <p:cNvPr id="3" name="Rectangle 2"/>
+          <p:cNvSpPr/>
+          <p:nvPr/>
+        </p:nvSpPr>
+        <p:spPr>
+          <a:xfrm>
+            <a:off x="4401005" y="6386677"/>
+            <a:ext cx="4507589" cy="369332"/>
+          </a:xfrm>
+          <a:prstGeom prst="rect">
+            <a:avLst/>
+          </a:prstGeom>
+        </p:spPr>
+        <p:txBody>
+          <a:bodyPr wrap="none">
+            <a:spAutoFit/>
+          </a:bodyPr>
+          <a:lstStyle/>
+          <a:p>
+            <a:r>
+              <a:rPr lang="en-US" dirty="0" err="1"/>
+              <a:t>Lasken</a:t>
+            </a:r>
+            <a:r>
+              <a:rPr lang="en-US" dirty="0"/>
+              <a:t> and McLean Nature Rev Genetics 2014</a:t>
+            </a:r>
+            <a:endParaRPr lang="en-US" dirty="0"/>
+          </a:p>
+        </p:txBody>
+      </p:sp>
+      <p:sp>
+        <p:nvSpPr>
+          <p:cNvPr id="2" name="Rectangle 1"/>
+          <p:cNvSpPr/>
+          <p:nvPr/>
+        </p:nvSpPr>
+        <p:spPr>
+          <a:xfrm>
+            <a:off x="6117771" y="4884057"/>
+            <a:ext cx="1284515" cy="1444172"/>
+          </a:xfrm>
+          <a:prstGeom prst="rect">
+            <a:avLst/>
+          </a:prstGeom>
+          <a:noFill/>
+          <a:ln>
+            <a:solidFill>
+              <a:schemeClr val="tx1"/>
+            </a:solidFill>
+          </a:ln>
+          <a:effectLst/>
+        </p:spPr>
+        <p:style>
+          <a:lnRef idx="1">
+            <a:schemeClr val="accent1"/>
+          </a:lnRef>
+          <a:fillRef idx="3">
+            <a:schemeClr val="accent1"/>
+          </a:fillRef>
+          <a:effectRef idx="2">
+            <a:schemeClr val="accent1"/>
+          </a:effectRef>
+          <a:fontRef idx="minor">
+            <a:schemeClr val="lt1"/>
+          </a:fontRef>
+        </p:style>
+        <p:txBody>
+          <a:bodyPr rtlCol="0" anchor="ctr"/>
+          <a:lstStyle/>
+          <a:p>
+            <a:pPr algn="ctr"/>
+            <a:endParaRPr lang="en-US"/>
+          </a:p>
+        </p:txBody>
+      </p:sp>
+      <p:sp>
+        <p:nvSpPr>
+          <p:cNvPr id="5" name="Rectangle 4"/>
+          <p:cNvSpPr/>
+          <p:nvPr/>
+        </p:nvSpPr>
+        <p:spPr>
+          <a:xfrm>
+            <a:off x="2097314" y="4884057"/>
+            <a:ext cx="1284515" cy="1444172"/>
+          </a:xfrm>
+          <a:prstGeom prst="rect">
+            <a:avLst/>
+          </a:prstGeom>
+          <a:noFill/>
+          <a:ln>
+            <a:solidFill>
+              <a:schemeClr val="tx1"/>
+            </a:solidFill>
+          </a:ln>
+          <a:effectLst/>
+        </p:spPr>
+        <p:style>
+          <a:lnRef idx="1">
+            <a:schemeClr val="accent1"/>
+          </a:lnRef>
+          <a:fillRef idx="3">
+            <a:schemeClr val="accent1"/>
+          </a:fillRef>
+          <a:effectRef idx="2">
+            <a:schemeClr val="accent1"/>
+          </a:effectRef>
+          <a:fontRef idx="minor">
+            <a:schemeClr val="lt1"/>
+          </a:fontRef>
+        </p:style>
+        <p:txBody>
+          <a:bodyPr rtlCol="0" anchor="ctr"/>
+          <a:lstStyle/>
+          <a:p>
+            <a:pPr algn="ctr"/>
+            <a:endParaRPr lang="en-US"/>
+          </a:p>
+        </p:txBody>
+      </p:sp>
+    </p:spTree>
+    <p:extLst>
+      <p:ext uri="{BB962C8B-B14F-4D97-AF65-F5344CB8AC3E}">
+        <p14:creationId xmlns:p14="http://schemas.microsoft.com/office/powerpoint/2010/main" val="2669988169"/>
+      </p:ext>
+    </p:extLst>
+  </p:cSld>
+  <p:clrMapOvr>
+    <a:masterClrMapping/>
+  </p:clrMapOvr>
+  <p:timing>
+    <p:tnLst>
+      <p:par>
+        <p:cTn xmlns:p14="http://schemas.microsoft.com/office/powerpoint/2010/main" id="1" dur="indefinite" restart="never" nodeType="tmRoot"/>
+      </p:par>
+    </p:tnLst>
+  </p:timing>
+</p:sld>
+</file>
+
+<file path=ppt/slides/slide5.xml><?xml version="1.0" encoding="utf-8"?>
+<p:sld xmlns:a="http://schemas.openxmlformats.org/drawingml/2006/main" xmlns:r="http://schemas.openxmlformats.org/officeDocument/2006/relationships" xmlns:p="http://schemas.openxmlformats.org/presentationml/2006/main">
+  <p:cSld>
+    <p:spTree>
+      <p:nvGrpSpPr>
+        <p:cNvPr id="1" name=""/>
+        <p:cNvGrpSpPr/>
+        <p:nvPr/>
+      </p:nvGrpSpPr>
+      <p:grpSpPr>
+        <a:xfrm>
+          <a:off x="0" y="0"/>
+          <a:ext cx="0" cy="0"/>
+          <a:chOff x="0" y="0"/>
+          <a:chExt cx="0" cy="0"/>
+        </a:xfrm>
+      </p:grpSpPr>
       <p:sp>
         <p:nvSpPr>
           <p:cNvPr id="3" name="Content Placeholder 2"/>
@@ -4991,8 +6989,8 @@
         </p:blipFill>
         <p:spPr>
           <a:xfrm>
-            <a:off x="442686" y="1503546"/>
-            <a:ext cx="8302171" cy="4808207"/>
+            <a:off x="87714" y="881210"/>
+            <a:ext cx="9056286" cy="5244953"/>
           </a:xfrm>
           <a:prstGeom prst="rect">
             <a:avLst/>
@@ -5003,370 +7001,6 @@
     <p:extLst>
       <p:ext uri="{BB962C8B-B14F-4D97-AF65-F5344CB8AC3E}">
         <p14:creationId xmlns:p14="http://schemas.microsoft.com/office/powerpoint/2010/main" val="2721237674"/>
-      </p:ext>
-    </p:extLst>
-  </p:cSld>
-  <p:clrMapOvr>
-    <a:masterClrMapping/>
-  </p:clrMapOvr>
-</p:sld>
-</file>
-
-<file path=ppt/slides/slide4.xml><?xml version="1.0" encoding="utf-8"?>
-<p:sld xmlns:a="http://schemas.openxmlformats.org/drawingml/2006/main" xmlns:r="http://schemas.openxmlformats.org/officeDocument/2006/relationships" xmlns:p="http://schemas.openxmlformats.org/presentationml/2006/main">
-  <p:cSld>
-    <p:spTree>
-      <p:nvGrpSpPr>
-        <p:cNvPr id="1" name=""/>
-        <p:cNvGrpSpPr/>
-        <p:nvPr/>
-      </p:nvGrpSpPr>
-      <p:grpSpPr>
-        <a:xfrm>
-          <a:off x="0" y="0"/>
-          <a:ext cx="0" cy="0"/>
-          <a:chOff x="0" y="0"/>
-          <a:chExt cx="0" cy="0"/>
-        </a:xfrm>
-      </p:grpSpPr>
-      <p:pic>
-        <p:nvPicPr>
-          <p:cNvPr id="4" name="Picture 3" descr="PTXSvB1_L06only.png"/>
-          <p:cNvPicPr>
-            <a:picLocks noChangeAspect="1"/>
-          </p:cNvPicPr>
-          <p:nvPr/>
-        </p:nvPicPr>
-        <p:blipFill>
-          <a:blip r:embed="rId2">
-            <a:extLst>
-              <a:ext uri="{28A0092B-C50C-407E-A947-70E740481C1C}">
-                <a14:useLocalDpi xmlns:a14="http://schemas.microsoft.com/office/drawing/2010/main" val="0"/>
-              </a:ext>
-            </a:extLst>
-          </a:blip>
-          <a:stretch>
-            <a:fillRect/>
-          </a:stretch>
-        </p:blipFill>
-        <p:spPr>
-          <a:xfrm>
-            <a:off x="1211149" y="1319006"/>
-            <a:ext cx="6721702" cy="5120640"/>
-          </a:xfrm>
-          <a:prstGeom prst="rect">
-            <a:avLst/>
-          </a:prstGeom>
-        </p:spPr>
-      </p:pic>
-      <p:sp>
-        <p:nvSpPr>
-          <p:cNvPr id="5" name="TextBox 4"/>
-          <p:cNvSpPr txBox="1"/>
-          <p:nvPr/>
-        </p:nvSpPr>
-        <p:spPr>
-          <a:xfrm>
-            <a:off x="5555570" y="6488668"/>
-            <a:ext cx="3588430" cy="369332"/>
-          </a:xfrm>
-          <a:prstGeom prst="rect">
-            <a:avLst/>
-          </a:prstGeom>
-          <a:noFill/>
-        </p:spPr>
-        <p:txBody>
-          <a:bodyPr wrap="none" rtlCol="0">
-            <a:spAutoFit/>
-          </a:bodyPr>
-          <a:lstStyle/>
-          <a:p>
-            <a:r>
-              <a:rPr lang="en-US" dirty="0" smtClean="0"/>
-              <a:t>Mendota </a:t>
-            </a:r>
-            <a:r>
-              <a:rPr lang="en-US" dirty="0" err="1" smtClean="0"/>
-              <a:t>metagenome</a:t>
-            </a:r>
-            <a:r>
-              <a:rPr lang="en-US" dirty="0" smtClean="0"/>
-              <a:t>: 9 June 2009 </a:t>
-            </a:r>
-            <a:endParaRPr lang="en-US" dirty="0"/>
-          </a:p>
-        </p:txBody>
-      </p:sp>
-      <p:sp>
-        <p:nvSpPr>
-          <p:cNvPr id="6" name="TextBox 5"/>
-          <p:cNvSpPr txBox="1"/>
-          <p:nvPr/>
-        </p:nvSpPr>
-        <p:spPr>
-          <a:xfrm>
-            <a:off x="4783343" y="1664682"/>
-            <a:ext cx="3205099" cy="369332"/>
-          </a:xfrm>
-          <a:prstGeom prst="rect">
-            <a:avLst/>
-          </a:prstGeom>
-          <a:noFill/>
-        </p:spPr>
-        <p:txBody>
-          <a:bodyPr wrap="none" rtlCol="0">
-            <a:spAutoFit/>
-          </a:bodyPr>
-          <a:lstStyle/>
-          <a:p>
-            <a:r>
-              <a:rPr lang="en-US" dirty="0" smtClean="0"/>
-              <a:t>Subject: acI-B1 from L. Mendota</a:t>
-            </a:r>
-            <a:endParaRPr lang="en-US" dirty="0"/>
-          </a:p>
-        </p:txBody>
-      </p:sp>
-      <p:sp>
-        <p:nvSpPr>
-          <p:cNvPr id="8" name="Left Brace 7"/>
-          <p:cNvSpPr/>
-          <p:nvPr/>
-        </p:nvSpPr>
-        <p:spPr>
-          <a:xfrm rot="5400000">
-            <a:off x="5356347" y="4395594"/>
-            <a:ext cx="398445" cy="747127"/>
-          </a:xfrm>
-          <a:prstGeom prst="leftBrace">
-            <a:avLst/>
-          </a:prstGeom>
-          <a:ln>
-            <a:solidFill>
-              <a:schemeClr val="tx1"/>
-            </a:solidFill>
-          </a:ln>
-          <a:effectLst/>
-        </p:spPr>
-        <p:style>
-          <a:lnRef idx="2">
-            <a:schemeClr val="accent1"/>
-          </a:lnRef>
-          <a:fillRef idx="0">
-            <a:schemeClr val="accent1"/>
-          </a:fillRef>
-          <a:effectRef idx="1">
-            <a:schemeClr val="accent1"/>
-          </a:effectRef>
-          <a:fontRef idx="minor">
-            <a:schemeClr val="tx1"/>
-          </a:fontRef>
-        </p:style>
-        <p:txBody>
-          <a:bodyPr rtlCol="0" anchor="ctr"/>
-          <a:lstStyle/>
-          <a:p>
-            <a:pPr algn="ctr"/>
-            <a:endParaRPr lang="en-US"/>
-          </a:p>
-        </p:txBody>
-      </p:sp>
-      <p:sp>
-        <p:nvSpPr>
-          <p:cNvPr id="9" name="TextBox 8"/>
-          <p:cNvSpPr txBox="1"/>
-          <p:nvPr/>
-        </p:nvSpPr>
-        <p:spPr>
-          <a:xfrm>
-            <a:off x="4857696" y="4084292"/>
-            <a:ext cx="1395747" cy="369332"/>
-          </a:xfrm>
-          <a:prstGeom prst="rect">
-            <a:avLst/>
-          </a:prstGeom>
-          <a:noFill/>
-        </p:spPr>
-        <p:txBody>
-          <a:bodyPr wrap="none" rtlCol="0">
-            <a:spAutoFit/>
-          </a:bodyPr>
-          <a:lstStyle/>
-          <a:p>
-            <a:r>
-              <a:rPr lang="en-US" dirty="0" smtClean="0"/>
-              <a:t>discontinuity</a:t>
-            </a:r>
-            <a:endParaRPr lang="en-US" dirty="0"/>
-          </a:p>
-        </p:txBody>
-      </p:sp>
-      <p:sp>
-        <p:nvSpPr>
-          <p:cNvPr id="2" name="Title 1"/>
-          <p:cNvSpPr>
-            <a:spLocks noGrp="1"/>
-          </p:cNvSpPr>
-          <p:nvPr>
-            <p:ph type="title"/>
-          </p:nvPr>
-        </p:nvSpPr>
-        <p:spPr>
-          <a:xfrm>
-            <a:off x="457200" y="161877"/>
-            <a:ext cx="8229600" cy="1255761"/>
-          </a:xfrm>
-        </p:spPr>
-        <p:txBody>
-          <a:bodyPr>
-            <a:normAutofit fontScale="90000"/>
-          </a:bodyPr>
-          <a:lstStyle/>
-          <a:p>
-            <a:r>
-              <a:rPr lang="en-US" dirty="0" smtClean="0"/>
-              <a:t>SAGs allow us to capture sequence discrete populations</a:t>
-            </a:r>
-            <a:endParaRPr lang="en-US" dirty="0"/>
-          </a:p>
-        </p:txBody>
-      </p:sp>
-    </p:spTree>
-    <p:extLst>
-      <p:ext uri="{BB962C8B-B14F-4D97-AF65-F5344CB8AC3E}">
-        <p14:creationId xmlns:p14="http://schemas.microsoft.com/office/powerpoint/2010/main" val="399616156"/>
-      </p:ext>
-    </p:extLst>
-  </p:cSld>
-  <p:clrMapOvr>
-    <a:masterClrMapping/>
-  </p:clrMapOvr>
-</p:sld>
-</file>
-
-<file path=ppt/slides/slide5.xml><?xml version="1.0" encoding="utf-8"?>
-<p:sld xmlns:a="http://schemas.openxmlformats.org/drawingml/2006/main" xmlns:r="http://schemas.openxmlformats.org/officeDocument/2006/relationships" xmlns:p="http://schemas.openxmlformats.org/presentationml/2006/main">
-  <p:cSld>
-    <p:spTree>
-      <p:nvGrpSpPr>
-        <p:cNvPr id="1" name=""/>
-        <p:cNvGrpSpPr/>
-        <p:nvPr/>
-      </p:nvGrpSpPr>
-      <p:grpSpPr>
-        <a:xfrm>
-          <a:off x="0" y="0"/>
-          <a:ext cx="0" cy="0"/>
-          <a:chOff x="0" y="0"/>
-          <a:chExt cx="0" cy="0"/>
-        </a:xfrm>
-      </p:grpSpPr>
-      <p:sp>
-        <p:nvSpPr>
-          <p:cNvPr id="2" name="Title 1"/>
-          <p:cNvSpPr>
-            <a:spLocks noGrp="1"/>
-          </p:cNvSpPr>
-          <p:nvPr>
-            <p:ph type="title"/>
-          </p:nvPr>
-        </p:nvSpPr>
-        <p:spPr>
-          <a:xfrm>
-            <a:off x="457200" y="274638"/>
-            <a:ext cx="8229600" cy="833600"/>
-          </a:xfrm>
-        </p:spPr>
-        <p:txBody>
-          <a:bodyPr/>
-          <a:lstStyle/>
-          <a:p>
-            <a:r>
-              <a:rPr lang="en-US" dirty="0" smtClean="0"/>
-              <a:t>Sequence discrete populations</a:t>
-            </a:r>
-            <a:endParaRPr lang="en-US" dirty="0"/>
-          </a:p>
-        </p:txBody>
-      </p:sp>
-      <p:pic>
-        <p:nvPicPr>
-          <p:cNvPr id="4" name="Picture 2"/>
-          <p:cNvPicPr>
-            <a:picLocks noChangeAspect="1" noChangeArrowheads="1"/>
-          </p:cNvPicPr>
-          <p:nvPr/>
-        </p:nvPicPr>
-        <p:blipFill>
-          <a:blip r:embed="rId3" cstate="print"/>
-          <a:srcRect/>
-          <a:stretch>
-            <a:fillRect/>
-          </a:stretch>
-        </p:blipFill>
-        <p:spPr bwMode="auto">
-          <a:xfrm>
-            <a:off x="1538688" y="1163788"/>
-            <a:ext cx="6094023" cy="5015850"/>
-          </a:xfrm>
-          <a:prstGeom prst="rect">
-            <a:avLst/>
-          </a:prstGeom>
-          <a:noFill/>
-          <a:ln w="9525">
-            <a:noFill/>
-            <a:round/>
-            <a:headEnd/>
-            <a:tailEnd/>
-          </a:ln>
-        </p:spPr>
-      </p:pic>
-      <p:sp>
-        <p:nvSpPr>
-          <p:cNvPr id="5" name="TextBox 4"/>
-          <p:cNvSpPr txBox="1"/>
-          <p:nvPr/>
-        </p:nvSpPr>
-        <p:spPr>
-          <a:xfrm>
-            <a:off x="5181385" y="6439857"/>
-            <a:ext cx="3783270" cy="307777"/>
-          </a:xfrm>
-          <a:prstGeom prst="rect">
-            <a:avLst/>
-          </a:prstGeom>
-          <a:noFill/>
-        </p:spPr>
-        <p:txBody>
-          <a:bodyPr wrap="none" rtlCol="0">
-            <a:spAutoFit/>
-          </a:bodyPr>
-          <a:lstStyle/>
-          <a:p>
-            <a:r>
-              <a:rPr lang="en-US" sz="1400" i="1" dirty="0" smtClean="0"/>
-              <a:t>Caro-Quintero and </a:t>
-            </a:r>
-            <a:r>
-              <a:rPr lang="en-US" sz="1400" i="1" dirty="0" err="1" smtClean="0"/>
-              <a:t>Konstantinidis</a:t>
-            </a:r>
-            <a:r>
-              <a:rPr lang="en-US" sz="1400" i="1" dirty="0" smtClean="0"/>
-              <a:t> 2012 </a:t>
-            </a:r>
-            <a:r>
-              <a:rPr lang="en-US" sz="1400" i="1" dirty="0" err="1" smtClean="0"/>
-              <a:t>EnvMicro</a:t>
-            </a:r>
-            <a:endParaRPr lang="en-US" sz="1400" i="1" dirty="0"/>
-          </a:p>
-        </p:txBody>
-      </p:sp>
-    </p:spTree>
-    <p:extLst>
-      <p:ext uri="{BB962C8B-B14F-4D97-AF65-F5344CB8AC3E}">
-        <p14:creationId xmlns:p14="http://schemas.microsoft.com/office/powerpoint/2010/main" val="3711425285"/>
       </p:ext>
     </p:extLst>
   </p:cSld>
@@ -5598,13 +7232,20 @@
     </p:spTree>
     <p:extLst>
       <p:ext uri="{BB962C8B-B14F-4D97-AF65-F5344CB8AC3E}">
-        <p14:creationId xmlns:p14="http://schemas.microsoft.com/office/powerpoint/2010/main" val="1633372005"/>
+        <p14:creationId xmlns:p14="http://schemas.microsoft.com/office/powerpoint/2010/main" val="399616156"/>
       </p:ext>
     </p:extLst>
   </p:cSld>
   <p:clrMapOvr>
     <a:masterClrMapping/>
   </p:clrMapOvr>
+  <p:timing>
+    <p:tnLst>
+      <p:par>
+        <p:cTn xmlns:p14="http://schemas.microsoft.com/office/powerpoint/2010/main" id="1" dur="indefinite" restart="never" nodeType="tmRoot"/>
+      </p:par>
+    </p:tnLst>
+  </p:timing>
 </p:sld>
 </file>
 
@@ -5637,260 +7278,100 @@
         </p:nvSpPr>
         <p:spPr>
           <a:xfrm>
-            <a:off x="457200" y="131696"/>
-            <a:ext cx="8229600" cy="1143000"/>
+            <a:off x="457200" y="274638"/>
+            <a:ext cx="8229600" cy="833600"/>
           </a:xfrm>
         </p:spPr>
         <p:txBody>
           <a:bodyPr/>
           <a:lstStyle/>
           <a:p>
+            <a:r>
+              <a:rPr lang="en-US" dirty="0" smtClean="0"/>
+              <a:t>Sequence discrete populations</a:t>
+            </a:r>
             <a:endParaRPr lang="en-US" dirty="0"/>
           </a:p>
         </p:txBody>
       </p:sp>
-      <p:grpSp>
-        <p:nvGrpSpPr>
-          <p:cNvPr id="8" name="Group 7"/>
-          <p:cNvGrpSpPr/>
-          <p:nvPr/>
-        </p:nvGrpSpPr>
-        <p:grpSpPr>
-          <a:xfrm>
-            <a:off x="367390" y="1388447"/>
-            <a:ext cx="3853543" cy="4231174"/>
-            <a:chOff x="367390" y="1388447"/>
-            <a:chExt cx="3853543" cy="4231174"/>
-          </a:xfrm>
-        </p:grpSpPr>
-        <p:pic>
-          <p:nvPicPr>
-            <p:cNvPr id="3" name="Picture 2" descr="Fig3_seqdiscdenplots-20161004.pdf"/>
-            <p:cNvPicPr>
-              <a:picLocks noChangeAspect="1"/>
-            </p:cNvPicPr>
-            <p:nvPr/>
-          </p:nvPicPr>
-          <p:blipFill rotWithShape="1">
-            <a:blip r:embed="rId2">
-              <a:extLst>
-                <a:ext uri="{28A0092B-C50C-407E-A947-70E740481C1C}">
-                  <a14:useLocalDpi xmlns:a14="http://schemas.microsoft.com/office/drawing/2010/main" val="0"/>
-                </a:ext>
-              </a:extLst>
-            </a:blip>
-            <a:srcRect r="79637" b="49695"/>
-            <a:stretch/>
-          </p:blipFill>
-          <p:spPr>
-            <a:xfrm>
-              <a:off x="367390" y="1388447"/>
-              <a:ext cx="3853543" cy="4231174"/>
-            </a:xfrm>
-            <a:prstGeom prst="rect">
-              <a:avLst/>
-            </a:prstGeom>
-          </p:spPr>
-        </p:pic>
-        <p:sp>
-          <p:nvSpPr>
-            <p:cNvPr id="7" name="Rectangle 6"/>
-            <p:cNvSpPr/>
-            <p:nvPr/>
-          </p:nvSpPr>
-          <p:spPr>
-            <a:xfrm>
-              <a:off x="367390" y="1439508"/>
-              <a:ext cx="293010" cy="251406"/>
-            </a:xfrm>
-            <a:prstGeom prst="rect">
-              <a:avLst/>
-            </a:prstGeom>
-            <a:solidFill>
-              <a:schemeClr val="bg1"/>
-            </a:solidFill>
-            <a:ln>
-              <a:noFill/>
-            </a:ln>
-            <a:effectLst/>
-          </p:spPr>
-          <p:style>
-            <a:lnRef idx="1">
-              <a:schemeClr val="accent1"/>
-            </a:lnRef>
-            <a:fillRef idx="3">
-              <a:schemeClr val="accent1"/>
-            </a:fillRef>
-            <a:effectRef idx="2">
-              <a:schemeClr val="accent1"/>
-            </a:effectRef>
-            <a:fontRef idx="minor">
-              <a:schemeClr val="lt1"/>
-            </a:fontRef>
-          </p:style>
-          <p:txBody>
-            <a:bodyPr rtlCol="0" anchor="ctr"/>
-            <a:lstStyle/>
-            <a:p>
-              <a:pPr algn="ctr"/>
-              <a:endParaRPr lang="en-US"/>
-            </a:p>
-          </p:txBody>
-        </p:sp>
-      </p:grpSp>
-      <p:grpSp>
-        <p:nvGrpSpPr>
-          <p:cNvPr id="10" name="Group 9"/>
-          <p:cNvGrpSpPr/>
-          <p:nvPr/>
-        </p:nvGrpSpPr>
-        <p:grpSpPr>
-          <a:xfrm>
-            <a:off x="4706351" y="1366676"/>
-            <a:ext cx="3796137" cy="4231174"/>
-            <a:chOff x="4876149" y="1388447"/>
-            <a:chExt cx="3796137" cy="4231174"/>
-          </a:xfrm>
-        </p:grpSpPr>
-        <p:pic>
-          <p:nvPicPr>
-            <p:cNvPr id="4" name="Picture 3" descr="Fig3_seqdiscdenplots-20161004.pdf"/>
-            <p:cNvPicPr>
-              <a:picLocks noChangeAspect="1"/>
-            </p:cNvPicPr>
-            <p:nvPr/>
-          </p:nvPicPr>
-          <p:blipFill rotWithShape="1">
-            <a:blip r:embed="rId3">
-              <a:extLst>
-                <a:ext uri="{28A0092B-C50C-407E-A947-70E740481C1C}">
-                  <a14:useLocalDpi xmlns:a14="http://schemas.microsoft.com/office/drawing/2010/main" val="0"/>
-                </a:ext>
-              </a:extLst>
-            </a:blip>
-            <a:srcRect t="49884" r="79773"/>
-            <a:stretch/>
-          </p:blipFill>
-          <p:spPr>
-            <a:xfrm>
-              <a:off x="4876149" y="1439508"/>
-              <a:ext cx="3796137" cy="4180113"/>
-            </a:xfrm>
-            <a:prstGeom prst="rect">
-              <a:avLst/>
-            </a:prstGeom>
-          </p:spPr>
-        </p:pic>
-        <p:sp>
-          <p:nvSpPr>
-            <p:cNvPr id="9" name="Rectangle 8"/>
-            <p:cNvSpPr/>
-            <p:nvPr/>
-          </p:nvSpPr>
-          <p:spPr>
-            <a:xfrm>
-              <a:off x="4876149" y="1388447"/>
-              <a:ext cx="348994" cy="302467"/>
-            </a:xfrm>
-            <a:prstGeom prst="rect">
-              <a:avLst/>
-            </a:prstGeom>
-            <a:solidFill>
-              <a:srgbClr val="FFFFFF"/>
-            </a:solidFill>
-            <a:ln>
-              <a:solidFill>
-                <a:srgbClr val="FFFFFF"/>
-              </a:solidFill>
-            </a:ln>
-            <a:effectLst/>
-          </p:spPr>
-          <p:style>
-            <a:lnRef idx="1">
-              <a:schemeClr val="accent1"/>
-            </a:lnRef>
-            <a:fillRef idx="3">
-              <a:schemeClr val="accent1"/>
-            </a:fillRef>
-            <a:effectRef idx="2">
-              <a:schemeClr val="accent1"/>
-            </a:effectRef>
-            <a:fontRef idx="minor">
-              <a:schemeClr val="lt1"/>
-            </a:fontRef>
-          </p:style>
-          <p:txBody>
-            <a:bodyPr rtlCol="0" anchor="ctr"/>
-            <a:lstStyle/>
-            <a:p>
-              <a:pPr algn="ctr"/>
-              <a:endParaRPr lang="en-US"/>
-            </a:p>
-          </p:txBody>
-        </p:sp>
-      </p:grpSp>
       <p:pic>
         <p:nvPicPr>
-          <p:cNvPr id="5" name="Picture 4" descr="Fig3_seqdiscdenplots-20161004.pdf"/>
+          <p:cNvPr id="4" name="Picture 2"/>
           <p:cNvPicPr>
-            <a:picLocks noChangeAspect="1"/>
+            <a:picLocks noChangeAspect="1" noChangeArrowheads="1"/>
           </p:cNvPicPr>
           <p:nvPr/>
         </p:nvPicPr>
-        <p:blipFill rotWithShape="1">
-          <a:blip r:embed="rId4">
-            <a:extLst>
-              <a:ext uri="{28A0092B-C50C-407E-A947-70E740481C1C}">
-                <a14:useLocalDpi xmlns:a14="http://schemas.microsoft.com/office/drawing/2010/main" val="0"/>
-              </a:ext>
-            </a:extLst>
-          </a:blip>
-          <a:srcRect l="21089" t="12244" r="67619" b="68368"/>
-          <a:stretch/>
+        <p:blipFill>
+          <a:blip r:embed="rId3" cstate="print"/>
+          <a:srcRect/>
+          <a:stretch>
+            <a:fillRect/>
+          </a:stretch>
         </p:blipFill>
-        <p:spPr>
+        <p:spPr bwMode="auto">
           <a:xfrm>
-            <a:off x="2104571" y="5597850"/>
-            <a:ext cx="1255485" cy="957970"/>
+            <a:off x="1538688" y="1163788"/>
+            <a:ext cx="6094023" cy="5015850"/>
           </a:xfrm>
           <a:prstGeom prst="rect">
             <a:avLst/>
           </a:prstGeom>
+          <a:noFill/>
+          <a:ln w="9525">
+            <a:noFill/>
+            <a:round/>
+            <a:headEnd/>
+            <a:tailEnd/>
+          </a:ln>
         </p:spPr>
       </p:pic>
-      <p:pic>
-        <p:nvPicPr>
-          <p:cNvPr id="6" name="Picture 5" descr="Fig3_seqdiscdenplots-20161004.pdf"/>
-          <p:cNvPicPr>
-            <a:picLocks noChangeAspect="1"/>
-          </p:cNvPicPr>
+      <p:sp>
+        <p:nvSpPr>
+          <p:cNvPr id="5" name="TextBox 4"/>
+          <p:cNvSpPr txBox="1"/>
           <p:nvPr/>
-        </p:nvPicPr>
-        <p:blipFill rotWithShape="1">
-          <a:blip r:embed="rId5">
-            <a:extLst>
-              <a:ext uri="{28A0092B-C50C-407E-A947-70E740481C1C}">
-                <a14:useLocalDpi xmlns:a14="http://schemas.microsoft.com/office/drawing/2010/main" val="0"/>
-              </a:ext>
-            </a:extLst>
-          </a:blip>
-          <a:srcRect l="20227" t="58017" r="67619" b="14129"/>
-          <a:stretch/>
-        </p:blipFill>
+        </p:nvSpPr>
         <p:spPr>
           <a:xfrm>
-            <a:off x="6466535" y="5537200"/>
-            <a:ext cx="1121153" cy="1141992"/>
+            <a:off x="5181385" y="6439857"/>
+            <a:ext cx="3783270" cy="307777"/>
           </a:xfrm>
           <a:prstGeom prst="rect">
             <a:avLst/>
           </a:prstGeom>
+          <a:noFill/>
         </p:spPr>
-      </p:pic>
+        <p:txBody>
+          <a:bodyPr wrap="none" rtlCol="0">
+            <a:spAutoFit/>
+          </a:bodyPr>
+          <a:lstStyle/>
+          <a:p>
+            <a:r>
+              <a:rPr lang="en-US" sz="1400" i="1" dirty="0" smtClean="0"/>
+              <a:t>Caro-Quintero and </a:t>
+            </a:r>
+            <a:r>
+              <a:rPr lang="en-US" sz="1400" i="1" dirty="0" err="1" smtClean="0"/>
+              <a:t>Konstantinidis</a:t>
+            </a:r>
+            <a:r>
+              <a:rPr lang="en-US" sz="1400" i="1" dirty="0" smtClean="0"/>
+              <a:t> 2012 </a:t>
+            </a:r>
+            <a:r>
+              <a:rPr lang="en-US" sz="1400" i="1" dirty="0" err="1" smtClean="0"/>
+              <a:t>EnvMicro</a:t>
+            </a:r>
+            <a:endParaRPr lang="en-US" sz="1400" i="1" dirty="0"/>
+          </a:p>
+        </p:txBody>
+      </p:sp>
     </p:spTree>
     <p:extLst>
       <p:ext uri="{BB962C8B-B14F-4D97-AF65-F5344CB8AC3E}">
-        <p14:creationId xmlns:p14="http://schemas.microsoft.com/office/powerpoint/2010/main" val="3808078468"/>
+        <p14:creationId xmlns:p14="http://schemas.microsoft.com/office/powerpoint/2010/main" val="3711425285"/>
       </p:ext>
     </p:extLst>
   </p:cSld>
@@ -5924,221 +7405,15 @@
           <a:chExt cx="0" cy="0"/>
         </a:xfrm>
       </p:grpSpPr>
-      <p:sp>
-        <p:nvSpPr>
-          <p:cNvPr id="2" name="Title 1"/>
-          <p:cNvSpPr>
-            <a:spLocks noGrp="1"/>
-          </p:cNvSpPr>
-          <p:nvPr>
-            <p:ph type="title"/>
-          </p:nvPr>
-        </p:nvSpPr>
-        <p:spPr>
-          <a:xfrm>
-            <a:off x="457204" y="129495"/>
-            <a:ext cx="8229600" cy="1143000"/>
-          </a:xfrm>
-        </p:spPr>
-        <p:txBody>
-          <a:bodyPr/>
-          <a:lstStyle/>
-          <a:p>
-            <a:endParaRPr lang="en-US" dirty="0"/>
-          </a:p>
-        </p:txBody>
-      </p:sp>
-      <p:grpSp>
-        <p:nvGrpSpPr>
-          <p:cNvPr id="11" name="Group 10"/>
-          <p:cNvGrpSpPr/>
-          <p:nvPr/>
-        </p:nvGrpSpPr>
-        <p:grpSpPr>
-          <a:xfrm>
-            <a:off x="4572004" y="1366676"/>
-            <a:ext cx="3773714" cy="4159605"/>
-            <a:chOff x="4731661" y="1366676"/>
-            <a:chExt cx="3773714" cy="4159605"/>
-          </a:xfrm>
-        </p:grpSpPr>
-        <p:pic>
-          <p:nvPicPr>
-            <p:cNvPr id="5" name="Picture 4" descr="Fig3_seqdiscdenplots-20161004.pdf"/>
-            <p:cNvPicPr>
-              <a:picLocks noChangeAspect="1"/>
-            </p:cNvPicPr>
-            <p:nvPr/>
-          </p:nvPicPr>
-          <p:blipFill rotWithShape="1">
-            <a:blip r:embed="rId2">
-              <a:extLst>
-                <a:ext uri="{28A0092B-C50C-407E-A947-70E740481C1C}">
-                  <a14:useLocalDpi xmlns:a14="http://schemas.microsoft.com/office/drawing/2010/main" val="0"/>
-                </a:ext>
-              </a:extLst>
-            </a:blip>
-            <a:srcRect l="32936" t="49643" r="46666"/>
-            <a:stretch/>
-          </p:blipFill>
-          <p:spPr>
-            <a:xfrm>
-              <a:off x="4731661" y="1385473"/>
-              <a:ext cx="3773714" cy="4140808"/>
-            </a:xfrm>
-            <a:prstGeom prst="rect">
-              <a:avLst/>
-            </a:prstGeom>
-          </p:spPr>
-        </p:pic>
-        <p:sp>
-          <p:nvSpPr>
-            <p:cNvPr id="8" name="Rectangle 7"/>
-            <p:cNvSpPr/>
-            <p:nvPr/>
-          </p:nvSpPr>
-          <p:spPr>
-            <a:xfrm>
-              <a:off x="4767294" y="1366676"/>
-              <a:ext cx="348994" cy="302467"/>
-            </a:xfrm>
-            <a:prstGeom prst="rect">
-              <a:avLst/>
-            </a:prstGeom>
-            <a:solidFill>
-              <a:srgbClr val="FFFFFF"/>
-            </a:solidFill>
-            <a:ln>
-              <a:solidFill>
-                <a:srgbClr val="FFFFFF"/>
-              </a:solidFill>
-            </a:ln>
-            <a:effectLst/>
-          </p:spPr>
-          <p:style>
-            <a:lnRef idx="1">
-              <a:schemeClr val="accent1"/>
-            </a:lnRef>
-            <a:fillRef idx="3">
-              <a:schemeClr val="accent1"/>
-            </a:fillRef>
-            <a:effectRef idx="2">
-              <a:schemeClr val="accent1"/>
-            </a:effectRef>
-            <a:fontRef idx="minor">
-              <a:schemeClr val="lt1"/>
-            </a:fontRef>
-          </p:style>
-          <p:txBody>
-            <a:bodyPr rtlCol="0" anchor="ctr"/>
-            <a:lstStyle/>
-            <a:p>
-              <a:pPr algn="ctr"/>
-              <a:endParaRPr lang="en-US"/>
-            </a:p>
-          </p:txBody>
-        </p:sp>
-      </p:grpSp>
-      <p:grpSp>
-        <p:nvGrpSpPr>
-          <p:cNvPr id="10" name="Group 9"/>
-          <p:cNvGrpSpPr/>
-          <p:nvPr/>
-        </p:nvGrpSpPr>
-        <p:grpSpPr>
-          <a:xfrm>
-            <a:off x="406400" y="1366676"/>
-            <a:ext cx="3788229" cy="4191770"/>
-            <a:chOff x="406400" y="1366676"/>
-            <a:chExt cx="3788229" cy="4191770"/>
-          </a:xfrm>
-        </p:grpSpPr>
-        <p:pic>
-          <p:nvPicPr>
-            <p:cNvPr id="3" name="Picture 2" descr="Fig3_seqdiscdenplots-20161004.pdf"/>
-            <p:cNvPicPr>
-              <a:picLocks noChangeAspect="1"/>
-            </p:cNvPicPr>
-            <p:nvPr/>
-          </p:nvPicPr>
-          <p:blipFill rotWithShape="1">
-            <a:blip r:embed="rId2">
-              <a:extLst>
-                <a:ext uri="{28A0092B-C50C-407E-A947-70E740481C1C}">
-                  <a14:useLocalDpi xmlns:a14="http://schemas.microsoft.com/office/drawing/2010/main" val="0"/>
-                </a:ext>
-              </a:extLst>
-            </a:blip>
-            <a:srcRect l="33492" r="46191" b="49643"/>
-            <a:stretch/>
-          </p:blipFill>
-          <p:spPr>
-            <a:xfrm>
-              <a:off x="406400" y="1385473"/>
-              <a:ext cx="3788229" cy="4172973"/>
-            </a:xfrm>
-            <a:prstGeom prst="rect">
-              <a:avLst/>
-            </a:prstGeom>
-          </p:spPr>
-        </p:pic>
-        <p:sp>
-          <p:nvSpPr>
-            <p:cNvPr id="9" name="Rectangle 8"/>
-            <p:cNvSpPr/>
-            <p:nvPr/>
-          </p:nvSpPr>
-          <p:spPr>
-            <a:xfrm>
-              <a:off x="406400" y="1366676"/>
-              <a:ext cx="348994" cy="302467"/>
-            </a:xfrm>
-            <a:prstGeom prst="rect">
-              <a:avLst/>
-            </a:prstGeom>
-            <a:solidFill>
-              <a:srgbClr val="FFFFFF"/>
-            </a:solidFill>
-            <a:ln>
-              <a:solidFill>
-                <a:srgbClr val="FFFFFF"/>
-              </a:solidFill>
-            </a:ln>
-            <a:effectLst/>
-          </p:spPr>
-          <p:style>
-            <a:lnRef idx="1">
-              <a:schemeClr val="accent1"/>
-            </a:lnRef>
-            <a:fillRef idx="3">
-              <a:schemeClr val="accent1"/>
-            </a:fillRef>
-            <a:effectRef idx="2">
-              <a:schemeClr val="accent1"/>
-            </a:effectRef>
-            <a:fontRef idx="minor">
-              <a:schemeClr val="lt1"/>
-            </a:fontRef>
-          </p:style>
-          <p:txBody>
-            <a:bodyPr rtlCol="0" anchor="ctr"/>
-            <a:lstStyle/>
-            <a:p>
-              <a:pPr algn="ctr"/>
-              <a:endParaRPr lang="en-US"/>
-            </a:p>
-          </p:txBody>
-        </p:sp>
-      </p:grpSp>
       <p:pic>
         <p:nvPicPr>
-          <p:cNvPr id="7" name="Picture 6" descr="Fig3_seqdiscdenplots-20161004.pdf"/>
+          <p:cNvPr id="4" name="Picture 3" descr="PTXSvB1_L06only.png"/>
           <p:cNvPicPr>
             <a:picLocks noChangeAspect="1"/>
           </p:cNvPicPr>
           <p:nvPr/>
         </p:nvPicPr>
-        <p:blipFill rotWithShape="1">
+        <p:blipFill>
           <a:blip r:embed="rId2">
             <a:extLst>
               <a:ext uri="{28A0092B-C50C-407E-A947-70E740481C1C}">
@@ -6146,52 +7421,196 @@
               </a:ext>
             </a:extLst>
           </a:blip>
-          <a:srcRect l="54444" t="11964" r="35317" b="68036"/>
-          <a:stretch/>
+          <a:stretch>
+            <a:fillRect/>
+          </a:stretch>
         </p:blipFill>
         <p:spPr>
           <a:xfrm>
-            <a:off x="1923144" y="5449966"/>
-            <a:ext cx="1240971" cy="1077432"/>
+            <a:off x="1211149" y="1319006"/>
+            <a:ext cx="6721702" cy="5120640"/>
           </a:xfrm>
           <a:prstGeom prst="rect">
             <a:avLst/>
           </a:prstGeom>
         </p:spPr>
       </p:pic>
-      <p:pic>
-        <p:nvPicPr>
-          <p:cNvPr id="6" name="Picture 5" descr="Fig3_seqdiscdenplots-20161004.pdf"/>
-          <p:cNvPicPr>
-            <a:picLocks noChangeAspect="1"/>
-          </p:cNvPicPr>
+      <p:sp>
+        <p:nvSpPr>
+          <p:cNvPr id="5" name="TextBox 4"/>
+          <p:cNvSpPr txBox="1"/>
           <p:nvPr/>
-        </p:nvPicPr>
-        <p:blipFill rotWithShape="1">
-          <a:blip r:embed="rId2">
-            <a:extLst>
-              <a:ext uri="{28A0092B-C50C-407E-A947-70E740481C1C}">
-                <a14:useLocalDpi xmlns:a14="http://schemas.microsoft.com/office/drawing/2010/main" val="0"/>
-              </a:ext>
-            </a:extLst>
-          </a:blip>
-          <a:srcRect l="53492" t="61429" r="33809" b="16964"/>
-          <a:stretch/>
-        </p:blipFill>
+        </p:nvSpPr>
         <p:spPr>
           <a:xfrm>
-            <a:off x="6335486" y="5449966"/>
-            <a:ext cx="1494971" cy="1130572"/>
+            <a:off x="5555570" y="6488668"/>
+            <a:ext cx="3588430" cy="369332"/>
           </a:xfrm>
           <a:prstGeom prst="rect">
             <a:avLst/>
           </a:prstGeom>
+          <a:noFill/>
         </p:spPr>
-      </p:pic>
+        <p:txBody>
+          <a:bodyPr wrap="none" rtlCol="0">
+            <a:spAutoFit/>
+          </a:bodyPr>
+          <a:lstStyle/>
+          <a:p>
+            <a:r>
+              <a:rPr lang="en-US" dirty="0" smtClean="0"/>
+              <a:t>Mendota </a:t>
+            </a:r>
+            <a:r>
+              <a:rPr lang="en-US" dirty="0" err="1" smtClean="0"/>
+              <a:t>metagenome</a:t>
+            </a:r>
+            <a:r>
+              <a:rPr lang="en-US" dirty="0" smtClean="0"/>
+              <a:t>: 9 June 2009 </a:t>
+            </a:r>
+            <a:endParaRPr lang="en-US" dirty="0"/>
+          </a:p>
+        </p:txBody>
+      </p:sp>
+      <p:sp>
+        <p:nvSpPr>
+          <p:cNvPr id="6" name="TextBox 5"/>
+          <p:cNvSpPr txBox="1"/>
+          <p:nvPr/>
+        </p:nvSpPr>
+        <p:spPr>
+          <a:xfrm>
+            <a:off x="4783343" y="1664682"/>
+            <a:ext cx="3205099" cy="369332"/>
+          </a:xfrm>
+          <a:prstGeom prst="rect">
+            <a:avLst/>
+          </a:prstGeom>
+          <a:noFill/>
+        </p:spPr>
+        <p:txBody>
+          <a:bodyPr wrap="none" rtlCol="0">
+            <a:spAutoFit/>
+          </a:bodyPr>
+          <a:lstStyle/>
+          <a:p>
+            <a:r>
+              <a:rPr lang="en-US" dirty="0" smtClean="0"/>
+              <a:t>Subject: acI-B1 from L. Mendota</a:t>
+            </a:r>
+            <a:endParaRPr lang="en-US" dirty="0"/>
+          </a:p>
+        </p:txBody>
+      </p:sp>
+      <p:sp>
+        <p:nvSpPr>
+          <p:cNvPr id="8" name="Left Brace 7"/>
+          <p:cNvSpPr/>
+          <p:nvPr/>
+        </p:nvSpPr>
+        <p:spPr>
+          <a:xfrm rot="5400000">
+            <a:off x="5356347" y="4395594"/>
+            <a:ext cx="398445" cy="747127"/>
+          </a:xfrm>
+          <a:prstGeom prst="leftBrace">
+            <a:avLst/>
+          </a:prstGeom>
+          <a:ln>
+            <a:solidFill>
+              <a:schemeClr val="tx1"/>
+            </a:solidFill>
+          </a:ln>
+          <a:effectLst/>
+        </p:spPr>
+        <p:style>
+          <a:lnRef idx="2">
+            <a:schemeClr val="accent1"/>
+          </a:lnRef>
+          <a:fillRef idx="0">
+            <a:schemeClr val="accent1"/>
+          </a:fillRef>
+          <a:effectRef idx="1">
+            <a:schemeClr val="accent1"/>
+          </a:effectRef>
+          <a:fontRef idx="minor">
+            <a:schemeClr val="tx1"/>
+          </a:fontRef>
+        </p:style>
+        <p:txBody>
+          <a:bodyPr rtlCol="0" anchor="ctr"/>
+          <a:lstStyle/>
+          <a:p>
+            <a:pPr algn="ctr"/>
+            <a:endParaRPr lang="en-US"/>
+          </a:p>
+        </p:txBody>
+      </p:sp>
+      <p:sp>
+        <p:nvSpPr>
+          <p:cNvPr id="9" name="TextBox 8"/>
+          <p:cNvSpPr txBox="1"/>
+          <p:nvPr/>
+        </p:nvSpPr>
+        <p:spPr>
+          <a:xfrm>
+            <a:off x="4857696" y="4084292"/>
+            <a:ext cx="1395747" cy="369332"/>
+          </a:xfrm>
+          <a:prstGeom prst="rect">
+            <a:avLst/>
+          </a:prstGeom>
+          <a:noFill/>
+        </p:spPr>
+        <p:txBody>
+          <a:bodyPr wrap="none" rtlCol="0">
+            <a:spAutoFit/>
+          </a:bodyPr>
+          <a:lstStyle/>
+          <a:p>
+            <a:r>
+              <a:rPr lang="en-US" dirty="0" smtClean="0"/>
+              <a:t>discontinuity</a:t>
+            </a:r>
+            <a:endParaRPr lang="en-US" dirty="0"/>
+          </a:p>
+        </p:txBody>
+      </p:sp>
+      <p:sp>
+        <p:nvSpPr>
+          <p:cNvPr id="2" name="Title 1"/>
+          <p:cNvSpPr>
+            <a:spLocks noGrp="1"/>
+          </p:cNvSpPr>
+          <p:nvPr>
+            <p:ph type="title"/>
+          </p:nvPr>
+        </p:nvSpPr>
+        <p:spPr>
+          <a:xfrm>
+            <a:off x="457200" y="161877"/>
+            <a:ext cx="8229600" cy="1255761"/>
+          </a:xfrm>
+        </p:spPr>
+        <p:txBody>
+          <a:bodyPr>
+            <a:normAutofit fontScale="90000"/>
+          </a:bodyPr>
+          <a:lstStyle/>
+          <a:p>
+            <a:r>
+              <a:rPr lang="en-US" dirty="0" smtClean="0"/>
+              <a:t>SAGs allow us to capture sequence discrete populations</a:t>
+            </a:r>
+            <a:endParaRPr lang="en-US" dirty="0"/>
+          </a:p>
+        </p:txBody>
+      </p:sp>
     </p:spTree>
     <p:extLst>
       <p:ext uri="{BB962C8B-B14F-4D97-AF65-F5344CB8AC3E}">
-        <p14:creationId xmlns:p14="http://schemas.microsoft.com/office/powerpoint/2010/main" val="2217065650"/>
+        <p14:creationId xmlns:p14="http://schemas.microsoft.com/office/powerpoint/2010/main" val="1633372005"/>
       </p:ext>
     </p:extLst>
   </p:cSld>
@@ -6209,7 +7628,7 @@
 </file>
 
 <file path=ppt/slides/slide9.xml><?xml version="1.0" encoding="utf-8"?>
-<p:sld xmlns:a="http://schemas.openxmlformats.org/drawingml/2006/main" xmlns:r="http://schemas.openxmlformats.org/officeDocument/2006/relationships" xmlns:p="http://schemas.openxmlformats.org/presentationml/2006/main">
+<p:sld xmlns:a="http://schemas.openxmlformats.org/drawingml/2006/main" xmlns:r="http://schemas.openxmlformats.org/officeDocument/2006/relationships" xmlns:p="http://schemas.openxmlformats.org/presentationml/2006/main" show="0">
   <p:cSld>
     <p:spTree>
       <p:nvGrpSpPr>
@@ -6240,23 +7659,19 @@
           <a:bodyPr/>
           <a:lstStyle/>
           <a:p>
-            <a:r>
-              <a:rPr lang="en-US" dirty="0" smtClean="0"/>
-              <a:t>What about other lineages?</a:t>
-            </a:r>
-            <a:endParaRPr lang="en-US" dirty="0"/>
+            <a:endParaRPr lang="en-US"/>
           </a:p>
         </p:txBody>
       </p:sp>
       <p:pic>
         <p:nvPicPr>
-          <p:cNvPr id="3" name="Picture 2" descr="Fig3_seqdiscdenplots-20161004.pdf"/>
+          <p:cNvPr id="3" name="Picture 2" descr="Fig1-Trees+ANI-16S-160804.pdf"/>
           <p:cNvPicPr>
             <a:picLocks noChangeAspect="1"/>
           </p:cNvPicPr>
           <p:nvPr/>
         </p:nvPicPr>
-        <p:blipFill rotWithShape="1">
+        <p:blipFill>
           <a:blip r:embed="rId2">
             <a:extLst>
               <a:ext uri="{28A0092B-C50C-407E-A947-70E740481C1C}">
@@ -6264,13 +7679,14 @@
               </a:ext>
             </a:extLst>
           </a:blip>
-          <a:srcRect l="66032" b="47857"/>
-          <a:stretch/>
+          <a:stretch>
+            <a:fillRect/>
+          </a:stretch>
         </p:blipFill>
         <p:spPr>
           <a:xfrm>
-            <a:off x="1917231" y="1966687"/>
-            <a:ext cx="5648342" cy="3853543"/>
+            <a:off x="227692" y="274638"/>
+            <a:ext cx="8617267" cy="6155191"/>
           </a:xfrm>
           <a:prstGeom prst="rect">
             <a:avLst/>
@@ -6280,20 +7696,21 @@
     </p:spTree>
     <p:extLst>
       <p:ext uri="{BB962C8B-B14F-4D97-AF65-F5344CB8AC3E}">
-        <p14:creationId xmlns:p14="http://schemas.microsoft.com/office/powerpoint/2010/main" val="2733025825"/>
+        <p14:creationId xmlns:p14="http://schemas.microsoft.com/office/powerpoint/2010/main" val="2271728253"/>
       </p:ext>
     </p:extLst>
   </p:cSld>
   <p:clrMapOvr>
     <a:masterClrMapping/>
   </p:clrMapOvr>
-  <p:timing>
-    <p:tnLst>
-      <p:par>
-        <p:cTn xmlns:p14="http://schemas.microsoft.com/office/powerpoint/2010/main" id="1" dur="indefinite" restart="never" nodeType="tmRoot"/>
-      </p:par>
-    </p:tnLst>
-  </p:timing>
+  <mc:AlternateContent xmlns:mc="http://schemas.openxmlformats.org/markup-compatibility/2006">
+    <mc:Choice xmlns:p14="http://schemas.microsoft.com/office/powerpoint/2010/main" Requires="p14">
+      <p:transition spd="slow" p14:dur="2000"/>
+    </mc:Choice>
+    <mc:Fallback>
+      <p:transition xmlns:p14="http://schemas.microsoft.com/office/powerpoint/2010/main" spd="slow"/>
+    </mc:Fallback>
+  </mc:AlternateContent>
 </p:sld>
 </file>
 

</xml_diff>

<commit_message>
Updated slides for 4Y meeting
</commit_message>
<xml_diff>
--- a/4YCM/Slides_4YCM.pptx
+++ b/4YCM/Slides_4YCM.pptx
@@ -6884,6 +6884,53 @@
           <a:ln>
             <a:solidFill>
               <a:schemeClr val="tx1"/>
+            </a:solidFill>
+          </a:ln>
+          <a:effectLst/>
+        </p:spPr>
+        <p:style>
+          <a:lnRef idx="1">
+            <a:schemeClr val="accent1"/>
+          </a:lnRef>
+          <a:fillRef idx="3">
+            <a:schemeClr val="accent1"/>
+          </a:fillRef>
+          <a:effectRef idx="2">
+            <a:schemeClr val="accent1"/>
+          </a:effectRef>
+          <a:fontRef idx="minor">
+            <a:schemeClr val="lt1"/>
+          </a:fontRef>
+        </p:style>
+        <p:txBody>
+          <a:bodyPr rtlCol="0" anchor="ctr"/>
+          <a:lstStyle/>
+          <a:p>
+            <a:pPr algn="ctr"/>
+            <a:endParaRPr lang="en-US"/>
+          </a:p>
+        </p:txBody>
+      </p:sp>
+      <p:sp>
+        <p:nvSpPr>
+          <p:cNvPr id="6" name="Rectangle 5"/>
+          <p:cNvSpPr/>
+          <p:nvPr/>
+        </p:nvSpPr>
+        <p:spPr>
+          <a:xfrm>
+            <a:off x="4651830" y="4884057"/>
+            <a:ext cx="1451428" cy="1444172"/>
+          </a:xfrm>
+          <a:prstGeom prst="rect">
+            <a:avLst/>
+          </a:prstGeom>
+          <a:noFill/>
+          <a:ln>
+            <a:solidFill>
+              <a:schemeClr val="bg1">
+                <a:lumMod val="50000"/>
+              </a:schemeClr>
             </a:solidFill>
           </a:ln>
           <a:effectLst/>

</xml_diff>

<commit_message>
Updated notes and slides
</commit_message>
<xml_diff>
--- a/4YCM/Slides_4YCM.pptx
+++ b/4YCM/Slides_4YCM.pptx
@@ -5,7 +5,7 @@
     <p:sldMasterId id="2147483648" r:id="rId1"/>
   </p:sldMasterIdLst>
   <p:notesMasterIdLst>
-    <p:notesMasterId r:id="rId19"/>
+    <p:notesMasterId r:id="rId21"/>
   </p:notesMasterIdLst>
   <p:sldIdLst>
     <p:sldId id="270" r:id="rId2"/>
@@ -21,10 +21,12 @@
     <p:sldId id="268" r:id="rId12"/>
     <p:sldId id="269" r:id="rId13"/>
     <p:sldId id="273" r:id="rId14"/>
-    <p:sldId id="278" r:id="rId15"/>
-    <p:sldId id="274" r:id="rId16"/>
-    <p:sldId id="259" r:id="rId17"/>
-    <p:sldId id="260" r:id="rId18"/>
+    <p:sldId id="281" r:id="rId15"/>
+    <p:sldId id="282" r:id="rId16"/>
+    <p:sldId id="278" r:id="rId17"/>
+    <p:sldId id="274" r:id="rId18"/>
+    <p:sldId id="259" r:id="rId19"/>
+    <p:sldId id="260" r:id="rId20"/>
   </p:sldIdLst>
   <p:sldSz cx="9144000" cy="6858000" type="screen4x3"/>
   <p:notesSz cx="6858000" cy="9144000"/>
@@ -157,6 +159,8 @@
         </p14:section>
         <p14:section name="newQ selection" id="{D4EF7B4F-9358-EF46-9E72-ABD9447F9847}">
           <p14:sldIdLst>
+            <p14:sldId id="281"/>
+            <p14:sldId id="282"/>
             <p14:sldId id="278"/>
             <p14:sldId id="274"/>
           </p14:sldIdLst>
@@ -653,6 +657,113 @@
           <a:p>
             <a:r>
               <a:rPr lang="en-US" dirty="0" smtClean="0"/>
+              <a:t>TB</a:t>
+            </a:r>
+            <a:r>
+              <a:rPr lang="en-US" baseline="0" dirty="0" smtClean="0"/>
+              <a:t> – </a:t>
+            </a:r>
+            <a:r>
+              <a:rPr lang="en-US" baseline="0" dirty="0" err="1" smtClean="0"/>
+              <a:t>Dimictic</a:t>
+            </a:r>
+            <a:endParaRPr lang="en-US" baseline="0" dirty="0" smtClean="0"/>
+          </a:p>
+          <a:p>
+            <a:r>
+              <a:rPr lang="en-US" baseline="0" dirty="0" smtClean="0"/>
+              <a:t>CB -- </a:t>
+            </a:r>
+            <a:r>
+              <a:rPr lang="en-US" baseline="0" dirty="0" err="1" smtClean="0"/>
+              <a:t>Polymictic</a:t>
+            </a:r>
+            <a:endParaRPr lang="en-US" dirty="0"/>
+          </a:p>
+        </p:txBody>
+      </p:sp>
+      <p:sp>
+        <p:nvSpPr>
+          <p:cNvPr id="4" name="Slide Number Placeholder 3"/>
+          <p:cNvSpPr>
+            <a:spLocks noGrp="1"/>
+          </p:cNvSpPr>
+          <p:nvPr>
+            <p:ph type="sldNum" sz="quarter" idx="10"/>
+          </p:nvPr>
+        </p:nvSpPr>
+        <p:spPr/>
+        <p:txBody>
+          <a:bodyPr/>
+          <a:lstStyle/>
+          <a:p>
+            <a:fld id="{E24C21EA-28B2-0442-AFB4-706342F125BD}" type="slidenum">
+              <a:rPr lang="en-US" smtClean="0"/>
+              <a:t>18</a:t>
+            </a:fld>
+            <a:endParaRPr lang="en-US"/>
+          </a:p>
+        </p:txBody>
+      </p:sp>
+    </p:spTree>
+    <p:extLst>
+      <p:ext uri="{BB962C8B-B14F-4D97-AF65-F5344CB8AC3E}">
+        <p14:creationId xmlns:p14="http://schemas.microsoft.com/office/powerpoint/2010/main" val="37004290"/>
+      </p:ext>
+    </p:extLst>
+  </p:cSld>
+  <p:clrMapOvr>
+    <a:masterClrMapping/>
+  </p:clrMapOvr>
+</p:notes>
+</file>
+
+<file path=ppt/notesSlides/notesSlide11.xml><?xml version="1.0" encoding="utf-8"?>
+<p:notes xmlns:a="http://schemas.openxmlformats.org/drawingml/2006/main" xmlns:r="http://schemas.openxmlformats.org/officeDocument/2006/relationships" xmlns:p="http://schemas.openxmlformats.org/presentationml/2006/main">
+  <p:cSld>
+    <p:spTree>
+      <p:nvGrpSpPr>
+        <p:cNvPr id="1" name=""/>
+        <p:cNvGrpSpPr/>
+        <p:nvPr/>
+      </p:nvGrpSpPr>
+      <p:grpSpPr>
+        <a:xfrm>
+          <a:off x="0" y="0"/>
+          <a:ext cx="0" cy="0"/>
+          <a:chOff x="0" y="0"/>
+          <a:chExt cx="0" cy="0"/>
+        </a:xfrm>
+      </p:grpSpPr>
+      <p:sp>
+        <p:nvSpPr>
+          <p:cNvPr id="2" name="Slide Image Placeholder 1"/>
+          <p:cNvSpPr>
+            <a:spLocks noGrp="1" noRot="1" noChangeAspect="1"/>
+          </p:cNvSpPr>
+          <p:nvPr>
+            <p:ph type="sldImg"/>
+          </p:nvPr>
+        </p:nvSpPr>
+        <p:spPr/>
+      </p:sp>
+      <p:sp>
+        <p:nvSpPr>
+          <p:cNvPr id="3" name="Notes Placeholder 2"/>
+          <p:cNvSpPr>
+            <a:spLocks noGrp="1"/>
+          </p:cNvSpPr>
+          <p:nvPr>
+            <p:ph type="body" idx="1"/>
+          </p:nvPr>
+        </p:nvSpPr>
+        <p:spPr/>
+        <p:txBody>
+          <a:bodyPr/>
+          <a:lstStyle/>
+          <a:p>
+            <a:r>
+              <a:rPr lang="en-US" dirty="0" smtClean="0"/>
               <a:t>Mary</a:t>
             </a:r>
             <a:r>
@@ -660,16 +771,10 @@
               <a:t> Lake never mixes-</a:t>
             </a:r>
             <a:r>
-              <a:rPr lang="en-US" baseline="0" dirty="0" err="1" smtClean="0"/>
+              <a:rPr lang="en-US" baseline="0" smtClean="0"/>
               <a:t>meromictic</a:t>
             </a:r>
             <a:endParaRPr lang="en-US" baseline="0" dirty="0" smtClean="0"/>
-          </a:p>
-          <a:p>
-            <a:r>
-              <a:rPr lang="en-US" baseline="0" dirty="0" smtClean="0"/>
-              <a:t>Bog too?</a:t>
-            </a:r>
           </a:p>
           <a:p>
             <a:r>
@@ -697,7 +802,7 @@
           <a:p>
             <a:fld id="{E24C21EA-28B2-0442-AFB4-706342F125BD}" type="slidenum">
               <a:rPr lang="en-US" smtClean="0"/>
-              <a:t>17</a:t>
+              <a:t>19</a:t>
             </a:fld>
             <a:endParaRPr lang="en-US"/>
           </a:p>
@@ -1006,6 +1111,18 @@
               <a:rPr lang="en-US" baseline="0" dirty="0" smtClean="0"/>
               <a:t> from other lakes don’t many recruit reads with high ID</a:t>
             </a:r>
+          </a:p>
+          <a:p>
+            <a:r>
+              <a:rPr lang="en-US" baseline="0" dirty="0" smtClean="0"/>
+              <a:t>14 acI SAGs</a:t>
+            </a:r>
+          </a:p>
+          <a:p>
+            <a:r>
+              <a:rPr lang="en-US" baseline="0" dirty="0" smtClean="0"/>
+              <a:t>Point out more distantly related peak before transitioning</a:t>
+            </a:r>
             <a:endParaRPr lang="en-US" dirty="0"/>
           </a:p>
         </p:txBody>
@@ -1104,7 +1221,12 @@
               <a:rPr lang="en-US" baseline="0" dirty="0" smtClean="0"/>
               <a:t>LD12 are in earlier stages of differentiation?</a:t>
             </a:r>
-            <a:endParaRPr lang="en-US" dirty="0"/>
+          </a:p>
+          <a:p>
+            <a:r>
+              <a:rPr lang="en-US" baseline="0" dirty="0" smtClean="0"/>
+              <a:t>10 LD12 total (5ME, 5 non)</a:t>
+            </a:r>
           </a:p>
         </p:txBody>
       </p:sp>
@@ -1379,200 +1501,12 @@
           <a:lstStyle/>
           <a:p>
             <a:r>
-              <a:rPr lang="en-US" dirty="0" err="1" smtClean="0"/>
-              <a:t>Neg</a:t>
-            </a:r>
-            <a:r>
               <a:rPr lang="en-US" dirty="0" smtClean="0"/>
-              <a:t>/purifying </a:t>
-            </a:r>
-            <a:r>
-              <a:rPr lang="mr-IN" dirty="0" smtClean="0"/>
-              <a:t>–</a:t>
-            </a:r>
-            <a:r>
-              <a:rPr lang="en-US" dirty="0" smtClean="0"/>
-              <a:t> remove deleterious alleles </a:t>
-            </a:r>
-            <a:r>
-              <a:rPr lang="mr-IN" dirty="0" smtClean="0"/>
-              <a:t>–</a:t>
-            </a:r>
-            <a:r>
-              <a:rPr lang="en-US" dirty="0" smtClean="0"/>
-              <a:t> </a:t>
-            </a:r>
-            <a:r>
-              <a:rPr lang="en-US" dirty="0" err="1" smtClean="0"/>
-              <a:t>dnds</a:t>
-            </a:r>
-            <a:r>
-              <a:rPr lang="en-US" dirty="0" smtClean="0"/>
-              <a:t> &lt;1???</a:t>
-            </a:r>
-          </a:p>
-          <a:p>
-            <a:r>
-              <a:rPr lang="en-US" dirty="0" err="1" smtClean="0"/>
-              <a:t>Pos</a:t>
-            </a:r>
-            <a:r>
-              <a:rPr lang="en-US" dirty="0" smtClean="0"/>
-              <a:t>/</a:t>
-            </a:r>
-            <a:r>
-              <a:rPr lang="en-US" dirty="0" err="1" smtClean="0"/>
-              <a:t>darwinian</a:t>
+              <a:t>Do the SNPs</a:t>
             </a:r>
             <a:r>
               <a:rPr lang="en-US" baseline="0" dirty="0" smtClean="0"/>
-              <a:t> </a:t>
-            </a:r>
-            <a:r>
-              <a:rPr lang="mr-IN" baseline="0" dirty="0" smtClean="0"/>
-              <a:t>–</a:t>
-            </a:r>
-            <a:r>
-              <a:rPr lang="en-US" baseline="0" dirty="0" smtClean="0"/>
-              <a:t> advantageous alleles go to fixation </a:t>
-            </a:r>
-            <a:r>
-              <a:rPr lang="mr-IN" baseline="0" dirty="0" smtClean="0"/>
-              <a:t>–</a:t>
-            </a:r>
-            <a:r>
-              <a:rPr lang="en-US" baseline="0" dirty="0" smtClean="0"/>
-              <a:t> </a:t>
-            </a:r>
-            <a:r>
-              <a:rPr lang="en-US" baseline="0" dirty="0" err="1" smtClean="0"/>
-              <a:t>dnds</a:t>
-            </a:r>
-            <a:r>
-              <a:rPr lang="en-US" baseline="0" dirty="0" smtClean="0"/>
-              <a:t> &gt; 1</a:t>
-            </a:r>
-          </a:p>
-          <a:p>
-            <a:r>
-              <a:rPr lang="en-US" baseline="0" dirty="0" smtClean="0"/>
-              <a:t>McDonald-</a:t>
-            </a:r>
-            <a:r>
-              <a:rPr lang="en-US" baseline="0" dirty="0" err="1" smtClean="0"/>
-              <a:t>Kreitman</a:t>
-            </a:r>
-            <a:r>
-              <a:rPr lang="en-US" baseline="0" dirty="0" smtClean="0"/>
-              <a:t> test </a:t>
-            </a:r>
-            <a:r>
-              <a:rPr lang="mr-IN" baseline="0" dirty="0" smtClean="0"/>
-              <a:t>–</a:t>
-            </a:r>
-            <a:r>
-              <a:rPr lang="en-US" baseline="0" dirty="0" smtClean="0"/>
-              <a:t> </a:t>
-            </a:r>
-            <a:r>
-              <a:rPr lang="en-US" baseline="0" dirty="0" err="1" smtClean="0"/>
-              <a:t>Dn</a:t>
-            </a:r>
-            <a:r>
-              <a:rPr lang="en-US" baseline="0" dirty="0" smtClean="0"/>
-              <a:t>/Ds to </a:t>
-            </a:r>
-            <a:r>
-              <a:rPr lang="en-US" baseline="0" dirty="0" err="1" smtClean="0"/>
-              <a:t>Pn</a:t>
-            </a:r>
-            <a:r>
-              <a:rPr lang="en-US" baseline="0" dirty="0" smtClean="0"/>
-              <a:t>/Ps (test for selection within species/ populations?)</a:t>
-            </a:r>
-          </a:p>
-          <a:p>
-            <a:r>
-              <a:rPr lang="en-US" baseline="0" dirty="0" smtClean="0"/>
-              <a:t>	- </a:t>
-            </a:r>
-            <a:r>
-              <a:rPr lang="en-US" baseline="0" dirty="0" err="1" smtClean="0"/>
-              <a:t>DnDs</a:t>
-            </a:r>
-            <a:r>
-              <a:rPr lang="en-US" baseline="0" dirty="0" smtClean="0"/>
-              <a:t> &gt; PnPs  </a:t>
-            </a:r>
-            <a:r>
-              <a:rPr lang="en-US" baseline="0" dirty="0" smtClean="0">
-                <a:sym typeface="Wingdings"/>
-              </a:rPr>
-              <a:t>positive selection</a:t>
-            </a:r>
-          </a:p>
-          <a:p>
-            <a:r>
-              <a:rPr lang="en-US" baseline="0" dirty="0" smtClean="0">
-                <a:sym typeface="Wingdings"/>
-              </a:rPr>
-              <a:t>	- </a:t>
-            </a:r>
-            <a:r>
-              <a:rPr lang="en-US" baseline="0" dirty="0" err="1" smtClean="0">
-                <a:sym typeface="Wingdings"/>
-              </a:rPr>
-              <a:t>DnDs</a:t>
-            </a:r>
-            <a:r>
-              <a:rPr lang="en-US" baseline="0" dirty="0" smtClean="0">
-                <a:sym typeface="Wingdings"/>
-              </a:rPr>
-              <a:t> &lt; </a:t>
-            </a:r>
-            <a:r>
-              <a:rPr lang="en-US" baseline="0" dirty="0" err="1" smtClean="0">
-                <a:sym typeface="Wingdings"/>
-              </a:rPr>
-              <a:t>PnPS</a:t>
-            </a:r>
-            <a:r>
-              <a:rPr lang="en-US" baseline="0" dirty="0" smtClean="0">
-                <a:sym typeface="Wingdings"/>
-              </a:rPr>
-              <a:t>  negative selection</a:t>
-            </a:r>
-          </a:p>
-          <a:p>
-            <a:r>
-              <a:rPr lang="en-US" baseline="0" dirty="0" smtClean="0">
-                <a:sym typeface="Wingdings"/>
-              </a:rPr>
-              <a:t>	- alpha (prop of </a:t>
-            </a:r>
-            <a:r>
-              <a:rPr lang="en-US" baseline="0" dirty="0" err="1" smtClean="0">
-                <a:sym typeface="Wingdings"/>
-              </a:rPr>
-              <a:t>nonsyn</a:t>
-            </a:r>
-            <a:r>
-              <a:rPr lang="en-US" baseline="0" dirty="0" smtClean="0">
-                <a:sym typeface="Wingdings"/>
-              </a:rPr>
-              <a:t> subs under </a:t>
-            </a:r>
-            <a:r>
-              <a:rPr lang="en-US" baseline="0" dirty="0" err="1" smtClean="0">
-                <a:sym typeface="Wingdings"/>
-              </a:rPr>
-              <a:t>pos</a:t>
-            </a:r>
-            <a:r>
-              <a:rPr lang="en-US" baseline="0" dirty="0" smtClean="0">
-                <a:sym typeface="Wingdings"/>
-              </a:rPr>
-              <a:t> select) calculated for each gene or genome-wide</a:t>
+              <a:t> change as expected based on the selection values though time?</a:t>
             </a:r>
             <a:endParaRPr lang="en-US" dirty="0"/>
           </a:p>
@@ -1595,7 +1529,7 @@
           <a:p>
             <a:fld id="{03226FDB-C243-F04F-A3A4-63881AA9751B}" type="slidenum">
               <a:rPr lang="en-US" smtClean="0"/>
-              <a:t>14</a:t>
+              <a:t>15</a:t>
             </a:fld>
             <a:endParaRPr lang="en-US"/>
           </a:p>
@@ -1604,7 +1538,7 @@
     </p:spTree>
     <p:extLst>
       <p:ext uri="{BB962C8B-B14F-4D97-AF65-F5344CB8AC3E}">
-        <p14:creationId xmlns:p14="http://schemas.microsoft.com/office/powerpoint/2010/main" val="1200613775"/>
+        <p14:creationId xmlns:p14="http://schemas.microsoft.com/office/powerpoint/2010/main" val="1614294500"/>
       </p:ext>
     </p:extLst>
   </p:cSld>
@@ -1659,12 +1593,213 @@
           <a:lstStyle/>
           <a:p>
             <a:r>
+              <a:rPr lang="en-US" dirty="0" err="1" smtClean="0"/>
+              <a:t>Neg</a:t>
+            </a:r>
+            <a:r>
               <a:rPr lang="en-US" dirty="0" smtClean="0"/>
-              <a:t>Do the SNPs</a:t>
+              <a:t>/purifying </a:t>
+            </a:r>
+            <a:r>
+              <a:rPr lang="mr-IN" dirty="0" smtClean="0"/>
+              <a:t>–</a:t>
+            </a:r>
+            <a:r>
+              <a:rPr lang="en-US" dirty="0" smtClean="0"/>
+              <a:t> remove deleterious alleles </a:t>
+            </a:r>
+            <a:r>
+              <a:rPr lang="mr-IN" dirty="0" smtClean="0"/>
+              <a:t>–</a:t>
+            </a:r>
+            <a:r>
+              <a:rPr lang="en-US" dirty="0" smtClean="0"/>
+              <a:t> </a:t>
+            </a:r>
+            <a:r>
+              <a:rPr lang="en-US" dirty="0" err="1" smtClean="0"/>
+              <a:t>dnds</a:t>
+            </a:r>
+            <a:r>
+              <a:rPr lang="en-US" dirty="0" smtClean="0"/>
+              <a:t> &lt;1???</a:t>
+            </a:r>
+          </a:p>
+          <a:p>
+            <a:r>
+              <a:rPr lang="en-US" dirty="0" err="1" smtClean="0"/>
+              <a:t>Pos</a:t>
+            </a:r>
+            <a:r>
+              <a:rPr lang="en-US" dirty="0" smtClean="0"/>
+              <a:t>/</a:t>
+            </a:r>
+            <a:r>
+              <a:rPr lang="en-US" dirty="0" err="1" smtClean="0"/>
+              <a:t>darwinian</a:t>
             </a:r>
             <a:r>
               <a:rPr lang="en-US" baseline="0" dirty="0" smtClean="0"/>
-              <a:t> change as expected based on the selection values though time?</a:t>
+              <a:t> </a:t>
+            </a:r>
+            <a:r>
+              <a:rPr lang="mr-IN" baseline="0" dirty="0" smtClean="0"/>
+              <a:t>–</a:t>
+            </a:r>
+            <a:r>
+              <a:rPr lang="en-US" baseline="0" dirty="0" smtClean="0"/>
+              <a:t> advantageous alleles go to fixation </a:t>
+            </a:r>
+            <a:r>
+              <a:rPr lang="mr-IN" baseline="0" dirty="0" smtClean="0"/>
+              <a:t>–</a:t>
+            </a:r>
+            <a:r>
+              <a:rPr lang="en-US" baseline="0" dirty="0" smtClean="0"/>
+              <a:t> </a:t>
+            </a:r>
+            <a:r>
+              <a:rPr lang="en-US" baseline="0" dirty="0" err="1" smtClean="0"/>
+              <a:t>dnds</a:t>
+            </a:r>
+            <a:r>
+              <a:rPr lang="en-US" baseline="0" dirty="0" smtClean="0"/>
+              <a:t> &gt; 1</a:t>
+            </a:r>
+          </a:p>
+          <a:p>
+            <a:r>
+              <a:rPr lang="en-US" baseline="0" dirty="0" smtClean="0"/>
+              <a:t>McDonald-</a:t>
+            </a:r>
+            <a:r>
+              <a:rPr lang="en-US" baseline="0" dirty="0" err="1" smtClean="0"/>
+              <a:t>Kreitman</a:t>
+            </a:r>
+            <a:r>
+              <a:rPr lang="en-US" baseline="0" dirty="0" smtClean="0"/>
+              <a:t> test </a:t>
+            </a:r>
+            <a:r>
+              <a:rPr lang="mr-IN" baseline="0" dirty="0" smtClean="0"/>
+              <a:t>–</a:t>
+            </a:r>
+            <a:r>
+              <a:rPr lang="en-US" baseline="0" dirty="0" smtClean="0"/>
+              <a:t> </a:t>
+            </a:r>
+            <a:r>
+              <a:rPr lang="en-US" baseline="0" dirty="0" err="1" smtClean="0"/>
+              <a:t>Dn</a:t>
+            </a:r>
+            <a:r>
+              <a:rPr lang="en-US" baseline="0" dirty="0" smtClean="0"/>
+              <a:t>/Ds to </a:t>
+            </a:r>
+            <a:r>
+              <a:rPr lang="en-US" baseline="0" dirty="0" err="1" smtClean="0"/>
+              <a:t>Pn</a:t>
+            </a:r>
+            <a:r>
+              <a:rPr lang="en-US" baseline="0" dirty="0" smtClean="0"/>
+              <a:t>/Ps (test for selection within species/ populations?)</a:t>
+            </a:r>
+          </a:p>
+          <a:p>
+            <a:r>
+              <a:rPr lang="en-US" baseline="0" dirty="0" smtClean="0"/>
+              <a:t>	- </a:t>
+            </a:r>
+            <a:r>
+              <a:rPr lang="en-US" baseline="0" dirty="0" err="1" smtClean="0"/>
+              <a:t>DnDs</a:t>
+            </a:r>
+            <a:r>
+              <a:rPr lang="en-US" baseline="0" dirty="0" smtClean="0"/>
+              <a:t> &gt; PnPs  </a:t>
+            </a:r>
+            <a:r>
+              <a:rPr lang="en-US" baseline="0" dirty="0" smtClean="0">
+                <a:sym typeface="Wingdings"/>
+              </a:rPr>
+              <a:t>positive selection</a:t>
+            </a:r>
+          </a:p>
+          <a:p>
+            <a:r>
+              <a:rPr lang="en-US" baseline="0" dirty="0" smtClean="0">
+                <a:sym typeface="Wingdings"/>
+              </a:rPr>
+              <a:t>	- </a:t>
+            </a:r>
+            <a:r>
+              <a:rPr lang="en-US" baseline="0" dirty="0" err="1" smtClean="0">
+                <a:sym typeface="Wingdings"/>
+              </a:rPr>
+              <a:t>DnDs</a:t>
+            </a:r>
+            <a:r>
+              <a:rPr lang="en-US" baseline="0" dirty="0" smtClean="0">
+                <a:sym typeface="Wingdings"/>
+              </a:rPr>
+              <a:t> &lt; </a:t>
+            </a:r>
+            <a:r>
+              <a:rPr lang="en-US" baseline="0" dirty="0" err="1" smtClean="0">
+                <a:sym typeface="Wingdings"/>
+              </a:rPr>
+              <a:t>PnPS</a:t>
+            </a:r>
+            <a:r>
+              <a:rPr lang="en-US" baseline="0" dirty="0" smtClean="0">
+                <a:sym typeface="Wingdings"/>
+              </a:rPr>
+              <a:t>  negative selection</a:t>
+            </a:r>
+          </a:p>
+          <a:p>
+            <a:r>
+              <a:rPr lang="en-US" baseline="0" dirty="0" smtClean="0">
+                <a:sym typeface="Wingdings"/>
+              </a:rPr>
+              <a:t>	- alpha (prop of </a:t>
+            </a:r>
+            <a:r>
+              <a:rPr lang="en-US" baseline="0" dirty="0" err="1" smtClean="0">
+                <a:sym typeface="Wingdings"/>
+              </a:rPr>
+              <a:t>nonsyn</a:t>
+            </a:r>
+            <a:r>
+              <a:rPr lang="en-US" baseline="0" dirty="0" smtClean="0">
+                <a:sym typeface="Wingdings"/>
+              </a:rPr>
+              <a:t> subs under </a:t>
+            </a:r>
+            <a:r>
+              <a:rPr lang="en-US" baseline="0" dirty="0" err="1" smtClean="0">
+                <a:sym typeface="Wingdings"/>
+              </a:rPr>
+              <a:t>pos</a:t>
+            </a:r>
+            <a:r>
+              <a:rPr lang="en-US" baseline="0" dirty="0" smtClean="0">
+                <a:sym typeface="Wingdings"/>
+              </a:rPr>
+              <a:t> select) calculated for each gene or genome-wide</a:t>
+            </a:r>
+          </a:p>
+          <a:p>
+            <a:endParaRPr lang="en-US" baseline="0" dirty="0" smtClean="0">
+              <a:sym typeface="Wingdings"/>
+            </a:endParaRPr>
+          </a:p>
+          <a:p>
+            <a:r>
+              <a:rPr lang="en-US" baseline="0" dirty="0" smtClean="0">
+                <a:sym typeface="Wingdings"/>
+              </a:rPr>
+              <a:t>L06, J17, I14 (A1)</a:t>
             </a:r>
             <a:endParaRPr lang="en-US" dirty="0"/>
           </a:p>
@@ -1687,7 +1822,7 @@
           <a:p>
             <a:fld id="{03226FDB-C243-F04F-A3A4-63881AA9751B}" type="slidenum">
               <a:rPr lang="en-US" smtClean="0"/>
-              <a:t>15</a:t>
+              <a:t>16</a:t>
             </a:fld>
             <a:endParaRPr lang="en-US"/>
           </a:p>
@@ -1696,7 +1831,7 @@
     </p:spTree>
     <p:extLst>
       <p:ext uri="{BB962C8B-B14F-4D97-AF65-F5344CB8AC3E}">
-        <p14:creationId xmlns:p14="http://schemas.microsoft.com/office/powerpoint/2010/main" val="1614294500"/>
+        <p14:creationId xmlns:p14="http://schemas.microsoft.com/office/powerpoint/2010/main" val="1200613775"/>
       </p:ext>
     </p:extLst>
   </p:cSld>
@@ -1752,26 +1887,11 @@
           <a:p>
             <a:r>
               <a:rPr lang="en-US" dirty="0" smtClean="0"/>
-              <a:t>TB</a:t>
+              <a:t>Do the SNPs</a:t>
             </a:r>
             <a:r>
               <a:rPr lang="en-US" baseline="0" dirty="0" smtClean="0"/>
-              <a:t> – </a:t>
-            </a:r>
-            <a:r>
-              <a:rPr lang="en-US" baseline="0" dirty="0" err="1" smtClean="0"/>
-              <a:t>Dimictic</a:t>
-            </a:r>
-            <a:endParaRPr lang="en-US" baseline="0" dirty="0" smtClean="0"/>
-          </a:p>
-          <a:p>
-            <a:r>
-              <a:rPr lang="en-US" baseline="0" dirty="0" smtClean="0"/>
-              <a:t>CB -- </a:t>
-            </a:r>
-            <a:r>
-              <a:rPr lang="en-US" baseline="0" dirty="0" err="1" smtClean="0"/>
-              <a:t>Polymictic</a:t>
+              <a:t> change as expected based on the selection values though time?</a:t>
             </a:r>
             <a:endParaRPr lang="en-US" dirty="0"/>
           </a:p>
@@ -1792,9 +1912,9 @@
           <a:bodyPr/>
           <a:lstStyle/>
           <a:p>
-            <a:fld id="{E24C21EA-28B2-0442-AFB4-706342F125BD}" type="slidenum">
-              <a:rPr lang="en-US" smtClean="0"/>
-              <a:t>16</a:t>
+            <a:fld id="{03226FDB-C243-F04F-A3A4-63881AA9751B}" type="slidenum">
+              <a:rPr lang="en-US" smtClean="0"/>
+              <a:t>17</a:t>
             </a:fld>
             <a:endParaRPr lang="en-US"/>
           </a:p>
@@ -1803,7 +1923,7 @@
     </p:spTree>
     <p:extLst>
       <p:ext uri="{BB962C8B-B14F-4D97-AF65-F5344CB8AC3E}">
-        <p14:creationId xmlns:p14="http://schemas.microsoft.com/office/powerpoint/2010/main" val="37004290"/>
+        <p14:creationId xmlns:p14="http://schemas.microsoft.com/office/powerpoint/2010/main" val="1614294500"/>
       </p:ext>
     </p:extLst>
   </p:cSld>
@@ -5956,6 +6076,217 @@
       </p:grpSpPr>
       <p:sp>
         <p:nvSpPr>
+          <p:cNvPr id="3" name="Title 2"/>
+          <p:cNvSpPr>
+            <a:spLocks noGrp="1"/>
+          </p:cNvSpPr>
+          <p:nvPr>
+            <p:ph type="ctrTitle"/>
+          </p:nvPr>
+        </p:nvSpPr>
+        <p:spPr/>
+        <p:txBody>
+          <a:bodyPr/>
+          <a:lstStyle/>
+          <a:p>
+            <a:r>
+              <a:rPr lang="en-US" dirty="0" smtClean="0"/>
+              <a:t>New Questions</a:t>
+            </a:r>
+            <a:endParaRPr lang="en-US" dirty="0"/>
+          </a:p>
+        </p:txBody>
+      </p:sp>
+      <p:sp>
+        <p:nvSpPr>
+          <p:cNvPr id="4" name="Subtitle 3"/>
+          <p:cNvSpPr>
+            <a:spLocks noGrp="1"/>
+          </p:cNvSpPr>
+          <p:nvPr>
+            <p:ph type="subTitle" idx="1"/>
+          </p:nvPr>
+        </p:nvSpPr>
+        <p:spPr/>
+        <p:txBody>
+          <a:bodyPr/>
+          <a:lstStyle/>
+          <a:p>
+            <a:endParaRPr lang="en-US"/>
+          </a:p>
+        </p:txBody>
+      </p:sp>
+    </p:spTree>
+    <p:extLst>
+      <p:ext uri="{BB962C8B-B14F-4D97-AF65-F5344CB8AC3E}">
+        <p14:creationId xmlns:p14="http://schemas.microsoft.com/office/powerpoint/2010/main" val="2024700940"/>
+      </p:ext>
+    </p:extLst>
+  </p:cSld>
+  <p:clrMapOvr>
+    <a:masterClrMapping/>
+  </p:clrMapOvr>
+</p:sld>
+</file>
+
+<file path=ppt/slides/slide15.xml><?xml version="1.0" encoding="utf-8"?>
+<p:sld xmlns:a="http://schemas.openxmlformats.org/drawingml/2006/main" xmlns:r="http://schemas.openxmlformats.org/officeDocument/2006/relationships" xmlns:p="http://schemas.openxmlformats.org/presentationml/2006/main">
+  <p:cSld>
+    <p:spTree>
+      <p:nvGrpSpPr>
+        <p:cNvPr id="1" name=""/>
+        <p:cNvGrpSpPr/>
+        <p:nvPr/>
+      </p:nvGrpSpPr>
+      <p:grpSpPr>
+        <a:xfrm>
+          <a:off x="0" y="0"/>
+          <a:ext cx="0" cy="0"/>
+          <a:chOff x="0" y="0"/>
+          <a:chExt cx="0" cy="0"/>
+        </a:xfrm>
+      </p:grpSpPr>
+      <p:sp>
+        <p:nvSpPr>
+          <p:cNvPr id="2" name="Title 1"/>
+          <p:cNvSpPr>
+            <a:spLocks noGrp="1"/>
+          </p:cNvSpPr>
+          <p:nvPr>
+            <p:ph type="title"/>
+          </p:nvPr>
+        </p:nvSpPr>
+        <p:spPr/>
+        <p:txBody>
+          <a:bodyPr/>
+          <a:lstStyle/>
+          <a:p>
+            <a:r>
+              <a:rPr lang="en-US" dirty="0" smtClean="0"/>
+              <a:t>Next Questions</a:t>
+            </a:r>
+            <a:endParaRPr lang="en-US" dirty="0"/>
+          </a:p>
+        </p:txBody>
+      </p:sp>
+      <p:sp>
+        <p:nvSpPr>
+          <p:cNvPr id="3" name="Content Placeholder 2"/>
+          <p:cNvSpPr>
+            <a:spLocks noGrp="1"/>
+          </p:cNvSpPr>
+          <p:nvPr>
+            <p:ph idx="1"/>
+          </p:nvPr>
+        </p:nvSpPr>
+        <p:spPr/>
+        <p:txBody>
+          <a:bodyPr>
+            <a:normAutofit lnSpcReduction="10000"/>
+          </a:bodyPr>
+          <a:lstStyle/>
+          <a:p>
+            <a:r>
+              <a:rPr lang="en-US" dirty="0"/>
+              <a:t>How does selection differ </a:t>
+            </a:r>
+            <a:r>
+              <a:rPr lang="en-US" dirty="0" smtClean="0"/>
+              <a:t>within </a:t>
+            </a:r>
+            <a:r>
+              <a:rPr lang="en-US" dirty="0" err="1"/>
+              <a:t>vs</a:t>
+            </a:r>
+            <a:r>
+              <a:rPr lang="en-US" dirty="0"/>
+              <a:t> between sequence-discrete populations?  </a:t>
+            </a:r>
+            <a:r>
+              <a:rPr lang="en-US" dirty="0" smtClean="0"/>
+              <a:t>(past vs. current selection)</a:t>
+            </a:r>
+          </a:p>
+          <a:p>
+            <a:pPr lvl="1"/>
+            <a:r>
+              <a:rPr lang="en-US" dirty="0" smtClean="0"/>
+              <a:t>How many genotypes are within a population?</a:t>
+            </a:r>
+          </a:p>
+          <a:p>
+            <a:pPr lvl="1"/>
+            <a:r>
+              <a:rPr lang="en-US" dirty="0" smtClean="0"/>
+              <a:t>Neutral variation or ecologically distinct?</a:t>
+            </a:r>
+          </a:p>
+          <a:p>
+            <a:r>
+              <a:rPr lang="en-US" dirty="0" smtClean="0"/>
+              <a:t>Does </a:t>
+            </a:r>
+            <a:r>
+              <a:rPr lang="en-US" dirty="0"/>
+              <a:t>selection act differently on homologous genes shared by different populations?  </a:t>
+            </a:r>
+            <a:endParaRPr lang="en-US" dirty="0" smtClean="0"/>
+          </a:p>
+          <a:p>
+            <a:r>
+              <a:rPr lang="en-US" dirty="0" smtClean="0"/>
+              <a:t>Which (shared) traits </a:t>
+            </a:r>
+            <a:r>
+              <a:rPr lang="en-US" dirty="0"/>
+              <a:t>are under strong selection</a:t>
+            </a:r>
+            <a:r>
+              <a:rPr lang="en-US" dirty="0" smtClean="0"/>
+              <a:t>?</a:t>
+            </a:r>
+          </a:p>
+        </p:txBody>
+      </p:sp>
+    </p:spTree>
+    <p:extLst>
+      <p:ext uri="{BB962C8B-B14F-4D97-AF65-F5344CB8AC3E}">
+        <p14:creationId xmlns:p14="http://schemas.microsoft.com/office/powerpoint/2010/main" val="3245452461"/>
+      </p:ext>
+    </p:extLst>
+  </p:cSld>
+  <p:clrMapOvr>
+    <a:masterClrMapping/>
+  </p:clrMapOvr>
+  <p:timing>
+    <p:tnLst>
+      <p:par>
+        <p:cTn xmlns:p14="http://schemas.microsoft.com/office/powerpoint/2010/main" id="1" dur="indefinite" restart="never" nodeType="tmRoot"/>
+      </p:par>
+    </p:tnLst>
+  </p:timing>
+</p:sld>
+</file>
+
+<file path=ppt/slides/slide16.xml><?xml version="1.0" encoding="utf-8"?>
+<p:sld xmlns:a="http://schemas.openxmlformats.org/drawingml/2006/main" xmlns:r="http://schemas.openxmlformats.org/officeDocument/2006/relationships" xmlns:p="http://schemas.openxmlformats.org/presentationml/2006/main">
+  <p:cSld>
+    <p:spTree>
+      <p:nvGrpSpPr>
+        <p:cNvPr id="1" name=""/>
+        <p:cNvGrpSpPr/>
+        <p:nvPr/>
+      </p:nvGrpSpPr>
+      <p:grpSpPr>
+        <a:xfrm>
+          <a:off x="0" y="0"/>
+          <a:ext cx="0" cy="0"/>
+          <a:chOff x="0" y="0"/>
+          <a:chExt cx="0" cy="0"/>
+        </a:xfrm>
+      </p:grpSpPr>
+      <p:sp>
+        <p:nvSpPr>
           <p:cNvPr id="2" name="Title 1"/>
           <p:cNvSpPr>
             <a:spLocks noGrp="1"/>
@@ -6027,7 +6358,7 @@
 </p:sld>
 </file>
 
-<file path=ppt/slides/slide15.xml><?xml version="1.0" encoding="utf-8"?>
+<file path=ppt/slides/slide17.xml><?xml version="1.0" encoding="utf-8"?>
 <p:sld xmlns:a="http://schemas.openxmlformats.org/drawingml/2006/main" xmlns:r="http://schemas.openxmlformats.org/officeDocument/2006/relationships" xmlns:p="http://schemas.openxmlformats.org/presentationml/2006/main">
   <p:cSld>
     <p:spTree>
@@ -6108,15 +6439,19 @@
           <a:p>
             <a:pPr lvl="1"/>
             <a:r>
+              <a:rPr lang="en-US" dirty="0"/>
+              <a:t>Consistent through time</a:t>
+            </a:r>
+            <a:r>
+              <a:rPr lang="en-US" dirty="0" smtClean="0"/>
+              <a:t>?</a:t>
+            </a:r>
+          </a:p>
+          <a:p>
+            <a:pPr lvl="1"/>
+            <a:r>
               <a:rPr lang="en-US" dirty="0" smtClean="0"/>
               <a:t>How many genotypes are within a population?</a:t>
-            </a:r>
-          </a:p>
-          <a:p>
-            <a:pPr lvl="1"/>
-            <a:r>
-              <a:rPr lang="en-US" dirty="0" smtClean="0"/>
-              <a:t>Neutral variation or ecologically distinct?</a:t>
             </a:r>
           </a:p>
           <a:p>
@@ -6166,7 +6501,7 @@
 </p:sld>
 </file>
 
-<file path=ppt/slides/slide16.xml><?xml version="1.0" encoding="utf-8"?>
+<file path=ppt/slides/slide18.xml><?xml version="1.0" encoding="utf-8"?>
 <p:sld xmlns:a="http://schemas.openxmlformats.org/drawingml/2006/main" xmlns:r="http://schemas.openxmlformats.org/officeDocument/2006/relationships" xmlns:p="http://schemas.openxmlformats.org/presentationml/2006/main">
   <p:cSld>
     <p:spTree>
@@ -6286,7 +6621,7 @@
 </p:sld>
 </file>
 
-<file path=ppt/slides/slide17.xml><?xml version="1.0" encoding="utf-8"?>
+<file path=ppt/slides/slide19.xml><?xml version="1.0" encoding="utf-8"?>
 <p:sld xmlns:a="http://schemas.openxmlformats.org/drawingml/2006/main" xmlns:r="http://schemas.openxmlformats.org/officeDocument/2006/relationships" xmlns:p="http://schemas.openxmlformats.org/presentationml/2006/main">
   <p:cSld>
     <p:spTree>
@@ -6358,7 +6693,19 @@
             <a:pPr lvl="1"/>
             <a:r>
               <a:rPr lang="en-US" dirty="0" smtClean="0"/>
-              <a:t>ANI for reference GFMs to each other</a:t>
+              <a:t>ANI for reference </a:t>
+            </a:r>
+            <a:r>
+              <a:rPr lang="en-US" dirty="0" smtClean="0"/>
+              <a:t>MAG</a:t>
+            </a:r>
+            <a:r>
+              <a:rPr lang="en-US" dirty="0" smtClean="0"/>
+              <a:t>s </a:t>
+            </a:r>
+            <a:r>
+              <a:rPr lang="en-US" dirty="0" smtClean="0"/>
+              <a:t>to each other</a:t>
             </a:r>
           </a:p>
           <a:p>

</xml_diff>